<commit_message>
Add Luis' data and plots as Master_Notebook
</commit_message>
<xml_diff>
--- a/StockPowerPointSlideMockup.pptx
+++ b/StockPowerPointSlideMockup.pptx
@@ -7,6 +7,7 @@
   <p:sldIdLst>
     <p:sldId id="256" r:id="rId2"/>
     <p:sldId id="257" r:id="rId3"/>
+    <p:sldId id="258" r:id="rId4"/>
   </p:sldIdLst>
   <p:sldSz cx="12192000" cy="6858000"/>
   <p:notesSz cx="6858000" cy="9144000"/>
@@ -304,7 +305,7 @@
           <a:p>
             <a:fld id="{2395C5C9-164C-46B3-A87E-7660D39D3106}" type="datetime2">
               <a:rPr lang="en-US" smtClean="0"/>
-              <a:t>Tuesday, December 15, 2020</a:t>
+              <a:t>Thursday, December 17, 2020</a:t>
             </a:fld>
             <a:endParaRPr lang="en-US" dirty="0"/>
           </a:p>
@@ -745,7 +746,7 @@
           <a:p>
             <a:fld id="{8DEA2CF1-0EB2-4673-802D-3371233E4A77}" type="datetime2">
               <a:rPr lang="en-US" smtClean="0"/>
-              <a:t>Tuesday, December 15, 2020</a:t>
+              <a:t>Thursday, December 17, 2020</a:t>
             </a:fld>
             <a:endParaRPr lang="en-US" dirty="0"/>
           </a:p>
@@ -1002,7 +1003,7 @@
           <a:p>
             <a:fld id="{8DEA2CF1-0EB2-4673-802D-3371233E4A77}" type="datetime2">
               <a:rPr lang="en-US" smtClean="0"/>
-              <a:t>Tuesday, December 15, 2020</a:t>
+              <a:t>Thursday, December 17, 2020</a:t>
             </a:fld>
             <a:endParaRPr lang="en-US" dirty="0"/>
           </a:p>
@@ -1317,7 +1318,7 @@
           <a:p>
             <a:fld id="{8DEA2CF1-0EB2-4673-802D-3371233E4A77}" type="datetime2">
               <a:rPr lang="en-US" smtClean="0"/>
-              <a:t>Tuesday, December 15, 2020</a:t>
+              <a:t>Thursday, December 17, 2020</a:t>
             </a:fld>
             <a:endParaRPr lang="en-US" dirty="0"/>
           </a:p>
@@ -1642,7 +1643,7 @@
           <a:p>
             <a:fld id="{8DEA2CF1-0EB2-4673-802D-3371233E4A77}" type="datetime2">
               <a:rPr lang="en-US" smtClean="0"/>
-              <a:t>Tuesday, December 15, 2020</a:t>
+              <a:t>Thursday, December 17, 2020</a:t>
             </a:fld>
             <a:endParaRPr lang="en-US" dirty="0"/>
           </a:p>
@@ -1951,7 +1952,7 @@
           <a:p>
             <a:fld id="{8DEA2CF1-0EB2-4673-802D-3371233E4A77}" type="datetime2">
               <a:rPr lang="en-US" smtClean="0"/>
-              <a:t>Tuesday, December 15, 2020</a:t>
+              <a:t>Thursday, December 17, 2020</a:t>
             </a:fld>
             <a:endParaRPr lang="en-US" dirty="0"/>
           </a:p>
@@ -2325,7 +2326,7 @@
           <a:p>
             <a:fld id="{8DEA2CF1-0EB2-4673-802D-3371233E4A77}" type="datetime2">
               <a:rPr lang="en-US" smtClean="0"/>
-              <a:t>Tuesday, December 15, 2020</a:t>
+              <a:t>Thursday, December 17, 2020</a:t>
             </a:fld>
             <a:endParaRPr lang="en-US" dirty="0"/>
           </a:p>
@@ -2506,7 +2507,7 @@
           <a:p>
             <a:fld id="{5B75179A-1E2B-41AB-B400-4F1B4022FAEE}" type="datetime2">
               <a:rPr lang="en-US" smtClean="0"/>
-              <a:t>Tuesday, December 15, 2020</a:t>
+              <a:t>Thursday, December 17, 2020</a:t>
             </a:fld>
             <a:endParaRPr lang="en-US"/>
           </a:p>
@@ -2689,7 +2690,7 @@
           <a:p>
             <a:fld id="{05681D0F-6595-4F14-8EF3-954CD87C797B}" type="datetime2">
               <a:rPr lang="en-US" smtClean="0"/>
-              <a:t>Tuesday, December 15, 2020</a:t>
+              <a:t>Thursday, December 17, 2020</a:t>
             </a:fld>
             <a:endParaRPr lang="en-US"/>
           </a:p>
@@ -2862,7 +2863,7 @@
           <a:p>
             <a:fld id="{4DDCFF8A-AAF8-4A12-8A91-9CA0EAF6CBB9}" type="datetime2">
               <a:rPr lang="en-US" smtClean="0"/>
-              <a:t>Tuesday, December 15, 2020</a:t>
+              <a:t>Thursday, December 17, 2020</a:t>
             </a:fld>
             <a:endParaRPr lang="en-US" dirty="0"/>
           </a:p>
@@ -3117,7 +3118,7 @@
           <a:p>
             <a:fld id="{ABCC25C3-021A-4B0B-8F70-0C181FE1CF45}" type="datetime2">
               <a:rPr lang="en-US" smtClean="0"/>
-              <a:t>Tuesday, December 15, 2020</a:t>
+              <a:t>Thursday, December 17, 2020</a:t>
             </a:fld>
             <a:endParaRPr lang="en-US"/>
           </a:p>
@@ -3358,7 +3359,7 @@
           <a:p>
             <a:fld id="{0C23D88D-8CEC-4ED9-A53B-5596187D9A16}" type="datetime2">
               <a:rPr lang="en-US" smtClean="0"/>
-              <a:t>Tuesday, December 15, 2020</a:t>
+              <a:t>Thursday, December 17, 2020</a:t>
             </a:fld>
             <a:endParaRPr lang="en-US"/>
           </a:p>
@@ -3743,7 +3744,7 @@
           <a:p>
             <a:fld id="{D2CCD382-DFDA-4722-A27A-59C21AD112F2}" type="datetime2">
               <a:rPr lang="en-US" smtClean="0"/>
-              <a:t>Tuesday, December 15, 2020</a:t>
+              <a:t>Thursday, December 17, 2020</a:t>
             </a:fld>
             <a:endParaRPr lang="en-US"/>
           </a:p>
@@ -3864,7 +3865,7 @@
           <a:p>
             <a:fld id="{22F2A30D-1C09-413F-AAB1-38F366000715}" type="datetime2">
               <a:rPr lang="en-US" smtClean="0"/>
-              <a:t>Tuesday, December 15, 2020</a:t>
+              <a:t>Thursday, December 17, 2020</a:t>
             </a:fld>
             <a:endParaRPr lang="en-US"/>
           </a:p>
@@ -3962,7 +3963,7 @@
           <a:p>
             <a:fld id="{6DB82B9C-D65E-4F64-95C3-B10F3B00F0D9}" type="datetime2">
               <a:rPr lang="en-US" smtClean="0"/>
-              <a:t>Tuesday, December 15, 2020</a:t>
+              <a:t>Thursday, December 17, 2020</a:t>
             </a:fld>
             <a:endParaRPr lang="en-US"/>
           </a:p>
@@ -4220,7 +4221,7 @@
           <a:p>
             <a:fld id="{B7F5FDCC-6AAC-4A08-B9E0-3793AB5E64C3}" type="datetime2">
               <a:rPr lang="en-US" smtClean="0"/>
-              <a:t>Tuesday, December 15, 2020</a:t>
+              <a:t>Thursday, December 17, 2020</a:t>
             </a:fld>
             <a:endParaRPr lang="en-US"/>
           </a:p>
@@ -4506,7 +4507,7 @@
           <a:p>
             <a:fld id="{349FE94D-439C-40F1-900E-BC07940E3988}" type="datetime2">
               <a:rPr lang="en-US" smtClean="0"/>
-              <a:t>Tuesday, December 15, 2020</a:t>
+              <a:t>Thursday, December 17, 2020</a:t>
             </a:fld>
             <a:endParaRPr lang="en-US"/>
           </a:p>
@@ -4915,7 +4916,7 @@
           <a:p>
             <a:fld id="{8DEA2CF1-0EB2-4673-802D-3371233E4A77}" type="datetime2">
               <a:rPr lang="en-US" smtClean="0"/>
-              <a:t>Tuesday, December 15, 2020</a:t>
+              <a:t>Thursday, December 17, 2020</a:t>
             </a:fld>
             <a:endParaRPr lang="en-US" dirty="0"/>
           </a:p>
@@ -5942,6 +5943,815 @@
 </p:sld>
 </file>
 
+<file path=ppt/slides/slide3.xml><?xml version="1.0" encoding="utf-8"?>
+<p:sld xmlns:a="http://schemas.openxmlformats.org/drawingml/2006/main" xmlns:r="http://schemas.openxmlformats.org/officeDocument/2006/relationships" xmlns:p="http://schemas.openxmlformats.org/presentationml/2006/main">
+  <p:cSld>
+    <p:bg>
+      <p:bgPr>
+        <a:solidFill>
+          <a:schemeClr val="bg1"/>
+        </a:solidFill>
+        <a:effectLst/>
+      </p:bgPr>
+    </p:bg>
+    <p:spTree>
+      <p:nvGrpSpPr>
+        <p:cNvPr id="1" name=""/>
+        <p:cNvGrpSpPr/>
+        <p:nvPr/>
+      </p:nvGrpSpPr>
+      <p:grpSpPr>
+        <a:xfrm>
+          <a:off x="0" y="0"/>
+          <a:ext cx="0" cy="0"/>
+          <a:chOff x="0" y="0"/>
+          <a:chExt cx="0" cy="0"/>
+        </a:xfrm>
+      </p:grpSpPr>
+      <p:cxnSp>
+        <p:nvCxnSpPr>
+          <p:cNvPr id="34" name="Straight Connector 13">
+            <a:extLst>
+              <a:ext uri="{FF2B5EF4-FFF2-40B4-BE49-F238E27FC236}">
+                <a16:creationId xmlns:a16="http://schemas.microsoft.com/office/drawing/2014/main" id="{0512F9CB-A1A0-4043-A103-F6A4B94B695A}"/>
+              </a:ext>
+              <a:ext uri="{C183D7F6-B498-43B3-948B-1728B52AA6E4}">
+                <adec:decorative xmlns:adec="http://schemas.microsoft.com/office/drawing/2017/decorative" val="1"/>
+              </a:ext>
+            </a:extLst>
+          </p:cNvPr>
+          <p:cNvCxnSpPr>
+            <a:cxnSpLocks noGrp="1" noRot="1" noChangeAspect="1" noMove="1" noResize="1" noEditPoints="1" noAdjustHandles="1" noChangeArrowheads="1" noChangeShapeType="1"/>
+          </p:cNvCxnSpPr>
+          <p:nvPr>
+            <p:extLst>
+              <p:ext uri="{386F3935-93C4-4BCD-93E2-E3B085C9AB24}">
+                <p16:designElem xmlns:p16="http://schemas.microsoft.com/office/powerpoint/2015/main" val="1"/>
+              </p:ext>
+            </p:extLst>
+          </p:nvPr>
+        </p:nvCxnSpPr>
+        <p:spPr>
+          <a:xfrm flipH="1">
+            <a:off x="8228012" y="8467"/>
+            <a:ext cx="3810000" cy="3810000"/>
+          </a:xfrm>
+          <a:prstGeom prst="line">
+            <a:avLst/>
+          </a:prstGeom>
+          <a:ln w="12700">
+            <a:solidFill>
+              <a:schemeClr val="tx1"/>
+            </a:solidFill>
+          </a:ln>
+        </p:spPr>
+        <p:style>
+          <a:lnRef idx="2">
+            <a:schemeClr val="accent1"/>
+          </a:lnRef>
+          <a:fillRef idx="0">
+            <a:schemeClr val="accent1"/>
+          </a:fillRef>
+          <a:effectRef idx="1">
+            <a:schemeClr val="accent1"/>
+          </a:effectRef>
+          <a:fontRef idx="minor">
+            <a:schemeClr val="tx1"/>
+          </a:fontRef>
+        </p:style>
+      </p:cxnSp>
+      <p:cxnSp>
+        <p:nvCxnSpPr>
+          <p:cNvPr id="16" name="Straight Connector 15">
+            <a:extLst>
+              <a:ext uri="{FF2B5EF4-FFF2-40B4-BE49-F238E27FC236}">
+                <a16:creationId xmlns:a16="http://schemas.microsoft.com/office/drawing/2014/main" id="{ADBE6588-EE16-4389-857C-86A156D49E5D}"/>
+              </a:ext>
+              <a:ext uri="{C183D7F6-B498-43B3-948B-1728B52AA6E4}">
+                <adec:decorative xmlns:adec="http://schemas.microsoft.com/office/drawing/2017/decorative" val="1"/>
+              </a:ext>
+            </a:extLst>
+          </p:cNvPr>
+          <p:cNvCxnSpPr>
+            <a:cxnSpLocks noGrp="1" noRot="1" noChangeAspect="1" noMove="1" noResize="1" noEditPoints="1" noAdjustHandles="1" noChangeArrowheads="1" noChangeShapeType="1"/>
+          </p:cNvCxnSpPr>
+          <p:nvPr>
+            <p:extLst>
+              <p:ext uri="{386F3935-93C4-4BCD-93E2-E3B085C9AB24}">
+                <p16:designElem xmlns:p16="http://schemas.microsoft.com/office/powerpoint/2015/main" val="1"/>
+              </p:ext>
+            </p:extLst>
+          </p:nvPr>
+        </p:nvCxnSpPr>
+        <p:spPr>
+          <a:xfrm flipH="1">
+            <a:off x="6108170" y="91545"/>
+            <a:ext cx="6080655" cy="6080655"/>
+          </a:xfrm>
+          <a:prstGeom prst="line">
+            <a:avLst/>
+          </a:prstGeom>
+          <a:ln w="12700">
+            <a:solidFill>
+              <a:schemeClr val="tx1"/>
+            </a:solidFill>
+          </a:ln>
+        </p:spPr>
+        <p:style>
+          <a:lnRef idx="2">
+            <a:schemeClr val="accent1"/>
+          </a:lnRef>
+          <a:fillRef idx="0">
+            <a:schemeClr val="accent1"/>
+          </a:fillRef>
+          <a:effectRef idx="1">
+            <a:schemeClr val="accent1"/>
+          </a:effectRef>
+          <a:fontRef idx="minor">
+            <a:schemeClr val="tx1"/>
+          </a:fontRef>
+        </p:style>
+      </p:cxnSp>
+      <p:cxnSp>
+        <p:nvCxnSpPr>
+          <p:cNvPr id="18" name="Straight Connector 17">
+            <a:extLst>
+              <a:ext uri="{FF2B5EF4-FFF2-40B4-BE49-F238E27FC236}">
+                <a16:creationId xmlns:a16="http://schemas.microsoft.com/office/drawing/2014/main" id="{17FD48D2-B0A7-413D-B947-AA55AC1296D5}"/>
+              </a:ext>
+              <a:ext uri="{C183D7F6-B498-43B3-948B-1728B52AA6E4}">
+                <adec:decorative xmlns:adec="http://schemas.microsoft.com/office/drawing/2017/decorative" val="1"/>
+              </a:ext>
+            </a:extLst>
+          </p:cNvPr>
+          <p:cNvCxnSpPr>
+            <a:cxnSpLocks noGrp="1" noRot="1" noChangeAspect="1" noMove="1" noResize="1" noEditPoints="1" noAdjustHandles="1" noChangeArrowheads="1" noChangeShapeType="1"/>
+          </p:cNvCxnSpPr>
+          <p:nvPr>
+            <p:extLst>
+              <p:ext uri="{386F3935-93C4-4BCD-93E2-E3B085C9AB24}">
+                <p16:designElem xmlns:p16="http://schemas.microsoft.com/office/powerpoint/2015/main" val="1"/>
+              </p:ext>
+            </p:extLst>
+          </p:nvPr>
+        </p:nvCxnSpPr>
+        <p:spPr>
+          <a:xfrm flipH="1">
+            <a:off x="7235825" y="228600"/>
+            <a:ext cx="4953000" cy="4953000"/>
+          </a:xfrm>
+          <a:prstGeom prst="line">
+            <a:avLst/>
+          </a:prstGeom>
+          <a:ln w="12700">
+            <a:solidFill>
+              <a:schemeClr val="tx1"/>
+            </a:solidFill>
+          </a:ln>
+        </p:spPr>
+        <p:style>
+          <a:lnRef idx="2">
+            <a:schemeClr val="accent1"/>
+          </a:lnRef>
+          <a:fillRef idx="0">
+            <a:schemeClr val="accent1"/>
+          </a:fillRef>
+          <a:effectRef idx="1">
+            <a:schemeClr val="accent1"/>
+          </a:effectRef>
+          <a:fontRef idx="minor">
+            <a:schemeClr val="tx1"/>
+          </a:fontRef>
+        </p:style>
+      </p:cxnSp>
+      <p:cxnSp>
+        <p:nvCxnSpPr>
+          <p:cNvPr id="20" name="Straight Connector 19">
+            <a:extLst>
+              <a:ext uri="{FF2B5EF4-FFF2-40B4-BE49-F238E27FC236}">
+                <a16:creationId xmlns:a16="http://schemas.microsoft.com/office/drawing/2014/main" id="{2BE668D0-D906-4EEE-B32F-8C028624B837}"/>
+              </a:ext>
+              <a:ext uri="{C183D7F6-B498-43B3-948B-1728B52AA6E4}">
+                <adec:decorative xmlns:adec="http://schemas.microsoft.com/office/drawing/2017/decorative" val="1"/>
+              </a:ext>
+            </a:extLst>
+          </p:cNvPr>
+          <p:cNvCxnSpPr>
+            <a:cxnSpLocks noGrp="1" noRot="1" noChangeAspect="1" noMove="1" noResize="1" noEditPoints="1" noAdjustHandles="1" noChangeArrowheads="1" noChangeShapeType="1"/>
+          </p:cNvCxnSpPr>
+          <p:nvPr>
+            <p:extLst>
+              <p:ext uri="{386F3935-93C4-4BCD-93E2-E3B085C9AB24}">
+                <p16:designElem xmlns:p16="http://schemas.microsoft.com/office/powerpoint/2015/main" val="1"/>
+              </p:ext>
+            </p:extLst>
+          </p:nvPr>
+        </p:nvCxnSpPr>
+        <p:spPr>
+          <a:xfrm flipH="1">
+            <a:off x="7335837" y="32278"/>
+            <a:ext cx="4852989" cy="4852989"/>
+          </a:xfrm>
+          <a:prstGeom prst="line">
+            <a:avLst/>
+          </a:prstGeom>
+          <a:ln w="31750">
+            <a:solidFill>
+              <a:schemeClr val="tx1"/>
+            </a:solidFill>
+          </a:ln>
+        </p:spPr>
+        <p:style>
+          <a:lnRef idx="2">
+            <a:schemeClr val="accent1"/>
+          </a:lnRef>
+          <a:fillRef idx="0">
+            <a:schemeClr val="accent1"/>
+          </a:fillRef>
+          <a:effectRef idx="1">
+            <a:schemeClr val="accent1"/>
+          </a:effectRef>
+          <a:fontRef idx="minor">
+            <a:schemeClr val="tx1"/>
+          </a:fontRef>
+        </p:style>
+      </p:cxnSp>
+      <p:cxnSp>
+        <p:nvCxnSpPr>
+          <p:cNvPr id="22" name="Straight Connector 21">
+            <a:extLst>
+              <a:ext uri="{FF2B5EF4-FFF2-40B4-BE49-F238E27FC236}">
+                <a16:creationId xmlns:a16="http://schemas.microsoft.com/office/drawing/2014/main" id="{D1DE67A3-B8F6-4CFD-A8E0-D15200F23152}"/>
+              </a:ext>
+              <a:ext uri="{C183D7F6-B498-43B3-948B-1728B52AA6E4}">
+                <adec:decorative xmlns:adec="http://schemas.microsoft.com/office/drawing/2017/decorative" val="1"/>
+              </a:ext>
+            </a:extLst>
+          </p:cNvPr>
+          <p:cNvCxnSpPr>
+            <a:cxnSpLocks noGrp="1" noRot="1" noChangeAspect="1" noMove="1" noResize="1" noEditPoints="1" noAdjustHandles="1" noChangeArrowheads="1" noChangeShapeType="1"/>
+          </p:cNvCxnSpPr>
+          <p:nvPr>
+            <p:extLst>
+              <p:ext uri="{386F3935-93C4-4BCD-93E2-E3B085C9AB24}">
+                <p16:designElem xmlns:p16="http://schemas.microsoft.com/office/powerpoint/2015/main" val="1"/>
+              </p:ext>
+            </p:extLst>
+          </p:nvPr>
+        </p:nvCxnSpPr>
+        <p:spPr>
+          <a:xfrm flipH="1">
+            <a:off x="7845426" y="609601"/>
+            <a:ext cx="4343399" cy="4343399"/>
+          </a:xfrm>
+          <a:prstGeom prst="line">
+            <a:avLst/>
+          </a:prstGeom>
+          <a:ln w="31750">
+            <a:solidFill>
+              <a:schemeClr val="tx1"/>
+            </a:solidFill>
+          </a:ln>
+        </p:spPr>
+        <p:style>
+          <a:lnRef idx="2">
+            <a:schemeClr val="accent1"/>
+          </a:lnRef>
+          <a:fillRef idx="0">
+            <a:schemeClr val="accent1"/>
+          </a:fillRef>
+          <a:effectRef idx="1">
+            <a:schemeClr val="accent1"/>
+          </a:effectRef>
+          <a:fontRef idx="minor">
+            <a:schemeClr val="tx1"/>
+          </a:fontRef>
+        </p:style>
+      </p:cxnSp>
+      <p:sp>
+        <p:nvSpPr>
+          <p:cNvPr id="24" name="Rectangle 23">
+            <a:extLst>
+              <a:ext uri="{FF2B5EF4-FFF2-40B4-BE49-F238E27FC236}">
+                <a16:creationId xmlns:a16="http://schemas.microsoft.com/office/drawing/2014/main" id="{991E317B-75E3-4171-A07A-B263C1D6DCA5}"/>
+              </a:ext>
+              <a:ext uri="{C183D7F6-B498-43B3-948B-1728B52AA6E4}">
+                <adec:decorative xmlns:adec="http://schemas.microsoft.com/office/drawing/2017/decorative" val="1"/>
+              </a:ext>
+            </a:extLst>
+          </p:cNvPr>
+          <p:cNvSpPr>
+            <a:spLocks noGrp="1" noRot="1" noChangeAspect="1" noMove="1" noResize="1" noEditPoints="1" noAdjustHandles="1" noChangeArrowheads="1" noChangeShapeType="1" noTextEdit="1"/>
+          </p:cNvSpPr>
+          <p:nvPr>
+            <p:extLst>
+              <p:ext uri="{386F3935-93C4-4BCD-93E2-E3B085C9AB24}">
+                <p16:designElem xmlns:p16="http://schemas.microsoft.com/office/powerpoint/2015/main" val="1"/>
+              </p:ext>
+            </p:extLst>
+          </p:nvPr>
+        </p:nvSpPr>
+        <p:spPr>
+          <a:xfrm>
+            <a:off x="0" y="0"/>
+            <a:ext cx="12192000" cy="6858000"/>
+          </a:xfrm>
+          <a:prstGeom prst="rect">
+            <a:avLst/>
+          </a:prstGeom>
+          <a:ln>
+            <a:noFill/>
+          </a:ln>
+        </p:spPr>
+        <p:style>
+          <a:lnRef idx="2">
+            <a:schemeClr val="accent1">
+              <a:shade val="50000"/>
+            </a:schemeClr>
+          </a:lnRef>
+          <a:fillRef idx="1002">
+            <a:schemeClr val="dk2"/>
+          </a:fillRef>
+          <a:effectRef idx="0">
+            <a:schemeClr val="accent1"/>
+          </a:effectRef>
+          <a:fontRef idx="minor">
+            <a:schemeClr val="lt1"/>
+          </a:fontRef>
+        </p:style>
+        <p:txBody>
+          <a:bodyPr rtlCol="0" anchor="ctr"/>
+          <a:lstStyle/>
+          <a:p>
+            <a:pPr algn="ctr"/>
+            <a:endParaRPr lang="en-US"/>
+          </a:p>
+        </p:txBody>
+      </p:sp>
+      <p:sp>
+        <p:nvSpPr>
+          <p:cNvPr id="5" name="Title 4">
+            <a:extLst>
+              <a:ext uri="{FF2B5EF4-FFF2-40B4-BE49-F238E27FC236}">
+                <a16:creationId xmlns:a16="http://schemas.microsoft.com/office/drawing/2014/main" id="{AD6EA5B1-2E75-4FA5-970C-B66A7C4BAFB1}"/>
+              </a:ext>
+            </a:extLst>
+          </p:cNvPr>
+          <p:cNvSpPr>
+            <a:spLocks noGrp="1"/>
+          </p:cNvSpPr>
+          <p:nvPr>
+            <p:ph type="title"/>
+          </p:nvPr>
+        </p:nvSpPr>
+        <p:spPr>
+          <a:xfrm>
+            <a:off x="7532710" y="628617"/>
+            <a:ext cx="3971902" cy="3028983"/>
+          </a:xfrm>
+        </p:spPr>
+        <p:txBody>
+          <a:bodyPr vert="horz" lIns="91440" tIns="45720" rIns="91440" bIns="45720" rtlCol="0" anchor="b">
+            <a:normAutofit/>
+          </a:bodyPr>
+          <a:lstStyle/>
+          <a:p>
+            <a:endParaRPr lang="en-US" sz="4800">
+              <a:solidFill>
+                <a:srgbClr val="FFFFFF"/>
+              </a:solidFill>
+            </a:endParaRPr>
+          </a:p>
+        </p:txBody>
+      </p:sp>
+      <p:sp useBgFill="1">
+        <p:nvSpPr>
+          <p:cNvPr id="26" name="Snip Diagonal Corner Rectangle 6">
+            <a:extLst>
+              <a:ext uri="{FF2B5EF4-FFF2-40B4-BE49-F238E27FC236}">
+                <a16:creationId xmlns:a16="http://schemas.microsoft.com/office/drawing/2014/main" id="{4A9B19C2-B29A-4924-9E7E-6FBF17F5854E}"/>
+              </a:ext>
+              <a:ext uri="{C183D7F6-B498-43B3-948B-1728B52AA6E4}">
+                <adec:decorative xmlns:adec="http://schemas.microsoft.com/office/drawing/2017/decorative" val="1"/>
+              </a:ext>
+            </a:extLst>
+          </p:cNvPr>
+          <p:cNvSpPr>
+            <a:spLocks noGrp="1" noRot="1" noChangeAspect="1" noMove="1" noResize="1" noEditPoints="1" noAdjustHandles="1" noChangeArrowheads="1" noChangeShapeType="1" noTextEdit="1"/>
+          </p:cNvSpPr>
+          <p:nvPr>
+            <p:extLst>
+              <p:ext uri="{386F3935-93C4-4BCD-93E2-E3B085C9AB24}">
+                <p16:designElem xmlns:p16="http://schemas.microsoft.com/office/powerpoint/2015/main" val="1"/>
+              </p:ext>
+            </p:extLst>
+          </p:nvPr>
+        </p:nvSpPr>
+        <p:spPr>
+          <a:xfrm>
+            <a:off x="634000" y="620722"/>
+            <a:ext cx="6418778" cy="5286838"/>
+          </a:xfrm>
+          <a:prstGeom prst="snip2DiagRect">
+            <a:avLst>
+              <a:gd name="adj1" fmla="val 10973"/>
+              <a:gd name="adj2" fmla="val 0"/>
+            </a:avLst>
+          </a:prstGeom>
+          <a:ln>
+            <a:noFill/>
+          </a:ln>
+          <a:effectLst>
+            <a:innerShdw blurRad="57150" dist="38100" dir="14460000">
+              <a:prstClr val="black">
+                <a:alpha val="70000"/>
+              </a:prstClr>
+            </a:innerShdw>
+          </a:effectLst>
+        </p:spPr>
+        <p:style>
+          <a:lnRef idx="2">
+            <a:schemeClr val="accent1">
+              <a:shade val="50000"/>
+            </a:schemeClr>
+          </a:lnRef>
+          <a:fillRef idx="1">
+            <a:schemeClr val="accent1"/>
+          </a:fillRef>
+          <a:effectRef idx="0">
+            <a:schemeClr val="accent1"/>
+          </a:effectRef>
+          <a:fontRef idx="minor">
+            <a:schemeClr val="lt1"/>
+          </a:fontRef>
+        </p:style>
+        <p:txBody>
+          <a:bodyPr rtlCol="0" anchor="ctr"/>
+          <a:lstStyle/>
+          <a:p>
+            <a:pPr algn="ctr"/>
+            <a:endParaRPr lang="en-US"/>
+          </a:p>
+        </p:txBody>
+      </p:sp>
+      <p:pic>
+        <p:nvPicPr>
+          <p:cNvPr id="9" name="Content Placeholder 8" descr="Chart&#10;&#10;Description automatically generated">
+            <a:extLst>
+              <a:ext uri="{FF2B5EF4-FFF2-40B4-BE49-F238E27FC236}">
+                <a16:creationId xmlns:a16="http://schemas.microsoft.com/office/drawing/2014/main" id="{F0D77673-A291-410C-8F77-AD1E73CF908E}"/>
+              </a:ext>
+            </a:extLst>
+          </p:cNvPr>
+          <p:cNvPicPr>
+            <a:picLocks noGrp="1" noChangeAspect="1"/>
+          </p:cNvPicPr>
+          <p:nvPr>
+            <p:ph idx="1"/>
+          </p:nvPr>
+        </p:nvPicPr>
+        <p:blipFill>
+          <a:blip r:embed="rId2">
+            <a:extLst>
+              <a:ext uri="{28A0092B-C50C-407E-A947-70E740481C1C}">
+                <a14:useLocalDpi xmlns:a14="http://schemas.microsoft.com/office/drawing/2010/main" val="0"/>
+              </a:ext>
+            </a:extLst>
+          </a:blip>
+          <a:stretch>
+            <a:fillRect/>
+          </a:stretch>
+        </p:blipFill>
+        <p:spPr>
+          <a:xfrm>
+            <a:off x="1101217" y="1447329"/>
+            <a:ext cx="5450437" cy="3633624"/>
+          </a:xfrm>
+          <a:prstGeom prst="rect">
+            <a:avLst/>
+          </a:prstGeom>
+        </p:spPr>
+      </p:pic>
+      <p:grpSp>
+        <p:nvGrpSpPr>
+          <p:cNvPr id="28" name="Group 27">
+            <a:extLst>
+              <a:ext uri="{FF2B5EF4-FFF2-40B4-BE49-F238E27FC236}">
+                <a16:creationId xmlns:a16="http://schemas.microsoft.com/office/drawing/2014/main" id="{34C85634-D5F5-4047-8F35-F4B1F50AB1A7}"/>
+              </a:ext>
+              <a:ext uri="{C183D7F6-B498-43B3-948B-1728B52AA6E4}">
+                <adec:decorative xmlns:adec="http://schemas.microsoft.com/office/drawing/2017/decorative" val="1"/>
+              </a:ext>
+            </a:extLst>
+          </p:cNvPr>
+          <p:cNvGrpSpPr>
+            <a:grpSpLocks noGrp="1" noUngrp="1" noRot="1" noChangeAspect="1" noMove="1" noResize="1"/>
+          </p:cNvGrpSpPr>
+          <p:nvPr>
+            <p:extLst>
+              <p:ext uri="{386F3935-93C4-4BCD-93E2-E3B085C9AB24}">
+                <p16:designElem xmlns:p16="http://schemas.microsoft.com/office/powerpoint/2015/main" val="1"/>
+              </p:ext>
+            </p:extLst>
+          </p:nvPr>
+        </p:nvGrpSpPr>
+        <p:grpSpPr>
+          <a:xfrm>
+            <a:off x="9206969" y="2963333"/>
+            <a:ext cx="2981858" cy="3208867"/>
+            <a:chOff x="9206969" y="2963333"/>
+            <a:chExt cx="2981858" cy="3208867"/>
+          </a:xfrm>
+        </p:grpSpPr>
+        <p:cxnSp>
+          <p:nvCxnSpPr>
+            <p:cNvPr id="29" name="Straight Connector 28">
+              <a:extLst>
+                <a:ext uri="{FF2B5EF4-FFF2-40B4-BE49-F238E27FC236}">
+                  <a16:creationId xmlns:a16="http://schemas.microsoft.com/office/drawing/2014/main" id="{1224BF71-948F-411D-AA79-8B2315715197}"/>
+                </a:ext>
+                <a:ext uri="{C183D7F6-B498-43B3-948B-1728B52AA6E4}">
+                  <adec:decorative xmlns:adec="http://schemas.microsoft.com/office/drawing/2017/decorative" val="1"/>
+                </a:ext>
+              </a:extLst>
+            </p:cNvPr>
+            <p:cNvCxnSpPr/>
+            <p:nvPr>
+              <p:extLst>
+                <p:ext uri="{386F3935-93C4-4BCD-93E2-E3B085C9AB24}">
+                  <p16:designElem xmlns:p16="http://schemas.microsoft.com/office/powerpoint/2015/main" val="1"/>
+                </p:ext>
+              </p:extLst>
+            </p:nvPr>
+          </p:nvCxnSpPr>
+          <p:spPr>
+            <a:xfrm flipH="1">
+              <a:off x="11276012" y="2963333"/>
+              <a:ext cx="912814" cy="912812"/>
+            </a:xfrm>
+            <a:prstGeom prst="line">
+              <a:avLst/>
+            </a:prstGeom>
+            <a:ln w="9525">
+              <a:solidFill>
+                <a:srgbClr val="FFFFFF"/>
+              </a:solidFill>
+            </a:ln>
+          </p:spPr>
+          <p:style>
+            <a:lnRef idx="2">
+              <a:schemeClr val="accent1"/>
+            </a:lnRef>
+            <a:fillRef idx="0">
+              <a:schemeClr val="accent1"/>
+            </a:fillRef>
+            <a:effectRef idx="1">
+              <a:schemeClr val="accent1"/>
+            </a:effectRef>
+            <a:fontRef idx="minor">
+              <a:schemeClr val="tx1"/>
+            </a:fontRef>
+          </p:style>
+        </p:cxnSp>
+        <p:cxnSp>
+          <p:nvCxnSpPr>
+            <p:cNvPr id="30" name="Straight Connector 29">
+              <a:extLst>
+                <a:ext uri="{FF2B5EF4-FFF2-40B4-BE49-F238E27FC236}">
+                  <a16:creationId xmlns:a16="http://schemas.microsoft.com/office/drawing/2014/main" id="{434B4526-E715-4199-A597-CD757CB4A026}"/>
+                </a:ext>
+                <a:ext uri="{C183D7F6-B498-43B3-948B-1728B52AA6E4}">
+                  <adec:decorative xmlns:adec="http://schemas.microsoft.com/office/drawing/2017/decorative" val="1"/>
+                </a:ext>
+              </a:extLst>
+            </p:cNvPr>
+            <p:cNvCxnSpPr/>
+            <p:nvPr>
+              <p:extLst>
+                <p:ext uri="{386F3935-93C4-4BCD-93E2-E3B085C9AB24}">
+                  <p16:designElem xmlns:p16="http://schemas.microsoft.com/office/powerpoint/2015/main" val="1"/>
+                </p:ext>
+              </p:extLst>
+            </p:nvPr>
+          </p:nvCxnSpPr>
+          <p:spPr>
+            <a:xfrm flipH="1">
+              <a:off x="9206969" y="3190344"/>
+              <a:ext cx="2981857" cy="2981856"/>
+            </a:xfrm>
+            <a:prstGeom prst="line">
+              <a:avLst/>
+            </a:prstGeom>
+            <a:ln w="9525">
+              <a:solidFill>
+                <a:srgbClr val="FFFFFF"/>
+              </a:solidFill>
+            </a:ln>
+          </p:spPr>
+          <p:style>
+            <a:lnRef idx="2">
+              <a:schemeClr val="accent1"/>
+            </a:lnRef>
+            <a:fillRef idx="0">
+              <a:schemeClr val="accent1"/>
+            </a:fillRef>
+            <a:effectRef idx="1">
+              <a:schemeClr val="accent1"/>
+            </a:effectRef>
+            <a:fontRef idx="minor">
+              <a:schemeClr val="tx1"/>
+            </a:fontRef>
+          </p:style>
+        </p:cxnSp>
+        <p:cxnSp>
+          <p:nvCxnSpPr>
+            <p:cNvPr id="31" name="Straight Connector 30">
+              <a:extLst>
+                <a:ext uri="{FF2B5EF4-FFF2-40B4-BE49-F238E27FC236}">
+                  <a16:creationId xmlns:a16="http://schemas.microsoft.com/office/drawing/2014/main" id="{35E295A6-48D5-4F9E-A32C-5D87EAA5E7E7}"/>
+                </a:ext>
+                <a:ext uri="{C183D7F6-B498-43B3-948B-1728B52AA6E4}">
+                  <adec:decorative xmlns:adec="http://schemas.microsoft.com/office/drawing/2017/decorative" val="1"/>
+                </a:ext>
+              </a:extLst>
+            </p:cNvPr>
+            <p:cNvCxnSpPr/>
+            <p:nvPr>
+              <p:extLst>
+                <p:ext uri="{386F3935-93C4-4BCD-93E2-E3B085C9AB24}">
+                  <p16:designElem xmlns:p16="http://schemas.microsoft.com/office/powerpoint/2015/main" val="1"/>
+                </p:ext>
+              </p:extLst>
+            </p:nvPr>
+          </p:nvCxnSpPr>
+          <p:spPr>
+            <a:xfrm flipH="1">
+              <a:off x="10292292" y="3285067"/>
+              <a:ext cx="1896534" cy="1896533"/>
+            </a:xfrm>
+            <a:prstGeom prst="line">
+              <a:avLst/>
+            </a:prstGeom>
+            <a:ln w="9525">
+              <a:solidFill>
+                <a:srgbClr val="FFFFFF"/>
+              </a:solidFill>
+            </a:ln>
+          </p:spPr>
+          <p:style>
+            <a:lnRef idx="2">
+              <a:schemeClr val="accent1"/>
+            </a:lnRef>
+            <a:fillRef idx="0">
+              <a:schemeClr val="accent1"/>
+            </a:fillRef>
+            <a:effectRef idx="1">
+              <a:schemeClr val="accent1"/>
+            </a:effectRef>
+            <a:fontRef idx="minor">
+              <a:schemeClr val="tx1"/>
+            </a:fontRef>
+          </p:style>
+        </p:cxnSp>
+        <p:cxnSp>
+          <p:nvCxnSpPr>
+            <p:cNvPr id="32" name="Straight Connector 31">
+              <a:extLst>
+                <a:ext uri="{FF2B5EF4-FFF2-40B4-BE49-F238E27FC236}">
+                  <a16:creationId xmlns:a16="http://schemas.microsoft.com/office/drawing/2014/main" id="{E10BF5B3-9260-4D36-BB24-07BC414B9D49}"/>
+                </a:ext>
+                <a:ext uri="{C183D7F6-B498-43B3-948B-1728B52AA6E4}">
+                  <adec:decorative xmlns:adec="http://schemas.microsoft.com/office/drawing/2017/decorative" val="1"/>
+                </a:ext>
+              </a:extLst>
+            </p:cNvPr>
+            <p:cNvCxnSpPr/>
+            <p:nvPr>
+              <p:extLst>
+                <p:ext uri="{386F3935-93C4-4BCD-93E2-E3B085C9AB24}">
+                  <p16:designElem xmlns:p16="http://schemas.microsoft.com/office/powerpoint/2015/main" val="1"/>
+                </p:ext>
+              </p:extLst>
+            </p:nvPr>
+          </p:nvCxnSpPr>
+          <p:spPr>
+            <a:xfrm flipH="1">
+              <a:off x="10443103" y="3131080"/>
+              <a:ext cx="1745722" cy="1745720"/>
+            </a:xfrm>
+            <a:prstGeom prst="line">
+              <a:avLst/>
+            </a:prstGeom>
+            <a:ln w="28575">
+              <a:solidFill>
+                <a:srgbClr val="FFFFFF"/>
+              </a:solidFill>
+            </a:ln>
+          </p:spPr>
+          <p:style>
+            <a:lnRef idx="2">
+              <a:schemeClr val="accent1"/>
+            </a:lnRef>
+            <a:fillRef idx="0">
+              <a:schemeClr val="accent1"/>
+            </a:fillRef>
+            <a:effectRef idx="1">
+              <a:schemeClr val="accent1"/>
+            </a:effectRef>
+            <a:fontRef idx="minor">
+              <a:schemeClr val="tx1"/>
+            </a:fontRef>
+          </p:style>
+        </p:cxnSp>
+        <p:cxnSp>
+          <p:nvCxnSpPr>
+            <p:cNvPr id="33" name="Straight Connector 32">
+              <a:extLst>
+                <a:ext uri="{FF2B5EF4-FFF2-40B4-BE49-F238E27FC236}">
+                  <a16:creationId xmlns:a16="http://schemas.microsoft.com/office/drawing/2014/main" id="{AAE0C886-FA2E-4E7C-BC00-8397AAEC865E}"/>
+                </a:ext>
+                <a:ext uri="{C183D7F6-B498-43B3-948B-1728B52AA6E4}">
+                  <adec:decorative xmlns:adec="http://schemas.microsoft.com/office/drawing/2017/decorative" val="1"/>
+                </a:ext>
+              </a:extLst>
+            </p:cNvPr>
+            <p:cNvCxnSpPr/>
+            <p:nvPr>
+              <p:extLst>
+                <p:ext uri="{386F3935-93C4-4BCD-93E2-E3B085C9AB24}">
+                  <p16:designElem xmlns:p16="http://schemas.microsoft.com/office/powerpoint/2015/main" val="1"/>
+                </p:ext>
+              </p:extLst>
+            </p:nvPr>
+          </p:nvCxnSpPr>
+          <p:spPr>
+            <a:xfrm flipH="1">
+              <a:off x="10918826" y="3683001"/>
+              <a:ext cx="1270001" cy="1269999"/>
+            </a:xfrm>
+            <a:prstGeom prst="line">
+              <a:avLst/>
+            </a:prstGeom>
+            <a:ln w="28575">
+              <a:solidFill>
+                <a:srgbClr val="FFFFFF"/>
+              </a:solidFill>
+            </a:ln>
+          </p:spPr>
+          <p:style>
+            <a:lnRef idx="2">
+              <a:schemeClr val="accent1"/>
+            </a:lnRef>
+            <a:fillRef idx="0">
+              <a:schemeClr val="accent1"/>
+            </a:fillRef>
+            <a:effectRef idx="1">
+              <a:schemeClr val="accent1"/>
+            </a:effectRef>
+            <a:fontRef idx="minor">
+              <a:schemeClr val="tx1"/>
+            </a:fontRef>
+          </p:style>
+        </p:cxnSp>
+      </p:grpSp>
+      <p:sp>
+        <p:nvSpPr>
+          <p:cNvPr id="7" name="Text Placeholder 6">
+            <a:extLst>
+              <a:ext uri="{FF2B5EF4-FFF2-40B4-BE49-F238E27FC236}">
+                <a16:creationId xmlns:a16="http://schemas.microsoft.com/office/drawing/2014/main" id="{EABD8C46-60DB-4D71-9B99-0F89FF49BE7B}"/>
+              </a:ext>
+            </a:extLst>
+          </p:cNvPr>
+          <p:cNvSpPr>
+            <a:spLocks noGrp="1"/>
+          </p:cNvSpPr>
+          <p:nvPr>
+            <p:ph type="body" sz="half" idx="2"/>
+          </p:nvPr>
+        </p:nvSpPr>
+        <p:spPr/>
+        <p:txBody>
+          <a:bodyPr/>
+          <a:lstStyle/>
+          <a:p>
+            <a:endParaRPr lang="en-US"/>
+          </a:p>
+        </p:txBody>
+      </p:sp>
+    </p:spTree>
+    <p:extLst>
+      <p:ext uri="{BB962C8B-B14F-4D97-AF65-F5344CB8AC3E}">
+        <p14:creationId xmlns:p14="http://schemas.microsoft.com/office/powerpoint/2010/main" val="3656836066"/>
+      </p:ext>
+    </p:extLst>
+  </p:cSld>
+  <p:clrMapOvr>
+    <a:overrideClrMapping bg1="lt1" tx1="dk1" bg2="lt2" tx2="dk2" accent1="accent1" accent2="accent2" accent3="accent3" accent4="accent4" accent5="accent5" accent6="accent6" hlink="hlink" folHlink="folHlink"/>
+  </p:clrMapOvr>
+</p:sld>
+</file>
+
 <file path=ppt/theme/theme1.xml><?xml version="1.0" encoding="utf-8"?>
 <a:theme xmlns:a="http://schemas.openxmlformats.org/drawingml/2006/main" name="Slice">
   <a:themeElements>

</xml_diff>

<commit_message>
Add team profile PowerPoint slide
</commit_message>
<xml_diff>
--- a/StockPowerPointSlideMockup.pptx
+++ b/StockPowerPointSlideMockup.pptx
@@ -11,6 +11,7 @@
     <p:sldId id="259" r:id="rId5"/>
     <p:sldId id="260" r:id="rId6"/>
     <p:sldId id="261" r:id="rId7"/>
+    <p:sldId id="262" r:id="rId8"/>
   </p:sldIdLst>
   <p:sldSz cx="12192000" cy="6858000"/>
   <p:notesSz cx="6858000" cy="9144000"/>
@@ -9395,6 +9396,472 @@
 </p:sld>
 </file>
 
+<file path=ppt/slides/slide7.xml><?xml version="1.0" encoding="utf-8"?>
+<p:sld xmlns:a="http://schemas.openxmlformats.org/drawingml/2006/main" xmlns:r="http://schemas.openxmlformats.org/officeDocument/2006/relationships" xmlns:p="http://schemas.openxmlformats.org/presentationml/2006/main">
+  <p:cSld>
+    <p:spTree>
+      <p:nvGrpSpPr>
+        <p:cNvPr id="1" name=""/>
+        <p:cNvGrpSpPr/>
+        <p:nvPr/>
+      </p:nvGrpSpPr>
+      <p:grpSpPr>
+        <a:xfrm>
+          <a:off x="0" y="0"/>
+          <a:ext cx="0" cy="0"/>
+          <a:chOff x="0" y="0"/>
+          <a:chExt cx="0" cy="0"/>
+        </a:xfrm>
+      </p:grpSpPr>
+      <p:sp>
+        <p:nvSpPr>
+          <p:cNvPr id="2" name="Title 1">
+            <a:extLst>
+              <a:ext uri="{FF2B5EF4-FFF2-40B4-BE49-F238E27FC236}">
+                <a16:creationId xmlns:a16="http://schemas.microsoft.com/office/drawing/2014/main" id="{6CBE862C-82C3-4133-B194-BB8D5564D871}"/>
+              </a:ext>
+            </a:extLst>
+          </p:cNvPr>
+          <p:cNvSpPr>
+            <a:spLocks noGrp="1"/>
+          </p:cNvSpPr>
+          <p:nvPr>
+            <p:ph type="title"/>
+          </p:nvPr>
+        </p:nvSpPr>
+        <p:spPr/>
+        <p:txBody>
+          <a:bodyPr/>
+          <a:lstStyle/>
+          <a:p>
+            <a:r>
+              <a:rPr lang="en-US" dirty="0"/>
+              <a:t>Team 6 Analysts</a:t>
+            </a:r>
+          </a:p>
+        </p:txBody>
+      </p:sp>
+      <p:pic>
+        <p:nvPicPr>
+          <p:cNvPr id="6" name="Content Placeholder 5" descr="A person wearing a uniform&#10;&#10;Description automatically generated with low confidence">
+            <a:extLst>
+              <a:ext uri="{FF2B5EF4-FFF2-40B4-BE49-F238E27FC236}">
+                <a16:creationId xmlns:a16="http://schemas.microsoft.com/office/drawing/2014/main" id="{480EC34A-A090-4DEF-AD49-6EA6CFF45BD8}"/>
+              </a:ext>
+            </a:extLst>
+          </p:cNvPr>
+          <p:cNvPicPr>
+            <a:picLocks noGrp="1" noChangeAspect="1"/>
+          </p:cNvPicPr>
+          <p:nvPr>
+            <p:ph idx="1"/>
+          </p:nvPr>
+        </p:nvPicPr>
+        <p:blipFill>
+          <a:blip r:embed="rId2">
+            <a:extLst>
+              <a:ext uri="{28A0092B-C50C-407E-A947-70E740481C1C}">
+                <a14:useLocalDpi xmlns:a14="http://schemas.microsoft.com/office/drawing/2010/main" val="0"/>
+              </a:ext>
+            </a:extLst>
+          </a:blip>
+          <a:stretch>
+            <a:fillRect/>
+          </a:stretch>
+        </p:blipFill>
+        <p:spPr>
+          <a:xfrm>
+            <a:off x="1032436" y="5065713"/>
+            <a:ext cx="1106487" cy="1106487"/>
+          </a:xfrm>
+          <a:prstGeom prst="ellipse">
+            <a:avLst/>
+          </a:prstGeom>
+          <a:ln w="63500" cap="rnd">
+            <a:solidFill>
+              <a:schemeClr val="bg2"/>
+            </a:solidFill>
+          </a:ln>
+          <a:effectLst>
+            <a:outerShdw blurRad="381000" dist="292100" dir="5400000" sx="-80000" sy="-18000" rotWithShape="0">
+              <a:srgbClr val="000000">
+                <a:alpha val="22000"/>
+              </a:srgbClr>
+            </a:outerShdw>
+          </a:effectLst>
+          <a:scene3d>
+            <a:camera prst="orthographicFront"/>
+            <a:lightRig rig="contrasting" dir="t">
+              <a:rot lat="0" lon="0" rev="3000000"/>
+            </a:lightRig>
+          </a:scene3d>
+          <a:sp3d contourW="7620">
+            <a:bevelT w="95250" h="31750"/>
+            <a:contourClr>
+              <a:srgbClr val="333333"/>
+            </a:contourClr>
+          </a:sp3d>
+        </p:spPr>
+      </p:pic>
+      <p:sp>
+        <p:nvSpPr>
+          <p:cNvPr id="4" name="Text Placeholder 3">
+            <a:extLst>
+              <a:ext uri="{FF2B5EF4-FFF2-40B4-BE49-F238E27FC236}">
+                <a16:creationId xmlns:a16="http://schemas.microsoft.com/office/drawing/2014/main" id="{BE93A2DA-6AC4-48BB-93CE-4EEC0A83C825}"/>
+              </a:ext>
+            </a:extLst>
+          </p:cNvPr>
+          <p:cNvSpPr>
+            <a:spLocks noGrp="1"/>
+          </p:cNvSpPr>
+          <p:nvPr>
+            <p:ph type="body" sz="half" idx="2"/>
+          </p:nvPr>
+        </p:nvSpPr>
+        <p:spPr/>
+        <p:txBody>
+          <a:bodyPr/>
+          <a:lstStyle/>
+          <a:p>
+            <a:r>
+              <a:rPr lang="en-US" dirty="0"/>
+              <a:t>Team 6 Analytical Group uses data to explain how world and national events affect the financial markets. </a:t>
+            </a:r>
+          </a:p>
+          <a:p>
+            <a:r>
+              <a:rPr lang="en-US" dirty="0"/>
+              <a:t>Contact us for your next research project.</a:t>
+            </a:r>
+          </a:p>
+        </p:txBody>
+      </p:sp>
+      <p:pic>
+        <p:nvPicPr>
+          <p:cNvPr id="10" name="Picture 9">
+            <a:extLst>
+              <a:ext uri="{FF2B5EF4-FFF2-40B4-BE49-F238E27FC236}">
+                <a16:creationId xmlns:a16="http://schemas.microsoft.com/office/drawing/2014/main" id="{7E5B45FD-07BB-492D-8DB4-C628F9CFCC66}"/>
+              </a:ext>
+            </a:extLst>
+          </p:cNvPr>
+          <p:cNvPicPr>
+            <a:picLocks noChangeAspect="1"/>
+          </p:cNvPicPr>
+          <p:nvPr/>
+        </p:nvPicPr>
+        <p:blipFill>
+          <a:blip r:embed="rId3"/>
+          <a:stretch>
+            <a:fillRect/>
+          </a:stretch>
+        </p:blipFill>
+        <p:spPr>
+          <a:xfrm>
+            <a:off x="479193" y="3673210"/>
+            <a:ext cx="1106487" cy="1106487"/>
+          </a:xfrm>
+          <a:prstGeom prst="ellipse">
+            <a:avLst/>
+          </a:prstGeom>
+          <a:ln w="63500" cap="rnd">
+            <a:solidFill>
+              <a:schemeClr val="bg2"/>
+            </a:solidFill>
+          </a:ln>
+          <a:effectLst>
+            <a:outerShdw blurRad="381000" dist="292100" dir="5400000" sx="-80000" sy="-18000" rotWithShape="0">
+              <a:srgbClr val="000000">
+                <a:alpha val="22000"/>
+              </a:srgbClr>
+            </a:outerShdw>
+          </a:effectLst>
+          <a:scene3d>
+            <a:camera prst="orthographicFront"/>
+            <a:lightRig rig="contrasting" dir="t">
+              <a:rot lat="0" lon="0" rev="3000000"/>
+            </a:lightRig>
+          </a:scene3d>
+          <a:sp3d contourW="7620">
+            <a:bevelT w="95250" h="31750"/>
+            <a:contourClr>
+              <a:srgbClr val="333333"/>
+            </a:contourClr>
+          </a:sp3d>
+        </p:spPr>
+      </p:pic>
+      <p:pic>
+        <p:nvPicPr>
+          <p:cNvPr id="11" name="Picture 10">
+            <a:extLst>
+              <a:ext uri="{FF2B5EF4-FFF2-40B4-BE49-F238E27FC236}">
+                <a16:creationId xmlns:a16="http://schemas.microsoft.com/office/drawing/2014/main" id="{30733EC8-B0EA-468A-A11F-4BF9037BAB07}"/>
+              </a:ext>
+            </a:extLst>
+          </p:cNvPr>
+          <p:cNvPicPr>
+            <a:picLocks noChangeAspect="1"/>
+          </p:cNvPicPr>
+          <p:nvPr/>
+        </p:nvPicPr>
+        <p:blipFill>
+          <a:blip r:embed="rId4"/>
+          <a:stretch>
+            <a:fillRect/>
+          </a:stretch>
+        </p:blipFill>
+        <p:spPr>
+          <a:xfrm>
+            <a:off x="1032437" y="2148945"/>
+            <a:ext cx="1106487" cy="1106487"/>
+          </a:xfrm>
+          <a:prstGeom prst="ellipse">
+            <a:avLst/>
+          </a:prstGeom>
+          <a:ln w="63500" cap="rnd">
+            <a:solidFill>
+              <a:schemeClr val="bg2"/>
+            </a:solidFill>
+          </a:ln>
+          <a:effectLst>
+            <a:outerShdw blurRad="381000" dist="292100" dir="5400000" sx="-80000" sy="-18000" rotWithShape="0">
+              <a:srgbClr val="000000">
+                <a:alpha val="22000"/>
+              </a:srgbClr>
+            </a:outerShdw>
+          </a:effectLst>
+          <a:scene3d>
+            <a:camera prst="orthographicFront"/>
+            <a:lightRig rig="contrasting" dir="t">
+              <a:rot lat="0" lon="0" rev="3000000"/>
+            </a:lightRig>
+          </a:scene3d>
+          <a:sp3d contourW="7620">
+            <a:bevelT w="95250" h="31750"/>
+            <a:contourClr>
+              <a:srgbClr val="333333"/>
+            </a:contourClr>
+          </a:sp3d>
+        </p:spPr>
+      </p:pic>
+      <p:pic>
+        <p:nvPicPr>
+          <p:cNvPr id="14" name="Picture 13" descr="A person with a beard&#10;&#10;Description automatically generated with low confidence">
+            <a:extLst>
+              <a:ext uri="{FF2B5EF4-FFF2-40B4-BE49-F238E27FC236}">
+                <a16:creationId xmlns:a16="http://schemas.microsoft.com/office/drawing/2014/main" id="{863DAAD5-85A8-4ACE-93EE-DB3B5D111923}"/>
+              </a:ext>
+            </a:extLst>
+          </p:cNvPr>
+          <p:cNvPicPr>
+            <a:picLocks noChangeAspect="1"/>
+          </p:cNvPicPr>
+          <p:nvPr/>
+        </p:nvPicPr>
+        <p:blipFill>
+          <a:blip r:embed="rId5">
+            <a:extLst>
+              <a:ext uri="{28A0092B-C50C-407E-A947-70E740481C1C}">
+                <a14:useLocalDpi xmlns:a14="http://schemas.microsoft.com/office/drawing/2010/main" val="0"/>
+              </a:ext>
+            </a:extLst>
+          </a:blip>
+          <a:stretch>
+            <a:fillRect/>
+          </a:stretch>
+        </p:blipFill>
+        <p:spPr>
+          <a:xfrm>
+            <a:off x="479194" y="685800"/>
+            <a:ext cx="1150944" cy="1106487"/>
+          </a:xfrm>
+          <a:prstGeom prst="ellipse">
+            <a:avLst/>
+          </a:prstGeom>
+          <a:ln w="63500" cap="rnd">
+            <a:solidFill>
+              <a:schemeClr val="bg2"/>
+            </a:solidFill>
+          </a:ln>
+          <a:effectLst>
+            <a:outerShdw blurRad="381000" dist="292100" dir="5400000" sx="-80000" sy="-18000" rotWithShape="0">
+              <a:srgbClr val="000000">
+                <a:alpha val="22000"/>
+              </a:srgbClr>
+            </a:outerShdw>
+          </a:effectLst>
+          <a:scene3d>
+            <a:camera prst="orthographicFront"/>
+            <a:lightRig rig="contrasting" dir="t">
+              <a:rot lat="0" lon="0" rev="3000000"/>
+            </a:lightRig>
+          </a:scene3d>
+          <a:sp3d contourW="7620">
+            <a:bevelT w="95250" h="31750"/>
+            <a:contourClr>
+              <a:srgbClr val="333333"/>
+            </a:contourClr>
+          </a:sp3d>
+        </p:spPr>
+      </p:pic>
+      <p:sp>
+        <p:nvSpPr>
+          <p:cNvPr id="15" name="TextBox 14">
+            <a:extLst>
+              <a:ext uri="{FF2B5EF4-FFF2-40B4-BE49-F238E27FC236}">
+                <a16:creationId xmlns:a16="http://schemas.microsoft.com/office/drawing/2014/main" id="{29F54FF5-2F9F-4B67-8A89-CA8A4090AEAF}"/>
+              </a:ext>
+            </a:extLst>
+          </p:cNvPr>
+          <p:cNvSpPr txBox="1"/>
+          <p:nvPr/>
+        </p:nvSpPr>
+        <p:spPr>
+          <a:xfrm>
+            <a:off x="2138923" y="685800"/>
+            <a:ext cx="3322077" cy="1077218"/>
+          </a:xfrm>
+          <a:prstGeom prst="rect">
+            <a:avLst/>
+          </a:prstGeom>
+          <a:noFill/>
+        </p:spPr>
+        <p:txBody>
+          <a:bodyPr wrap="square" rtlCol="0">
+            <a:spAutoFit/>
+          </a:bodyPr>
+          <a:lstStyle/>
+          <a:p>
+            <a:r>
+              <a:rPr lang="en-US" sz="1600" dirty="0"/>
+              <a:t>Luis Fernando Ruiz delves into government data and highlights what we need to know.</a:t>
+            </a:r>
+          </a:p>
+        </p:txBody>
+      </p:sp>
+      <p:sp>
+        <p:nvSpPr>
+          <p:cNvPr id="16" name="TextBox 15">
+            <a:extLst>
+              <a:ext uri="{FF2B5EF4-FFF2-40B4-BE49-F238E27FC236}">
+                <a16:creationId xmlns:a16="http://schemas.microsoft.com/office/drawing/2014/main" id="{A9C7F89D-E4F4-4DDF-BCA1-C18B932640C2}"/>
+              </a:ext>
+            </a:extLst>
+          </p:cNvPr>
+          <p:cNvSpPr txBox="1"/>
+          <p:nvPr/>
+        </p:nvSpPr>
+        <p:spPr>
+          <a:xfrm>
+            <a:off x="2507223" y="2040468"/>
+            <a:ext cx="3322077" cy="1323439"/>
+          </a:xfrm>
+          <a:prstGeom prst="rect">
+            <a:avLst/>
+          </a:prstGeom>
+          <a:noFill/>
+        </p:spPr>
+        <p:txBody>
+          <a:bodyPr wrap="square" rtlCol="0">
+            <a:spAutoFit/>
+          </a:bodyPr>
+          <a:lstStyle/>
+          <a:p>
+            <a:r>
+              <a:rPr lang="en-US" sz="1600" dirty="0" err="1"/>
+              <a:t>Phillecia</a:t>
+            </a:r>
+            <a:r>
+              <a:rPr lang="en-US" sz="1600" dirty="0"/>
+              <a:t> Qualls is our automotive sector guru and keeps an eye on who is  in front of the pack and who has been left on the side of the road.</a:t>
+            </a:r>
+          </a:p>
+        </p:txBody>
+      </p:sp>
+      <p:sp>
+        <p:nvSpPr>
+          <p:cNvPr id="17" name="TextBox 16">
+            <a:extLst>
+              <a:ext uri="{FF2B5EF4-FFF2-40B4-BE49-F238E27FC236}">
+                <a16:creationId xmlns:a16="http://schemas.microsoft.com/office/drawing/2014/main" id="{B1C8E6A2-68C5-44B2-840F-463B664CE58D}"/>
+              </a:ext>
+            </a:extLst>
+          </p:cNvPr>
+          <p:cNvSpPr txBox="1"/>
+          <p:nvPr/>
+        </p:nvSpPr>
+        <p:spPr>
+          <a:xfrm>
+            <a:off x="2138922" y="3560598"/>
+            <a:ext cx="3322077" cy="1077218"/>
+          </a:xfrm>
+          <a:prstGeom prst="rect">
+            <a:avLst/>
+          </a:prstGeom>
+          <a:noFill/>
+        </p:spPr>
+        <p:txBody>
+          <a:bodyPr wrap="square" rtlCol="0">
+            <a:spAutoFit/>
+          </a:bodyPr>
+          <a:lstStyle/>
+          <a:p>
+            <a:r>
+              <a:rPr lang="en-US" sz="1600" dirty="0"/>
+              <a:t>Karen Pearson is our healthcare sector guru and offers us a prognosis of the factors and the players in this space.</a:t>
+            </a:r>
+          </a:p>
+        </p:txBody>
+      </p:sp>
+      <p:sp>
+        <p:nvSpPr>
+          <p:cNvPr id="18" name="TextBox 17">
+            <a:extLst>
+              <a:ext uri="{FF2B5EF4-FFF2-40B4-BE49-F238E27FC236}">
+                <a16:creationId xmlns:a16="http://schemas.microsoft.com/office/drawing/2014/main" id="{CFC1BC62-76D3-4F7F-AE1C-BE6083D2FFBF}"/>
+              </a:ext>
+            </a:extLst>
+          </p:cNvPr>
+          <p:cNvSpPr txBox="1"/>
+          <p:nvPr/>
+        </p:nvSpPr>
+        <p:spPr>
+          <a:xfrm>
+            <a:off x="2507222" y="5065713"/>
+            <a:ext cx="3322077" cy="1077218"/>
+          </a:xfrm>
+          <a:prstGeom prst="rect">
+            <a:avLst/>
+          </a:prstGeom>
+          <a:noFill/>
+        </p:spPr>
+        <p:txBody>
+          <a:bodyPr wrap="square" rtlCol="0">
+            <a:spAutoFit/>
+          </a:bodyPr>
+          <a:lstStyle/>
+          <a:p>
+            <a:r>
+              <a:rPr lang="en-US" sz="1600" dirty="0"/>
+              <a:t>Dana Woodruff tracks the stock market’s reactions to news and events… what happened and why.</a:t>
+            </a:r>
+          </a:p>
+        </p:txBody>
+      </p:sp>
+    </p:spTree>
+    <p:extLst>
+      <p:ext uri="{BB962C8B-B14F-4D97-AF65-F5344CB8AC3E}">
+        <p14:creationId xmlns:p14="http://schemas.microsoft.com/office/powerpoint/2010/main" val="1992665179"/>
+      </p:ext>
+    </p:extLst>
+  </p:cSld>
+  <p:clrMapOvr>
+    <a:masterClrMapping/>
+  </p:clrMapOvr>
+</p:sld>
+</file>
+
 <file path=ppt/theme/theme1.xml><?xml version="1.0" encoding="utf-8"?>
 <a:theme xmlns:a="http://schemas.openxmlformats.org/drawingml/2006/main" name="Slice">
   <a:themeElements>

</xml_diff>

<commit_message>
PowerPoint and 2 Y-Axis plot
</commit_message>
<xml_diff>
--- a/StockPowerPointSlideMockup.pptx
+++ b/StockPowerPointSlideMockup.pptx
@@ -6,12 +6,16 @@
   </p:sldMasterIdLst>
   <p:sldIdLst>
     <p:sldId id="256" r:id="rId2"/>
-    <p:sldId id="257" r:id="rId3"/>
-    <p:sldId id="258" r:id="rId4"/>
-    <p:sldId id="259" r:id="rId5"/>
-    <p:sldId id="260" r:id="rId6"/>
-    <p:sldId id="261" r:id="rId7"/>
-    <p:sldId id="262" r:id="rId8"/>
+    <p:sldId id="263" r:id="rId3"/>
+    <p:sldId id="265" r:id="rId4"/>
+    <p:sldId id="264" r:id="rId5"/>
+    <p:sldId id="266" r:id="rId6"/>
+    <p:sldId id="257" r:id="rId7"/>
+    <p:sldId id="258" r:id="rId8"/>
+    <p:sldId id="259" r:id="rId9"/>
+    <p:sldId id="260" r:id="rId10"/>
+    <p:sldId id="261" r:id="rId11"/>
+    <p:sldId id="262" r:id="rId12"/>
   </p:sldIdLst>
   <p:sldSz cx="12192000" cy="6858000"/>
   <p:notesSz cx="6858000" cy="9144000"/>
@@ -111,6 +115,29 @@
     </a:lvl9pPr>
   </p:defaultTextStyle>
   <p:extLst>
+    <p:ext uri="{521415D9-36F7-43E2-AB2F-B90AF26B5E84}">
+      <p14:sectionLst xmlns:p14="http://schemas.microsoft.com/office/powerpoint/2010/main">
+        <p14:section name="Default Section" id="{433157F1-D0A2-40B3-B1B4-FEC409FC0428}">
+          <p14:sldIdLst>
+            <p14:sldId id="256"/>
+            <p14:sldId id="263"/>
+            <p14:sldId id="265"/>
+          </p14:sldIdLst>
+        </p14:section>
+        <p14:section name="Untitled Section" id="{5E42C5F6-A613-449B-8A99-1F3B84C0AFBB}">
+          <p14:sldIdLst>
+            <p14:sldId id="264"/>
+            <p14:sldId id="266"/>
+            <p14:sldId id="257"/>
+            <p14:sldId id="258"/>
+            <p14:sldId id="259"/>
+            <p14:sldId id="260"/>
+            <p14:sldId id="261"/>
+            <p14:sldId id="262"/>
+          </p14:sldIdLst>
+        </p14:section>
+      </p14:sectionLst>
+    </p:ext>
     <p:ext uri="{EFAFB233-063F-42B5-8137-9DF3F51BA10A}">
       <p15:sldGuideLst xmlns:p15="http://schemas.microsoft.com/office/powerpoint/2012/main"/>
     </p:ext>
@@ -309,7 +336,7 @@
           <a:p>
             <a:fld id="{2395C5C9-164C-46B3-A87E-7660D39D3106}" type="datetime2">
               <a:rPr lang="en-US" smtClean="0"/>
-              <a:t>Friday, December 18, 2020</a:t>
+              <a:t>Saturday, December 19, 2020</a:t>
             </a:fld>
             <a:endParaRPr lang="en-US" dirty="0"/>
           </a:p>
@@ -750,7 +777,7 @@
           <a:p>
             <a:fld id="{8DEA2CF1-0EB2-4673-802D-3371233E4A77}" type="datetime2">
               <a:rPr lang="en-US" smtClean="0"/>
-              <a:t>Friday, December 18, 2020</a:t>
+              <a:t>Saturday, December 19, 2020</a:t>
             </a:fld>
             <a:endParaRPr lang="en-US" dirty="0"/>
           </a:p>
@@ -1007,7 +1034,7 @@
           <a:p>
             <a:fld id="{8DEA2CF1-0EB2-4673-802D-3371233E4A77}" type="datetime2">
               <a:rPr lang="en-US" smtClean="0"/>
-              <a:t>Friday, December 18, 2020</a:t>
+              <a:t>Saturday, December 19, 2020</a:t>
             </a:fld>
             <a:endParaRPr lang="en-US" dirty="0"/>
           </a:p>
@@ -1322,7 +1349,7 @@
           <a:p>
             <a:fld id="{8DEA2CF1-0EB2-4673-802D-3371233E4A77}" type="datetime2">
               <a:rPr lang="en-US" smtClean="0"/>
-              <a:t>Friday, December 18, 2020</a:t>
+              <a:t>Saturday, December 19, 2020</a:t>
             </a:fld>
             <a:endParaRPr lang="en-US" dirty="0"/>
           </a:p>
@@ -1647,7 +1674,7 @@
           <a:p>
             <a:fld id="{8DEA2CF1-0EB2-4673-802D-3371233E4A77}" type="datetime2">
               <a:rPr lang="en-US" smtClean="0"/>
-              <a:t>Friday, December 18, 2020</a:t>
+              <a:t>Saturday, December 19, 2020</a:t>
             </a:fld>
             <a:endParaRPr lang="en-US" dirty="0"/>
           </a:p>
@@ -1956,7 +1983,7 @@
           <a:p>
             <a:fld id="{8DEA2CF1-0EB2-4673-802D-3371233E4A77}" type="datetime2">
               <a:rPr lang="en-US" smtClean="0"/>
-              <a:t>Friday, December 18, 2020</a:t>
+              <a:t>Saturday, December 19, 2020</a:t>
             </a:fld>
             <a:endParaRPr lang="en-US" dirty="0"/>
           </a:p>
@@ -2330,7 +2357,7 @@
           <a:p>
             <a:fld id="{8DEA2CF1-0EB2-4673-802D-3371233E4A77}" type="datetime2">
               <a:rPr lang="en-US" smtClean="0"/>
-              <a:t>Friday, December 18, 2020</a:t>
+              <a:t>Saturday, December 19, 2020</a:t>
             </a:fld>
             <a:endParaRPr lang="en-US" dirty="0"/>
           </a:p>
@@ -2511,7 +2538,7 @@
           <a:p>
             <a:fld id="{5B75179A-1E2B-41AB-B400-4F1B4022FAEE}" type="datetime2">
               <a:rPr lang="en-US" smtClean="0"/>
-              <a:t>Friday, December 18, 2020</a:t>
+              <a:t>Saturday, December 19, 2020</a:t>
             </a:fld>
             <a:endParaRPr lang="en-US"/>
           </a:p>
@@ -2694,7 +2721,7 @@
           <a:p>
             <a:fld id="{05681D0F-6595-4F14-8EF3-954CD87C797B}" type="datetime2">
               <a:rPr lang="en-US" smtClean="0"/>
-              <a:t>Friday, December 18, 2020</a:t>
+              <a:t>Saturday, December 19, 2020</a:t>
             </a:fld>
             <a:endParaRPr lang="en-US"/>
           </a:p>
@@ -2867,7 +2894,7 @@
           <a:p>
             <a:fld id="{4DDCFF8A-AAF8-4A12-8A91-9CA0EAF6CBB9}" type="datetime2">
               <a:rPr lang="en-US" smtClean="0"/>
-              <a:t>Friday, December 18, 2020</a:t>
+              <a:t>Saturday, December 19, 2020</a:t>
             </a:fld>
             <a:endParaRPr lang="en-US" dirty="0"/>
           </a:p>
@@ -3122,7 +3149,7 @@
           <a:p>
             <a:fld id="{ABCC25C3-021A-4B0B-8F70-0C181FE1CF45}" type="datetime2">
               <a:rPr lang="en-US" smtClean="0"/>
-              <a:t>Friday, December 18, 2020</a:t>
+              <a:t>Saturday, December 19, 2020</a:t>
             </a:fld>
             <a:endParaRPr lang="en-US"/>
           </a:p>
@@ -3363,7 +3390,7 @@
           <a:p>
             <a:fld id="{0C23D88D-8CEC-4ED9-A53B-5596187D9A16}" type="datetime2">
               <a:rPr lang="en-US" smtClean="0"/>
-              <a:t>Friday, December 18, 2020</a:t>
+              <a:t>Saturday, December 19, 2020</a:t>
             </a:fld>
             <a:endParaRPr lang="en-US"/>
           </a:p>
@@ -3748,7 +3775,7 @@
           <a:p>
             <a:fld id="{D2CCD382-DFDA-4722-A27A-59C21AD112F2}" type="datetime2">
               <a:rPr lang="en-US" smtClean="0"/>
-              <a:t>Friday, December 18, 2020</a:t>
+              <a:t>Saturday, December 19, 2020</a:t>
             </a:fld>
             <a:endParaRPr lang="en-US"/>
           </a:p>
@@ -3869,7 +3896,7 @@
           <a:p>
             <a:fld id="{22F2A30D-1C09-413F-AAB1-38F366000715}" type="datetime2">
               <a:rPr lang="en-US" smtClean="0"/>
-              <a:t>Friday, December 18, 2020</a:t>
+              <a:t>Saturday, December 19, 2020</a:t>
             </a:fld>
             <a:endParaRPr lang="en-US"/>
           </a:p>
@@ -3967,7 +3994,7 @@
           <a:p>
             <a:fld id="{6DB82B9C-D65E-4F64-95C3-B10F3B00F0D9}" type="datetime2">
               <a:rPr lang="en-US" smtClean="0"/>
-              <a:t>Friday, December 18, 2020</a:t>
+              <a:t>Saturday, December 19, 2020</a:t>
             </a:fld>
             <a:endParaRPr lang="en-US"/>
           </a:p>
@@ -4225,7 +4252,7 @@
           <a:p>
             <a:fld id="{B7F5FDCC-6AAC-4A08-B9E0-3793AB5E64C3}" type="datetime2">
               <a:rPr lang="en-US" smtClean="0"/>
-              <a:t>Friday, December 18, 2020</a:t>
+              <a:t>Saturday, December 19, 2020</a:t>
             </a:fld>
             <a:endParaRPr lang="en-US"/>
           </a:p>
@@ -4511,7 +4538,7 @@
           <a:p>
             <a:fld id="{349FE94D-439C-40F1-900E-BC07940E3988}" type="datetime2">
               <a:rPr lang="en-US" smtClean="0"/>
-              <a:t>Friday, December 18, 2020</a:t>
+              <a:t>Saturday, December 19, 2020</a:t>
             </a:fld>
             <a:endParaRPr lang="en-US"/>
           </a:p>
@@ -4920,7 +4947,7 @@
           <a:p>
             <a:fld id="{8DEA2CF1-0EB2-4673-802D-3371233E4A77}" type="datetime2">
               <a:rPr lang="en-US" smtClean="0"/>
-              <a:t>Friday, December 18, 2020</a:t>
+              <a:t>Saturday, December 19, 2020</a:t>
             </a:fld>
             <a:endParaRPr lang="en-US" dirty="0"/>
           </a:p>
@@ -5485,44 +5512,55 @@
           </a:xfrm>
         </p:spPr>
         <p:txBody>
+          <a:bodyPr anchor="ctr">
+            <a:normAutofit/>
+          </a:bodyPr>
+          <a:lstStyle/>
+          <a:p>
+            <a:pPr algn="ctr"/>
+            <a:r>
+              <a:rPr lang="en-US" sz="4400" dirty="0"/>
+              <a:t>Car sales drop</a:t>
+            </a:r>
+          </a:p>
+        </p:txBody>
+      </p:sp>
+      <p:sp>
+        <p:nvSpPr>
+          <p:cNvPr id="3" name="Subtitle 2">
+            <a:extLst>
+              <a:ext uri="{FF2B5EF4-FFF2-40B4-BE49-F238E27FC236}">
+                <a16:creationId xmlns:a16="http://schemas.microsoft.com/office/drawing/2014/main" id="{B8D267CB-88B7-4BEF-92F3-A176128AEB58}"/>
+              </a:ext>
+            </a:extLst>
+          </p:cNvPr>
+          <p:cNvSpPr>
+            <a:spLocks noGrp="1"/>
+          </p:cNvSpPr>
+          <p:nvPr>
+            <p:ph type="subTitle" idx="1"/>
+          </p:nvPr>
+        </p:nvSpPr>
+        <p:spPr>
+          <a:xfrm>
+            <a:off x="720000" y="3830398"/>
+            <a:ext cx="5015638" cy="2298939"/>
+          </a:xfrm>
+        </p:spPr>
+        <p:txBody>
           <a:bodyPr>
             <a:normAutofit/>
           </a:bodyPr>
           <a:lstStyle/>
           <a:p>
-            <a:endParaRPr lang="en-US"/>
-          </a:p>
-        </p:txBody>
-      </p:sp>
-      <p:sp>
-        <p:nvSpPr>
-          <p:cNvPr id="3" name="Subtitle 2">
-            <a:extLst>
-              <a:ext uri="{FF2B5EF4-FFF2-40B4-BE49-F238E27FC236}">
-                <a16:creationId xmlns:a16="http://schemas.microsoft.com/office/drawing/2014/main" id="{B8D267CB-88B7-4BEF-92F3-A176128AEB58}"/>
-              </a:ext>
-            </a:extLst>
-          </p:cNvPr>
-          <p:cNvSpPr>
-            <a:spLocks noGrp="1"/>
-          </p:cNvSpPr>
-          <p:nvPr>
-            <p:ph type="subTitle" idx="1"/>
-          </p:nvPr>
-        </p:nvSpPr>
-        <p:spPr>
-          <a:xfrm>
-            <a:off x="720000" y="3830398"/>
-            <a:ext cx="5015638" cy="2298939"/>
-          </a:xfrm>
-        </p:spPr>
-        <p:txBody>
-          <a:bodyPr>
-            <a:normAutofit/>
-          </a:bodyPr>
-          <a:lstStyle/>
-          <a:p>
-            <a:endParaRPr lang="en-US"/>
+            <a:r>
+              <a:rPr lang="en-US" dirty="0" err="1"/>
+              <a:t>Wich</a:t>
+            </a:r>
+            <a:r>
+              <a:rPr lang="en-US" dirty="0"/>
+              <a:t> factors explain the car sales drop in the year 2020 and how affect that fact to the US car makers. </a:t>
+            </a:r>
           </a:p>
         </p:txBody>
       </p:sp>
@@ -5602,352 +5640,7 @@
 </p:sld>
 </file>
 
-<file path=ppt/slides/slide2.xml><?xml version="1.0" encoding="utf-8"?>
-<p:sld xmlns:a="http://schemas.openxmlformats.org/drawingml/2006/main" xmlns:r="http://schemas.openxmlformats.org/officeDocument/2006/relationships" xmlns:p="http://schemas.openxmlformats.org/presentationml/2006/main" showMasterSp="0">
-  <p:cSld>
-    <p:spTree>
-      <p:nvGrpSpPr>
-        <p:cNvPr id="1" name=""/>
-        <p:cNvGrpSpPr/>
-        <p:nvPr/>
-      </p:nvGrpSpPr>
-      <p:grpSpPr>
-        <a:xfrm>
-          <a:off x="0" y="0"/>
-          <a:ext cx="0" cy="0"/>
-          <a:chOff x="0" y="0"/>
-          <a:chExt cx="0" cy="0"/>
-        </a:xfrm>
-      </p:grpSpPr>
-      <p:sp>
-        <p:nvSpPr>
-          <p:cNvPr id="2" name="Title 1">
-            <a:extLst>
-              <a:ext uri="{FF2B5EF4-FFF2-40B4-BE49-F238E27FC236}">
-                <a16:creationId xmlns:a16="http://schemas.microsoft.com/office/drawing/2014/main" id="{05817FB4-FEC5-44F5-8A7C-792B01D8DB76}"/>
-              </a:ext>
-            </a:extLst>
-          </p:cNvPr>
-          <p:cNvSpPr>
-            <a:spLocks noGrp="1"/>
-          </p:cNvSpPr>
-          <p:nvPr>
-            <p:ph type="title"/>
-          </p:nvPr>
-        </p:nvSpPr>
-        <p:spPr>
-          <a:xfrm>
-            <a:off x="4052711" y="551771"/>
-            <a:ext cx="4052711" cy="1796318"/>
-          </a:xfrm>
-        </p:spPr>
-        <p:txBody>
-          <a:bodyPr vert="horz" wrap="square" lIns="0" tIns="0" rIns="0" bIns="0" rtlCol="0" anchor="t" anchorCtr="0">
-            <a:normAutofit fontScale="90000"/>
-          </a:bodyPr>
-          <a:lstStyle/>
-          <a:p>
-            <a:pPr algn="ctr">
-              <a:lnSpc>
-                <a:spcPct val="100000"/>
-              </a:lnSpc>
-            </a:pPr>
-            <a:r>
-              <a:rPr lang="en-US" sz="1600" dirty="0"/>
-              <a:t>Ultra-Luxury Auto Groups Tracked the S&amp;P 500 performance  the best…implying that the stock market is a driving factor in their success.</a:t>
-            </a:r>
-            <a:br>
-              <a:rPr lang="en-US" sz="1600" dirty="0"/>
-            </a:br>
-            <a:br>
-              <a:rPr lang="en-US" sz="1600" dirty="0"/>
-            </a:br>
-            <a:r>
-              <a:rPr lang="en-US" sz="1600" dirty="0"/>
-              <a:t>Tesla’s sales skyrocketed their stock price and pulled the luxury index from flat performance to outpacing the S&amp;P.</a:t>
-            </a:r>
-          </a:p>
-        </p:txBody>
-      </p:sp>
-      <p:pic>
-        <p:nvPicPr>
-          <p:cNvPr id="18" name="Content Placeholder 17" descr="Chart&#10;&#10;Description automatically generated">
-            <a:extLst>
-              <a:ext uri="{FF2B5EF4-FFF2-40B4-BE49-F238E27FC236}">
-                <a16:creationId xmlns:a16="http://schemas.microsoft.com/office/drawing/2014/main" id="{F7A71560-C9AD-42CF-AC21-A87F88CB6242}"/>
-              </a:ext>
-            </a:extLst>
-          </p:cNvPr>
-          <p:cNvPicPr>
-            <a:picLocks noGrp="1" noChangeAspect="1"/>
-          </p:cNvPicPr>
-          <p:nvPr>
-            <p:ph sz="half" idx="1"/>
-          </p:nvPr>
-        </p:nvPicPr>
-        <p:blipFill>
-          <a:blip r:embed="rId2">
-            <a:extLst>
-              <a:ext uri="{28A0092B-C50C-407E-A947-70E740481C1C}">
-                <a14:useLocalDpi xmlns:a14="http://schemas.microsoft.com/office/drawing/2010/main" val="0"/>
-              </a:ext>
-            </a:extLst>
-          </a:blip>
-          <a:stretch>
-            <a:fillRect/>
-          </a:stretch>
-        </p:blipFill>
-        <p:spPr>
-          <a:xfrm>
-            <a:off x="4162887" y="2525096"/>
-            <a:ext cx="3832358" cy="2554904"/>
-          </a:xfrm>
-        </p:spPr>
-      </p:pic>
-      <p:pic>
-        <p:nvPicPr>
-          <p:cNvPr id="8" name="Content Placeholder 7" descr="Chart&#10;&#10;Description automatically generated">
-            <a:extLst>
-              <a:ext uri="{FF2B5EF4-FFF2-40B4-BE49-F238E27FC236}">
-                <a16:creationId xmlns:a16="http://schemas.microsoft.com/office/drawing/2014/main" id="{4B64B59F-F3A4-47ED-B0A5-FE6F680BE0F7}"/>
-              </a:ext>
-            </a:extLst>
-          </p:cNvPr>
-          <p:cNvPicPr>
-            <a:picLocks noGrp="1" noChangeAspect="1"/>
-          </p:cNvPicPr>
-          <p:nvPr>
-            <p:ph sz="half" idx="2"/>
-          </p:nvPr>
-        </p:nvPicPr>
-        <p:blipFill>
-          <a:blip r:embed="rId3">
-            <a:extLst>
-              <a:ext uri="{28A0092B-C50C-407E-A947-70E740481C1C}">
-                <a14:useLocalDpi xmlns:a14="http://schemas.microsoft.com/office/drawing/2010/main" val="0"/>
-              </a:ext>
-            </a:extLst>
-          </a:blip>
-          <a:stretch>
-            <a:fillRect/>
-          </a:stretch>
-        </p:blipFill>
-        <p:spPr>
-          <a:xfrm>
-            <a:off x="442857" y="3464630"/>
-            <a:ext cx="3283464" cy="2188975"/>
-          </a:xfrm>
-          <a:custGeom>
-            <a:avLst/>
-            <a:gdLst/>
-            <a:ahLst/>
-            <a:cxnLst/>
-            <a:rect l="l" t="t" r="r" b="b"/>
-            <a:pathLst>
-              <a:path w="2327400" h="2524669">
-                <a:moveTo>
-                  <a:pt x="0" y="0"/>
-                </a:moveTo>
-                <a:lnTo>
-                  <a:pt x="2327400" y="0"/>
-                </a:lnTo>
-                <a:lnTo>
-                  <a:pt x="2327400" y="2524669"/>
-                </a:lnTo>
-                <a:lnTo>
-                  <a:pt x="0" y="2524669"/>
-                </a:lnTo>
-                <a:close/>
-              </a:path>
-            </a:pathLst>
-          </a:custGeom>
-        </p:spPr>
-      </p:pic>
-      <p:pic>
-        <p:nvPicPr>
-          <p:cNvPr id="14" name="Picture 13" descr="Chart&#10;&#10;Description automatically generated">
-            <a:extLst>
-              <a:ext uri="{FF2B5EF4-FFF2-40B4-BE49-F238E27FC236}">
-                <a16:creationId xmlns:a16="http://schemas.microsoft.com/office/drawing/2014/main" id="{8F55E7A4-8FD9-4DD3-ACE0-BCA44AE2734C}"/>
-              </a:ext>
-            </a:extLst>
-          </p:cNvPr>
-          <p:cNvPicPr>
-            <a:picLocks noChangeAspect="1"/>
-          </p:cNvPicPr>
-          <p:nvPr/>
-        </p:nvPicPr>
-        <p:blipFill>
-          <a:blip r:embed="rId4">
-            <a:extLst>
-              <a:ext uri="{28A0092B-C50C-407E-A947-70E740481C1C}">
-                <a14:useLocalDpi xmlns:a14="http://schemas.microsoft.com/office/drawing/2010/main" val="0"/>
-              </a:ext>
-            </a:extLst>
-          </a:blip>
-          <a:stretch>
-            <a:fillRect/>
-          </a:stretch>
-        </p:blipFill>
-        <p:spPr>
-          <a:xfrm>
-            <a:off x="8415445" y="551771"/>
-            <a:ext cx="3333698" cy="2222464"/>
-          </a:xfrm>
-          <a:custGeom>
-            <a:avLst/>
-            <a:gdLst/>
-            <a:ahLst/>
-            <a:cxnLst/>
-            <a:rect l="l" t="t" r="r" b="b"/>
-            <a:pathLst>
-              <a:path w="2327400" h="2524669">
-                <a:moveTo>
-                  <a:pt x="0" y="0"/>
-                </a:moveTo>
-                <a:lnTo>
-                  <a:pt x="2327400" y="0"/>
-                </a:lnTo>
-                <a:lnTo>
-                  <a:pt x="2327400" y="2524669"/>
-                </a:lnTo>
-                <a:lnTo>
-                  <a:pt x="0" y="2524669"/>
-                </a:lnTo>
-                <a:close/>
-              </a:path>
-            </a:pathLst>
-          </a:custGeom>
-        </p:spPr>
-      </p:pic>
-      <p:pic>
-        <p:nvPicPr>
-          <p:cNvPr id="16" name="Picture 15" descr="Chart&#10;&#10;Description automatically generated">
-            <a:extLst>
-              <a:ext uri="{FF2B5EF4-FFF2-40B4-BE49-F238E27FC236}">
-                <a16:creationId xmlns:a16="http://schemas.microsoft.com/office/drawing/2014/main" id="{848F1E87-E8CE-4666-848F-B182ECBD5B76}"/>
-              </a:ext>
-            </a:extLst>
-          </p:cNvPr>
-          <p:cNvPicPr>
-            <a:picLocks noChangeAspect="1"/>
-          </p:cNvPicPr>
-          <p:nvPr/>
-        </p:nvPicPr>
-        <p:blipFill>
-          <a:blip r:embed="rId5">
-            <a:extLst>
-              <a:ext uri="{28A0092B-C50C-407E-A947-70E740481C1C}">
-                <a14:useLocalDpi xmlns:a14="http://schemas.microsoft.com/office/drawing/2010/main" val="0"/>
-              </a:ext>
-            </a:extLst>
-          </a:blip>
-          <a:stretch>
-            <a:fillRect/>
-          </a:stretch>
-        </p:blipFill>
-        <p:spPr>
-          <a:xfrm>
-            <a:off x="8415446" y="3464630"/>
-            <a:ext cx="3333697" cy="2222463"/>
-          </a:xfrm>
-          <a:custGeom>
-            <a:avLst/>
-            <a:gdLst/>
-            <a:ahLst/>
-            <a:cxnLst/>
-            <a:rect l="l" t="t" r="r" b="b"/>
-            <a:pathLst>
-              <a:path w="2327400" h="2524669">
-                <a:moveTo>
-                  <a:pt x="0" y="0"/>
-                </a:moveTo>
-                <a:lnTo>
-                  <a:pt x="2327400" y="0"/>
-                </a:lnTo>
-                <a:lnTo>
-                  <a:pt x="2327400" y="2524669"/>
-                </a:lnTo>
-                <a:lnTo>
-                  <a:pt x="0" y="2524669"/>
-                </a:lnTo>
-                <a:close/>
-              </a:path>
-            </a:pathLst>
-          </a:custGeom>
-        </p:spPr>
-      </p:pic>
-      <p:pic>
-        <p:nvPicPr>
-          <p:cNvPr id="6" name="Content Placeholder 5" descr="Chart&#10;&#10;Description automatically generated">
-            <a:extLst>
-              <a:ext uri="{FF2B5EF4-FFF2-40B4-BE49-F238E27FC236}">
-                <a16:creationId xmlns:a16="http://schemas.microsoft.com/office/drawing/2014/main" id="{707D4AD0-ABD6-4E4D-8BF2-3144F4FB4522}"/>
-              </a:ext>
-            </a:extLst>
-          </p:cNvPr>
-          <p:cNvPicPr>
-            <a:picLocks noChangeAspect="1"/>
-          </p:cNvPicPr>
-          <p:nvPr/>
-        </p:nvPicPr>
-        <p:blipFill>
-          <a:blip r:embed="rId6">
-            <a:extLst>
-              <a:ext uri="{28A0092B-C50C-407E-A947-70E740481C1C}">
-                <a14:useLocalDpi xmlns:a14="http://schemas.microsoft.com/office/drawing/2010/main" val="0"/>
-              </a:ext>
-            </a:extLst>
-          </a:blip>
-          <a:stretch>
-            <a:fillRect/>
-          </a:stretch>
-        </p:blipFill>
-        <p:spPr>
-          <a:xfrm>
-            <a:off x="410116" y="572361"/>
-            <a:ext cx="3302813" cy="2201874"/>
-          </a:xfrm>
-          <a:custGeom>
-            <a:avLst/>
-            <a:gdLst/>
-            <a:ahLst/>
-            <a:cxnLst/>
-            <a:rect l="l" t="t" r="r" b="b"/>
-            <a:pathLst>
-              <a:path w="2327400" h="2524669">
-                <a:moveTo>
-                  <a:pt x="0" y="0"/>
-                </a:moveTo>
-                <a:lnTo>
-                  <a:pt x="2327400" y="0"/>
-                </a:lnTo>
-                <a:lnTo>
-                  <a:pt x="2327400" y="2524669"/>
-                </a:lnTo>
-                <a:lnTo>
-                  <a:pt x="0" y="2524669"/>
-                </a:lnTo>
-                <a:close/>
-              </a:path>
-            </a:pathLst>
-          </a:custGeom>
-        </p:spPr>
-      </p:pic>
-    </p:spTree>
-    <p:extLst>
-      <p:ext uri="{BB962C8B-B14F-4D97-AF65-F5344CB8AC3E}">
-        <p14:creationId xmlns:p14="http://schemas.microsoft.com/office/powerpoint/2010/main" val="812567914"/>
-      </p:ext>
-    </p:extLst>
-  </p:cSld>
-  <p:clrMapOvr>
-    <a:masterClrMapping/>
-  </p:clrMapOvr>
-</p:sld>
-</file>
-
-<file path=ppt/slides/slide3.xml><?xml version="1.0" encoding="utf-8"?>
+<file path=ppt/slides/slide10.xml><?xml version="1.0" encoding="utf-8"?>
 <p:sld xmlns:a="http://schemas.openxmlformats.org/drawingml/2006/main" xmlns:r="http://schemas.openxmlformats.org/officeDocument/2006/relationships" xmlns:p="http://schemas.openxmlformats.org/presentationml/2006/main">
   <p:cSld>
     <p:bg>
@@ -6327,7 +6020,7 @@
                   <a:srgbClr val="FFFFFF"/>
                 </a:solidFill>
               </a:rPr>
-              <a:t>S&amp;P 500 index vs Economy Auto Group index</a:t>
+              <a:t>S&amp;P 500 index vs ULTRA Luxury Auto Group index</a:t>
             </a:r>
           </a:p>
         </p:txBody>
@@ -6702,13 +6395,13 @@
         </p:nvSpPr>
         <p:spPr>
           <a:xfrm>
-            <a:off x="7516615" y="2323307"/>
-            <a:ext cx="3938505" cy="3584253"/>
+            <a:off x="7516616" y="2049430"/>
+            <a:ext cx="3938505" cy="4050804"/>
           </a:xfrm>
         </p:spPr>
         <p:txBody>
           <a:bodyPr>
-            <a:normAutofit lnSpcReduction="10000"/>
+            <a:normAutofit/>
           </a:bodyPr>
           <a:lstStyle/>
           <a:p>
@@ -6728,70 +6421,17 @@
                   <a:schemeClr val="bg1"/>
                 </a:solidFill>
               </a:rPr>
-              <a:t>Tracks the S&amp;P closely with slightly less volatility.</a:t>
-            </a:r>
-          </a:p>
-          <a:p>
-            <a:r>
-              <a:rPr lang="en-US" dirty="0">
-                <a:solidFill>
-                  <a:schemeClr val="bg1"/>
-                </a:solidFill>
-              </a:rPr>
-              <a:t>Stimulus package on March 27, 2020 (red square) brightened the investor outlook.</a:t>
-            </a:r>
-          </a:p>
-          <a:p>
-            <a:r>
-              <a:rPr lang="en-US" dirty="0">
-                <a:solidFill>
-                  <a:schemeClr val="bg1"/>
-                </a:solidFill>
-              </a:rPr>
-              <a:t>Hitting 100,000 COVID deaths on May 27, 2020 (indicated by 2</a:t>
-            </a:r>
-            <a:r>
-              <a:rPr lang="en-US" baseline="30000" dirty="0">
-                <a:solidFill>
-                  <a:schemeClr val="bg1"/>
-                </a:solidFill>
-              </a:rPr>
-              <a:t>nd</a:t>
-            </a:r>
-            <a:r>
-              <a:rPr lang="en-US" dirty="0">
-                <a:solidFill>
-                  <a:schemeClr val="bg1"/>
-                </a:solidFill>
-              </a:rPr>
-              <a:t> red square) had little effect on stock price.</a:t>
-            </a:r>
-          </a:p>
-          <a:p>
-            <a:r>
-              <a:rPr lang="en-US" dirty="0">
-                <a:solidFill>
-                  <a:schemeClr val="bg1"/>
-                </a:solidFill>
-              </a:rPr>
-              <a:t>Implication is that investors had a positive outlook on the near future of economy vehicle sales by companies like Hyundai and Kia.</a:t>
-            </a:r>
-          </a:p>
-          <a:p>
-            <a:endParaRPr lang="en-US" dirty="0">
-              <a:solidFill>
-                <a:schemeClr val="bg1"/>
-              </a:solidFill>
-            </a:endParaRPr>
+              <a:t>Interestingly, ultra luxury auto groups like Porsche, Ferrari, and McLaren tracked the stock market the most closely of the four segments and only marginally better than Economy auto groups. This implies that stock market performance may factor into car sales which, in turn, supports stock price.  </a:t>
+            </a:r>
           </a:p>
         </p:txBody>
       </p:sp>
       <p:pic>
         <p:nvPicPr>
-          <p:cNvPr id="6" name="Content Placeholder 5" descr="Chart&#10;&#10;Description automatically generated">
+          <p:cNvPr id="8" name="Content Placeholder 7" descr="Chart&#10;&#10;Description automatically generated">
             <a:extLst>
               <a:ext uri="{FF2B5EF4-FFF2-40B4-BE49-F238E27FC236}">
-                <a16:creationId xmlns:a16="http://schemas.microsoft.com/office/drawing/2014/main" id="{613F8CAD-0FFD-41BF-B750-D2491B6D9002}"/>
+                <a16:creationId xmlns:a16="http://schemas.microsoft.com/office/drawing/2014/main" id="{3FBF23BD-028B-43E3-896C-790E67EC4A25}"/>
               </a:ext>
             </a:extLst>
           </p:cNvPr>
@@ -6816,15 +6456,15 @@
         </p:blipFill>
         <p:spPr>
           <a:xfrm>
-            <a:off x="736879" y="1154961"/>
-            <a:ext cx="6196843" cy="4131228"/>
+            <a:off x="816482" y="1081825"/>
+            <a:ext cx="6131238" cy="4087492"/>
           </a:xfrm>
         </p:spPr>
       </p:pic>
     </p:spTree>
     <p:extLst>
       <p:ext uri="{BB962C8B-B14F-4D97-AF65-F5344CB8AC3E}">
-        <p14:creationId xmlns:p14="http://schemas.microsoft.com/office/powerpoint/2010/main" val="3656836066"/>
+        <p14:creationId xmlns:p14="http://schemas.microsoft.com/office/powerpoint/2010/main" val="3056262080"/>
       </p:ext>
     </p:extLst>
   </p:cSld>
@@ -6834,7 +6474,1467 @@
 </p:sld>
 </file>
 
+<file path=ppt/slides/slide11.xml><?xml version="1.0" encoding="utf-8"?>
+<p:sld xmlns:a="http://schemas.openxmlformats.org/drawingml/2006/main" xmlns:r="http://schemas.openxmlformats.org/officeDocument/2006/relationships" xmlns:p="http://schemas.openxmlformats.org/presentationml/2006/main">
+  <p:cSld>
+    <p:spTree>
+      <p:nvGrpSpPr>
+        <p:cNvPr id="1" name=""/>
+        <p:cNvGrpSpPr/>
+        <p:nvPr/>
+      </p:nvGrpSpPr>
+      <p:grpSpPr>
+        <a:xfrm>
+          <a:off x="0" y="0"/>
+          <a:ext cx="0" cy="0"/>
+          <a:chOff x="0" y="0"/>
+          <a:chExt cx="0" cy="0"/>
+        </a:xfrm>
+      </p:grpSpPr>
+      <p:sp>
+        <p:nvSpPr>
+          <p:cNvPr id="2" name="Title 1">
+            <a:extLst>
+              <a:ext uri="{FF2B5EF4-FFF2-40B4-BE49-F238E27FC236}">
+                <a16:creationId xmlns:a16="http://schemas.microsoft.com/office/drawing/2014/main" id="{6CBE862C-82C3-4133-B194-BB8D5564D871}"/>
+              </a:ext>
+            </a:extLst>
+          </p:cNvPr>
+          <p:cNvSpPr>
+            <a:spLocks noGrp="1"/>
+          </p:cNvSpPr>
+          <p:nvPr>
+            <p:ph type="title"/>
+          </p:nvPr>
+        </p:nvSpPr>
+        <p:spPr/>
+        <p:txBody>
+          <a:bodyPr/>
+          <a:lstStyle/>
+          <a:p>
+            <a:r>
+              <a:rPr lang="en-US" dirty="0"/>
+              <a:t>Team 6 Analysts</a:t>
+            </a:r>
+          </a:p>
+        </p:txBody>
+      </p:sp>
+      <p:pic>
+        <p:nvPicPr>
+          <p:cNvPr id="6" name="Content Placeholder 5" descr="A person wearing a uniform&#10;&#10;Description automatically generated with low confidence">
+            <a:extLst>
+              <a:ext uri="{FF2B5EF4-FFF2-40B4-BE49-F238E27FC236}">
+                <a16:creationId xmlns:a16="http://schemas.microsoft.com/office/drawing/2014/main" id="{480EC34A-A090-4DEF-AD49-6EA6CFF45BD8}"/>
+              </a:ext>
+            </a:extLst>
+          </p:cNvPr>
+          <p:cNvPicPr>
+            <a:picLocks noGrp="1" noChangeAspect="1"/>
+          </p:cNvPicPr>
+          <p:nvPr>
+            <p:ph idx="1"/>
+          </p:nvPr>
+        </p:nvPicPr>
+        <p:blipFill>
+          <a:blip r:embed="rId2">
+            <a:extLst>
+              <a:ext uri="{28A0092B-C50C-407E-A947-70E740481C1C}">
+                <a14:useLocalDpi xmlns:a14="http://schemas.microsoft.com/office/drawing/2010/main" val="0"/>
+              </a:ext>
+            </a:extLst>
+          </a:blip>
+          <a:stretch>
+            <a:fillRect/>
+          </a:stretch>
+        </p:blipFill>
+        <p:spPr>
+          <a:xfrm>
+            <a:off x="1032436" y="5065713"/>
+            <a:ext cx="1106487" cy="1106487"/>
+          </a:xfrm>
+          <a:prstGeom prst="ellipse">
+            <a:avLst/>
+          </a:prstGeom>
+          <a:ln w="63500" cap="rnd">
+            <a:solidFill>
+              <a:schemeClr val="bg2"/>
+            </a:solidFill>
+          </a:ln>
+          <a:effectLst>
+            <a:outerShdw blurRad="381000" dist="292100" dir="5400000" sx="-80000" sy="-18000" rotWithShape="0">
+              <a:srgbClr val="000000">
+                <a:alpha val="22000"/>
+              </a:srgbClr>
+            </a:outerShdw>
+          </a:effectLst>
+          <a:scene3d>
+            <a:camera prst="orthographicFront"/>
+            <a:lightRig rig="contrasting" dir="t">
+              <a:rot lat="0" lon="0" rev="3000000"/>
+            </a:lightRig>
+          </a:scene3d>
+          <a:sp3d contourW="7620">
+            <a:bevelT w="95250" h="31750"/>
+            <a:contourClr>
+              <a:srgbClr val="333333"/>
+            </a:contourClr>
+          </a:sp3d>
+        </p:spPr>
+      </p:pic>
+      <p:sp>
+        <p:nvSpPr>
+          <p:cNvPr id="4" name="Text Placeholder 3">
+            <a:extLst>
+              <a:ext uri="{FF2B5EF4-FFF2-40B4-BE49-F238E27FC236}">
+                <a16:creationId xmlns:a16="http://schemas.microsoft.com/office/drawing/2014/main" id="{BE93A2DA-6AC4-48BB-93CE-4EEC0A83C825}"/>
+              </a:ext>
+            </a:extLst>
+          </p:cNvPr>
+          <p:cNvSpPr>
+            <a:spLocks noGrp="1"/>
+          </p:cNvSpPr>
+          <p:nvPr>
+            <p:ph type="body" sz="half" idx="2"/>
+          </p:nvPr>
+        </p:nvSpPr>
+        <p:spPr/>
+        <p:txBody>
+          <a:bodyPr/>
+          <a:lstStyle/>
+          <a:p>
+            <a:r>
+              <a:rPr lang="en-US" dirty="0"/>
+              <a:t>Team 6 Analytical Group uses data to explain how world and national events affect the financial markets. </a:t>
+            </a:r>
+          </a:p>
+          <a:p>
+            <a:r>
+              <a:rPr lang="en-US" dirty="0"/>
+              <a:t>Contact us for your next research project.</a:t>
+            </a:r>
+          </a:p>
+        </p:txBody>
+      </p:sp>
+      <p:pic>
+        <p:nvPicPr>
+          <p:cNvPr id="10" name="Picture 9">
+            <a:extLst>
+              <a:ext uri="{FF2B5EF4-FFF2-40B4-BE49-F238E27FC236}">
+                <a16:creationId xmlns:a16="http://schemas.microsoft.com/office/drawing/2014/main" id="{7E5B45FD-07BB-492D-8DB4-C628F9CFCC66}"/>
+              </a:ext>
+            </a:extLst>
+          </p:cNvPr>
+          <p:cNvPicPr>
+            <a:picLocks noChangeAspect="1"/>
+          </p:cNvPicPr>
+          <p:nvPr/>
+        </p:nvPicPr>
+        <p:blipFill>
+          <a:blip r:embed="rId3"/>
+          <a:stretch>
+            <a:fillRect/>
+          </a:stretch>
+        </p:blipFill>
+        <p:spPr>
+          <a:xfrm>
+            <a:off x="479193" y="3673210"/>
+            <a:ext cx="1106487" cy="1106487"/>
+          </a:xfrm>
+          <a:prstGeom prst="ellipse">
+            <a:avLst/>
+          </a:prstGeom>
+          <a:ln w="63500" cap="rnd">
+            <a:solidFill>
+              <a:schemeClr val="bg2"/>
+            </a:solidFill>
+          </a:ln>
+          <a:effectLst>
+            <a:outerShdw blurRad="381000" dist="292100" dir="5400000" sx="-80000" sy="-18000" rotWithShape="0">
+              <a:srgbClr val="000000">
+                <a:alpha val="22000"/>
+              </a:srgbClr>
+            </a:outerShdw>
+          </a:effectLst>
+          <a:scene3d>
+            <a:camera prst="orthographicFront"/>
+            <a:lightRig rig="contrasting" dir="t">
+              <a:rot lat="0" lon="0" rev="3000000"/>
+            </a:lightRig>
+          </a:scene3d>
+          <a:sp3d contourW="7620">
+            <a:bevelT w="95250" h="31750"/>
+            <a:contourClr>
+              <a:srgbClr val="333333"/>
+            </a:contourClr>
+          </a:sp3d>
+        </p:spPr>
+      </p:pic>
+      <p:pic>
+        <p:nvPicPr>
+          <p:cNvPr id="11" name="Picture 10">
+            <a:extLst>
+              <a:ext uri="{FF2B5EF4-FFF2-40B4-BE49-F238E27FC236}">
+                <a16:creationId xmlns:a16="http://schemas.microsoft.com/office/drawing/2014/main" id="{30733EC8-B0EA-468A-A11F-4BF9037BAB07}"/>
+              </a:ext>
+            </a:extLst>
+          </p:cNvPr>
+          <p:cNvPicPr>
+            <a:picLocks noChangeAspect="1"/>
+          </p:cNvPicPr>
+          <p:nvPr/>
+        </p:nvPicPr>
+        <p:blipFill>
+          <a:blip r:embed="rId4"/>
+          <a:stretch>
+            <a:fillRect/>
+          </a:stretch>
+        </p:blipFill>
+        <p:spPr>
+          <a:xfrm>
+            <a:off x="1032437" y="2148945"/>
+            <a:ext cx="1106487" cy="1106487"/>
+          </a:xfrm>
+          <a:prstGeom prst="ellipse">
+            <a:avLst/>
+          </a:prstGeom>
+          <a:ln w="63500" cap="rnd">
+            <a:solidFill>
+              <a:schemeClr val="bg2"/>
+            </a:solidFill>
+          </a:ln>
+          <a:effectLst>
+            <a:outerShdw blurRad="381000" dist="292100" dir="5400000" sx="-80000" sy="-18000" rotWithShape="0">
+              <a:srgbClr val="000000">
+                <a:alpha val="22000"/>
+              </a:srgbClr>
+            </a:outerShdw>
+          </a:effectLst>
+          <a:scene3d>
+            <a:camera prst="orthographicFront"/>
+            <a:lightRig rig="contrasting" dir="t">
+              <a:rot lat="0" lon="0" rev="3000000"/>
+            </a:lightRig>
+          </a:scene3d>
+          <a:sp3d contourW="7620">
+            <a:bevelT w="95250" h="31750"/>
+            <a:contourClr>
+              <a:srgbClr val="333333"/>
+            </a:contourClr>
+          </a:sp3d>
+        </p:spPr>
+      </p:pic>
+      <p:pic>
+        <p:nvPicPr>
+          <p:cNvPr id="14" name="Picture 13" descr="A person with a beard&#10;&#10;Description automatically generated with low confidence">
+            <a:extLst>
+              <a:ext uri="{FF2B5EF4-FFF2-40B4-BE49-F238E27FC236}">
+                <a16:creationId xmlns:a16="http://schemas.microsoft.com/office/drawing/2014/main" id="{863DAAD5-85A8-4ACE-93EE-DB3B5D111923}"/>
+              </a:ext>
+            </a:extLst>
+          </p:cNvPr>
+          <p:cNvPicPr>
+            <a:picLocks noChangeAspect="1"/>
+          </p:cNvPicPr>
+          <p:nvPr/>
+        </p:nvPicPr>
+        <p:blipFill>
+          <a:blip r:embed="rId5">
+            <a:extLst>
+              <a:ext uri="{28A0092B-C50C-407E-A947-70E740481C1C}">
+                <a14:useLocalDpi xmlns:a14="http://schemas.microsoft.com/office/drawing/2010/main" val="0"/>
+              </a:ext>
+            </a:extLst>
+          </a:blip>
+          <a:stretch>
+            <a:fillRect/>
+          </a:stretch>
+        </p:blipFill>
+        <p:spPr>
+          <a:xfrm>
+            <a:off x="479194" y="685800"/>
+            <a:ext cx="1150944" cy="1106487"/>
+          </a:xfrm>
+          <a:prstGeom prst="ellipse">
+            <a:avLst/>
+          </a:prstGeom>
+          <a:ln w="63500" cap="rnd">
+            <a:solidFill>
+              <a:schemeClr val="bg2"/>
+            </a:solidFill>
+          </a:ln>
+          <a:effectLst>
+            <a:outerShdw blurRad="381000" dist="292100" dir="5400000" sx="-80000" sy="-18000" rotWithShape="0">
+              <a:srgbClr val="000000">
+                <a:alpha val="22000"/>
+              </a:srgbClr>
+            </a:outerShdw>
+          </a:effectLst>
+          <a:scene3d>
+            <a:camera prst="orthographicFront"/>
+            <a:lightRig rig="contrasting" dir="t">
+              <a:rot lat="0" lon="0" rev="3000000"/>
+            </a:lightRig>
+          </a:scene3d>
+          <a:sp3d contourW="7620">
+            <a:bevelT w="95250" h="31750"/>
+            <a:contourClr>
+              <a:srgbClr val="333333"/>
+            </a:contourClr>
+          </a:sp3d>
+        </p:spPr>
+      </p:pic>
+      <p:sp>
+        <p:nvSpPr>
+          <p:cNvPr id="15" name="TextBox 14">
+            <a:extLst>
+              <a:ext uri="{FF2B5EF4-FFF2-40B4-BE49-F238E27FC236}">
+                <a16:creationId xmlns:a16="http://schemas.microsoft.com/office/drawing/2014/main" id="{29F54FF5-2F9F-4B67-8A89-CA8A4090AEAF}"/>
+              </a:ext>
+            </a:extLst>
+          </p:cNvPr>
+          <p:cNvSpPr txBox="1"/>
+          <p:nvPr/>
+        </p:nvSpPr>
+        <p:spPr>
+          <a:xfrm>
+            <a:off x="2138923" y="685800"/>
+            <a:ext cx="3322077" cy="1077218"/>
+          </a:xfrm>
+          <a:prstGeom prst="rect">
+            <a:avLst/>
+          </a:prstGeom>
+          <a:noFill/>
+        </p:spPr>
+        <p:txBody>
+          <a:bodyPr wrap="square" rtlCol="0">
+            <a:spAutoFit/>
+          </a:bodyPr>
+          <a:lstStyle/>
+          <a:p>
+            <a:r>
+              <a:rPr lang="en-US" sz="1600" dirty="0"/>
+              <a:t>Luis Fernando Ruiz delves into government data and highlights what we need to know.</a:t>
+            </a:r>
+          </a:p>
+        </p:txBody>
+      </p:sp>
+      <p:sp>
+        <p:nvSpPr>
+          <p:cNvPr id="16" name="TextBox 15">
+            <a:extLst>
+              <a:ext uri="{FF2B5EF4-FFF2-40B4-BE49-F238E27FC236}">
+                <a16:creationId xmlns:a16="http://schemas.microsoft.com/office/drawing/2014/main" id="{A9C7F89D-E4F4-4DDF-BCA1-C18B932640C2}"/>
+              </a:ext>
+            </a:extLst>
+          </p:cNvPr>
+          <p:cNvSpPr txBox="1"/>
+          <p:nvPr/>
+        </p:nvSpPr>
+        <p:spPr>
+          <a:xfrm>
+            <a:off x="2507223" y="2040468"/>
+            <a:ext cx="3322077" cy="1323439"/>
+          </a:xfrm>
+          <a:prstGeom prst="rect">
+            <a:avLst/>
+          </a:prstGeom>
+          <a:noFill/>
+        </p:spPr>
+        <p:txBody>
+          <a:bodyPr wrap="square" rtlCol="0">
+            <a:spAutoFit/>
+          </a:bodyPr>
+          <a:lstStyle/>
+          <a:p>
+            <a:r>
+              <a:rPr lang="en-US" sz="1600" dirty="0" err="1"/>
+              <a:t>Phillecia</a:t>
+            </a:r>
+            <a:r>
+              <a:rPr lang="en-US" sz="1600" dirty="0"/>
+              <a:t> Qualls is our automotive sector guru and keeps an eye on who is  in front of the pack and who has been left on the side of the road.</a:t>
+            </a:r>
+          </a:p>
+        </p:txBody>
+      </p:sp>
+      <p:sp>
+        <p:nvSpPr>
+          <p:cNvPr id="17" name="TextBox 16">
+            <a:extLst>
+              <a:ext uri="{FF2B5EF4-FFF2-40B4-BE49-F238E27FC236}">
+                <a16:creationId xmlns:a16="http://schemas.microsoft.com/office/drawing/2014/main" id="{B1C8E6A2-68C5-44B2-840F-463B664CE58D}"/>
+              </a:ext>
+            </a:extLst>
+          </p:cNvPr>
+          <p:cNvSpPr txBox="1"/>
+          <p:nvPr/>
+        </p:nvSpPr>
+        <p:spPr>
+          <a:xfrm>
+            <a:off x="2138922" y="3560598"/>
+            <a:ext cx="3322077" cy="1077218"/>
+          </a:xfrm>
+          <a:prstGeom prst="rect">
+            <a:avLst/>
+          </a:prstGeom>
+          <a:noFill/>
+        </p:spPr>
+        <p:txBody>
+          <a:bodyPr wrap="square" rtlCol="0">
+            <a:spAutoFit/>
+          </a:bodyPr>
+          <a:lstStyle/>
+          <a:p>
+            <a:r>
+              <a:rPr lang="en-US" sz="1600" dirty="0"/>
+              <a:t>Karen Pearson is our healthcare sector guru and offers us a prognosis of the factors and the players in this space.</a:t>
+            </a:r>
+          </a:p>
+        </p:txBody>
+      </p:sp>
+      <p:sp>
+        <p:nvSpPr>
+          <p:cNvPr id="18" name="TextBox 17">
+            <a:extLst>
+              <a:ext uri="{FF2B5EF4-FFF2-40B4-BE49-F238E27FC236}">
+                <a16:creationId xmlns:a16="http://schemas.microsoft.com/office/drawing/2014/main" id="{CFC1BC62-76D3-4F7F-AE1C-BE6083D2FFBF}"/>
+              </a:ext>
+            </a:extLst>
+          </p:cNvPr>
+          <p:cNvSpPr txBox="1"/>
+          <p:nvPr/>
+        </p:nvSpPr>
+        <p:spPr>
+          <a:xfrm>
+            <a:off x="2507222" y="5065713"/>
+            <a:ext cx="3322077" cy="1077218"/>
+          </a:xfrm>
+          <a:prstGeom prst="rect">
+            <a:avLst/>
+          </a:prstGeom>
+          <a:noFill/>
+        </p:spPr>
+        <p:txBody>
+          <a:bodyPr wrap="square" rtlCol="0">
+            <a:spAutoFit/>
+          </a:bodyPr>
+          <a:lstStyle/>
+          <a:p>
+            <a:r>
+              <a:rPr lang="en-US" sz="1600" dirty="0"/>
+              <a:t>Dana Woodruff tracks the stock market’s reactions to news and events… what happened and why.</a:t>
+            </a:r>
+          </a:p>
+        </p:txBody>
+      </p:sp>
+    </p:spTree>
+    <p:extLst>
+      <p:ext uri="{BB962C8B-B14F-4D97-AF65-F5344CB8AC3E}">
+        <p14:creationId xmlns:p14="http://schemas.microsoft.com/office/powerpoint/2010/main" val="1992665179"/>
+      </p:ext>
+    </p:extLst>
+  </p:cSld>
+  <p:clrMapOvr>
+    <a:masterClrMapping/>
+  </p:clrMapOvr>
+</p:sld>
+</file>
+
+<file path=ppt/slides/slide2.xml><?xml version="1.0" encoding="utf-8"?>
+<p:sld xmlns:a="http://schemas.openxmlformats.org/drawingml/2006/main" xmlns:r="http://schemas.openxmlformats.org/officeDocument/2006/relationships" xmlns:p="http://schemas.openxmlformats.org/presentationml/2006/main">
+  <p:cSld>
+    <p:spTree>
+      <p:nvGrpSpPr>
+        <p:cNvPr id="1" name=""/>
+        <p:cNvGrpSpPr/>
+        <p:nvPr/>
+      </p:nvGrpSpPr>
+      <p:grpSpPr>
+        <a:xfrm>
+          <a:off x="0" y="0"/>
+          <a:ext cx="0" cy="0"/>
+          <a:chOff x="0" y="0"/>
+          <a:chExt cx="0" cy="0"/>
+        </a:xfrm>
+      </p:grpSpPr>
+      <p:sp>
+        <p:nvSpPr>
+          <p:cNvPr id="4" name="Title 3">
+            <a:extLst>
+              <a:ext uri="{FF2B5EF4-FFF2-40B4-BE49-F238E27FC236}">
+                <a16:creationId xmlns:a16="http://schemas.microsoft.com/office/drawing/2014/main" id="{942F0D3B-7842-44A5-97CA-BBD08198984E}"/>
+              </a:ext>
+            </a:extLst>
+          </p:cNvPr>
+          <p:cNvSpPr>
+            <a:spLocks noGrp="1"/>
+          </p:cNvSpPr>
+          <p:nvPr>
+            <p:ph type="title"/>
+          </p:nvPr>
+        </p:nvSpPr>
+        <p:spPr/>
+        <p:txBody>
+          <a:bodyPr/>
+          <a:lstStyle/>
+          <a:p>
+            <a:r>
+              <a:rPr lang="en-US" dirty="0"/>
+              <a:t>Does </a:t>
+            </a:r>
+            <a:r>
+              <a:rPr lang="en-US" dirty="0" err="1"/>
+              <a:t>covid</a:t>
+            </a:r>
+            <a:r>
+              <a:rPr lang="en-US" dirty="0"/>
+              <a:t> determine car sales in year 2020?</a:t>
+            </a:r>
+          </a:p>
+        </p:txBody>
+      </p:sp>
+      <p:sp>
+        <p:nvSpPr>
+          <p:cNvPr id="5" name="Picture Placeholder 4">
+            <a:extLst>
+              <a:ext uri="{FF2B5EF4-FFF2-40B4-BE49-F238E27FC236}">
+                <a16:creationId xmlns:a16="http://schemas.microsoft.com/office/drawing/2014/main" id="{3C1BF914-0F9E-4A63-9CAD-52994F3D74AD}"/>
+              </a:ext>
+            </a:extLst>
+          </p:cNvPr>
+          <p:cNvSpPr>
+            <a:spLocks noGrp="1"/>
+          </p:cNvSpPr>
+          <p:nvPr>
+            <p:ph type="pic" idx="1"/>
+          </p:nvPr>
+        </p:nvSpPr>
+        <p:spPr/>
+      </p:sp>
+      <p:sp>
+        <p:nvSpPr>
+          <p:cNvPr id="6" name="Text Placeholder 5">
+            <a:extLst>
+              <a:ext uri="{FF2B5EF4-FFF2-40B4-BE49-F238E27FC236}">
+                <a16:creationId xmlns:a16="http://schemas.microsoft.com/office/drawing/2014/main" id="{EFB1337C-A6A6-461A-8F79-C43AE4FDCA9D}"/>
+              </a:ext>
+            </a:extLst>
+          </p:cNvPr>
+          <p:cNvSpPr>
+            <a:spLocks noGrp="1"/>
+          </p:cNvSpPr>
+          <p:nvPr>
+            <p:ph type="body" sz="half" idx="2"/>
+          </p:nvPr>
+        </p:nvSpPr>
+        <p:spPr/>
+        <p:txBody>
+          <a:bodyPr/>
+          <a:lstStyle/>
+          <a:p>
+            <a:r>
+              <a:rPr lang="en-US" dirty="0"/>
+              <a:t>As COVID cases increased…</a:t>
+            </a:r>
+          </a:p>
+        </p:txBody>
+      </p:sp>
+    </p:spTree>
+    <p:extLst>
+      <p:ext uri="{BB962C8B-B14F-4D97-AF65-F5344CB8AC3E}">
+        <p14:creationId xmlns:p14="http://schemas.microsoft.com/office/powerpoint/2010/main" val="3151983930"/>
+      </p:ext>
+    </p:extLst>
+  </p:cSld>
+  <p:clrMapOvr>
+    <a:masterClrMapping/>
+  </p:clrMapOvr>
+</p:sld>
+</file>
+
+<file path=ppt/slides/slide3.xml><?xml version="1.0" encoding="utf-8"?>
+<p:sld xmlns:a="http://schemas.openxmlformats.org/drawingml/2006/main" xmlns:r="http://schemas.openxmlformats.org/officeDocument/2006/relationships" xmlns:p="http://schemas.openxmlformats.org/presentationml/2006/main">
+  <p:cSld>
+    <p:spTree>
+      <p:nvGrpSpPr>
+        <p:cNvPr id="1" name=""/>
+        <p:cNvGrpSpPr/>
+        <p:nvPr/>
+      </p:nvGrpSpPr>
+      <p:grpSpPr>
+        <a:xfrm>
+          <a:off x="0" y="0"/>
+          <a:ext cx="0" cy="0"/>
+          <a:chOff x="0" y="0"/>
+          <a:chExt cx="0" cy="0"/>
+        </a:xfrm>
+      </p:grpSpPr>
+      <p:sp>
+        <p:nvSpPr>
+          <p:cNvPr id="2" name="TextBox 1">
+            <a:extLst>
+              <a:ext uri="{FF2B5EF4-FFF2-40B4-BE49-F238E27FC236}">
+                <a16:creationId xmlns:a16="http://schemas.microsoft.com/office/drawing/2014/main" id="{380EC8A1-D051-4B56-A203-630C787C7A25}"/>
+              </a:ext>
+            </a:extLst>
+          </p:cNvPr>
+          <p:cNvSpPr txBox="1"/>
+          <p:nvPr/>
+        </p:nvSpPr>
+        <p:spPr>
+          <a:xfrm>
+            <a:off x="1216241" y="506027"/>
+            <a:ext cx="9889724" cy="2308324"/>
+          </a:xfrm>
+          <a:prstGeom prst="rect">
+            <a:avLst/>
+          </a:prstGeom>
+          <a:noFill/>
+        </p:spPr>
+        <p:txBody>
+          <a:bodyPr wrap="square" rtlCol="0">
+            <a:spAutoFit/>
+          </a:bodyPr>
+          <a:lstStyle/>
+          <a:p>
+            <a:r>
+              <a:rPr lang="en-US" dirty="0"/>
+              <a:t>Questions:</a:t>
+            </a:r>
+          </a:p>
+          <a:p>
+            <a:endParaRPr lang="en-US" dirty="0"/>
+          </a:p>
+          <a:p>
+            <a:r>
+              <a:rPr lang="en-US" dirty="0"/>
+              <a:t>1 – Is COVID affecting directly car sales in 2020?</a:t>
+            </a:r>
+          </a:p>
+          <a:p>
+            <a:r>
+              <a:rPr lang="en-US" dirty="0"/>
+              <a:t>2 – Is the general economic situation affecting car sales in 2020?</a:t>
+            </a:r>
+          </a:p>
+          <a:p>
+            <a:r>
+              <a:rPr lang="en-US" dirty="0"/>
+              <a:t>3 – Are the low interest rates affecting the car sales in 2020?</a:t>
+            </a:r>
+          </a:p>
+          <a:p>
+            <a:r>
+              <a:rPr lang="en-US" dirty="0"/>
+              <a:t>3 – Is every car maker in every price segment dropping sales in 2020?</a:t>
+            </a:r>
+          </a:p>
+          <a:p>
+            <a:r>
+              <a:rPr lang="en-US" dirty="0"/>
+              <a:t>4 – How is the behavior of the car makers in the stock market related with car sales?</a:t>
+            </a:r>
+          </a:p>
+          <a:p>
+            <a:r>
+              <a:rPr lang="en-US" dirty="0"/>
+              <a:t> </a:t>
+            </a:r>
+          </a:p>
+        </p:txBody>
+      </p:sp>
+    </p:spTree>
+    <p:extLst>
+      <p:ext uri="{BB962C8B-B14F-4D97-AF65-F5344CB8AC3E}">
+        <p14:creationId xmlns:p14="http://schemas.microsoft.com/office/powerpoint/2010/main" val="3409451937"/>
+      </p:ext>
+    </p:extLst>
+  </p:cSld>
+  <p:clrMapOvr>
+    <a:masterClrMapping/>
+  </p:clrMapOvr>
+</p:sld>
+</file>
+
 <file path=ppt/slides/slide4.xml><?xml version="1.0" encoding="utf-8"?>
+<p:sld xmlns:a="http://schemas.openxmlformats.org/drawingml/2006/main" xmlns:r="http://schemas.openxmlformats.org/officeDocument/2006/relationships" xmlns:p="http://schemas.openxmlformats.org/presentationml/2006/main">
+  <p:cSld>
+    <p:spTree>
+      <p:nvGrpSpPr>
+        <p:cNvPr id="1" name=""/>
+        <p:cNvGrpSpPr/>
+        <p:nvPr/>
+      </p:nvGrpSpPr>
+      <p:grpSpPr>
+        <a:xfrm>
+          <a:off x="0" y="0"/>
+          <a:ext cx="0" cy="0"/>
+          <a:chOff x="0" y="0"/>
+          <a:chExt cx="0" cy="0"/>
+        </a:xfrm>
+      </p:grpSpPr>
+      <p:sp>
+        <p:nvSpPr>
+          <p:cNvPr id="2" name="Title 1">
+            <a:extLst>
+              <a:ext uri="{FF2B5EF4-FFF2-40B4-BE49-F238E27FC236}">
+                <a16:creationId xmlns:a16="http://schemas.microsoft.com/office/drawing/2014/main" id="{8C37D8A9-7618-471D-B6AE-44B3CCD3F716}"/>
+              </a:ext>
+            </a:extLst>
+          </p:cNvPr>
+          <p:cNvSpPr>
+            <a:spLocks noGrp="1"/>
+          </p:cNvSpPr>
+          <p:nvPr>
+            <p:ph type="title"/>
+          </p:nvPr>
+        </p:nvSpPr>
+        <p:spPr>
+          <a:xfrm>
+            <a:off x="1772460" y="146151"/>
+            <a:ext cx="7697756" cy="1507067"/>
+          </a:xfrm>
+        </p:spPr>
+        <p:txBody>
+          <a:bodyPr>
+            <a:normAutofit/>
+          </a:bodyPr>
+          <a:lstStyle/>
+          <a:p>
+            <a:pPr algn="ctr"/>
+            <a:r>
+              <a:rPr lang="en-US" sz="2800" dirty="0"/>
+              <a:t>General situation</a:t>
+            </a:r>
+            <a:br>
+              <a:rPr lang="en-US" sz="2800" dirty="0"/>
+            </a:br>
+            <a:r>
+              <a:rPr lang="en-US" sz="2800" dirty="0"/>
+              <a:t>Unemployment vs consumer sentiment</a:t>
+            </a:r>
+          </a:p>
+        </p:txBody>
+      </p:sp>
+      <p:sp>
+        <p:nvSpPr>
+          <p:cNvPr id="3" name="Text Placeholder 2">
+            <a:extLst>
+              <a:ext uri="{FF2B5EF4-FFF2-40B4-BE49-F238E27FC236}">
+                <a16:creationId xmlns:a16="http://schemas.microsoft.com/office/drawing/2014/main" id="{7F59D591-B9F3-4C0B-86EB-ABCF365468BD}"/>
+              </a:ext>
+            </a:extLst>
+          </p:cNvPr>
+          <p:cNvSpPr>
+            <a:spLocks noGrp="1"/>
+          </p:cNvSpPr>
+          <p:nvPr>
+            <p:ph type="body" idx="1"/>
+          </p:nvPr>
+        </p:nvSpPr>
+        <p:spPr>
+          <a:xfrm>
+            <a:off x="694716" y="5461987"/>
+            <a:ext cx="4649787" cy="576262"/>
+          </a:xfrm>
+        </p:spPr>
+        <p:txBody>
+          <a:bodyPr/>
+          <a:lstStyle/>
+          <a:p>
+            <a:pPr algn="ctr"/>
+            <a:r>
+              <a:rPr lang="en-US" dirty="0"/>
+              <a:t>Consumer Sentiment</a:t>
+            </a:r>
+          </a:p>
+          <a:p>
+            <a:pPr algn="ctr"/>
+            <a:r>
+              <a:rPr lang="en-US" sz="1800" dirty="0"/>
+              <a:t>Uncertain Future</a:t>
+            </a:r>
+          </a:p>
+          <a:p>
+            <a:pPr algn="ctr"/>
+            <a:r>
+              <a:rPr lang="en-US" sz="1000" dirty="0"/>
+              <a:t>Michigan University Survey</a:t>
+            </a:r>
+          </a:p>
+        </p:txBody>
+      </p:sp>
+      <p:pic>
+        <p:nvPicPr>
+          <p:cNvPr id="8" name="Content Placeholder 7" descr="Chart, line chart&#10;&#10;Description automatically generated">
+            <a:extLst>
+              <a:ext uri="{FF2B5EF4-FFF2-40B4-BE49-F238E27FC236}">
+                <a16:creationId xmlns:a16="http://schemas.microsoft.com/office/drawing/2014/main" id="{EF61E0F1-139C-4287-A333-C6C493416682}"/>
+              </a:ext>
+            </a:extLst>
+          </p:cNvPr>
+          <p:cNvPicPr>
+            <a:picLocks noGrp="1" noChangeAspect="1"/>
+          </p:cNvPicPr>
+          <p:nvPr>
+            <p:ph sz="half" idx="2"/>
+          </p:nvPr>
+        </p:nvPicPr>
+        <p:blipFill>
+          <a:blip r:embed="rId2">
+            <a:extLst>
+              <a:ext uri="{28A0092B-C50C-407E-A947-70E740481C1C}">
+                <a14:useLocalDpi xmlns:a14="http://schemas.microsoft.com/office/drawing/2010/main" val="0"/>
+              </a:ext>
+            </a:extLst>
+          </a:blip>
+          <a:stretch>
+            <a:fillRect/>
+          </a:stretch>
+        </p:blipFill>
+        <p:spPr>
+          <a:xfrm>
+            <a:off x="551048" y="2018393"/>
+            <a:ext cx="4937125" cy="2821213"/>
+          </a:xfrm>
+        </p:spPr>
+      </p:pic>
+      <p:sp>
+        <p:nvSpPr>
+          <p:cNvPr id="5" name="Text Placeholder 4">
+            <a:extLst>
+              <a:ext uri="{FF2B5EF4-FFF2-40B4-BE49-F238E27FC236}">
+                <a16:creationId xmlns:a16="http://schemas.microsoft.com/office/drawing/2014/main" id="{2CCB9E82-0A1C-4155-AD6A-B38344CE2796}"/>
+              </a:ext>
+            </a:extLst>
+          </p:cNvPr>
+          <p:cNvSpPr>
+            <a:spLocks noGrp="1"/>
+          </p:cNvSpPr>
+          <p:nvPr>
+            <p:ph type="body" sz="quarter" idx="3"/>
+          </p:nvPr>
+        </p:nvSpPr>
+        <p:spPr>
+          <a:xfrm>
+            <a:off x="6096000" y="5071369"/>
+            <a:ext cx="4665134" cy="576262"/>
+          </a:xfrm>
+        </p:spPr>
+        <p:txBody>
+          <a:bodyPr/>
+          <a:lstStyle/>
+          <a:p>
+            <a:pPr algn="ctr"/>
+            <a:r>
+              <a:rPr lang="en-US" dirty="0"/>
+              <a:t>Unemployment Rate</a:t>
+            </a:r>
+          </a:p>
+        </p:txBody>
+      </p:sp>
+      <p:pic>
+        <p:nvPicPr>
+          <p:cNvPr id="10" name="Content Placeholder 9" descr="Chart, line chart&#10;&#10;Description automatically generated">
+            <a:extLst>
+              <a:ext uri="{FF2B5EF4-FFF2-40B4-BE49-F238E27FC236}">
+                <a16:creationId xmlns:a16="http://schemas.microsoft.com/office/drawing/2014/main" id="{48723CF6-2C63-449E-856E-FEAC518F779A}"/>
+              </a:ext>
+            </a:extLst>
+          </p:cNvPr>
+          <p:cNvPicPr>
+            <a:picLocks noGrp="1" noChangeAspect="1"/>
+          </p:cNvPicPr>
+          <p:nvPr>
+            <p:ph sz="quarter" idx="4"/>
+          </p:nvPr>
+        </p:nvPicPr>
+        <p:blipFill>
+          <a:blip r:embed="rId3">
+            <a:extLst>
+              <a:ext uri="{28A0092B-C50C-407E-A947-70E740481C1C}">
+                <a14:useLocalDpi xmlns:a14="http://schemas.microsoft.com/office/drawing/2010/main" val="0"/>
+              </a:ext>
+            </a:extLst>
+          </a:blip>
+          <a:stretch>
+            <a:fillRect/>
+          </a:stretch>
+        </p:blipFill>
+        <p:spPr>
+          <a:xfrm>
+            <a:off x="5815012" y="2022928"/>
+            <a:ext cx="4929188" cy="2816678"/>
+          </a:xfrm>
+        </p:spPr>
+      </p:pic>
+    </p:spTree>
+    <p:extLst>
+      <p:ext uri="{BB962C8B-B14F-4D97-AF65-F5344CB8AC3E}">
+        <p14:creationId xmlns:p14="http://schemas.microsoft.com/office/powerpoint/2010/main" val="783718410"/>
+      </p:ext>
+    </p:extLst>
+  </p:cSld>
+  <p:clrMapOvr>
+    <a:masterClrMapping/>
+  </p:clrMapOvr>
+</p:sld>
+</file>
+
+<file path=ppt/slides/slide5.xml><?xml version="1.0" encoding="utf-8"?>
+<p:sld xmlns:a="http://schemas.openxmlformats.org/drawingml/2006/main" xmlns:r="http://schemas.openxmlformats.org/officeDocument/2006/relationships" xmlns:p="http://schemas.openxmlformats.org/presentationml/2006/main">
+  <p:cSld>
+    <p:spTree>
+      <p:nvGrpSpPr>
+        <p:cNvPr id="1" name=""/>
+        <p:cNvGrpSpPr/>
+        <p:nvPr/>
+      </p:nvGrpSpPr>
+      <p:grpSpPr>
+        <a:xfrm>
+          <a:off x="0" y="0"/>
+          <a:ext cx="0" cy="0"/>
+          <a:chOff x="0" y="0"/>
+          <a:chExt cx="0" cy="0"/>
+        </a:xfrm>
+      </p:grpSpPr>
+      <p:sp>
+        <p:nvSpPr>
+          <p:cNvPr id="2" name="Title 1">
+            <a:extLst>
+              <a:ext uri="{FF2B5EF4-FFF2-40B4-BE49-F238E27FC236}">
+                <a16:creationId xmlns:a16="http://schemas.microsoft.com/office/drawing/2014/main" id="{DA4518FE-C787-4DDF-9003-8D43273C40D3}"/>
+              </a:ext>
+            </a:extLst>
+          </p:cNvPr>
+          <p:cNvSpPr>
+            <a:spLocks noGrp="1"/>
+          </p:cNvSpPr>
+          <p:nvPr>
+            <p:ph type="title"/>
+          </p:nvPr>
+        </p:nvSpPr>
+        <p:spPr>
+          <a:xfrm>
+            <a:off x="1207995" y="220397"/>
+            <a:ext cx="8534400" cy="1507067"/>
+          </a:xfrm>
+        </p:spPr>
+        <p:txBody>
+          <a:bodyPr>
+            <a:normAutofit/>
+          </a:bodyPr>
+          <a:lstStyle/>
+          <a:p>
+            <a:pPr algn="ctr"/>
+            <a:r>
+              <a:rPr lang="en-US" sz="2400" dirty="0"/>
+              <a:t>Are the low interest rates affecting car sales?</a:t>
+            </a:r>
+            <a:br>
+              <a:rPr lang="en-US" sz="2400" dirty="0"/>
+            </a:br>
+            <a:br>
+              <a:rPr lang="en-US" sz="2400" dirty="0"/>
+            </a:br>
+            <a:r>
+              <a:rPr lang="en-US" sz="1200" dirty="0"/>
+              <a:t>Usually, car sales increased when interest rates are low</a:t>
+            </a:r>
+            <a:endParaRPr lang="en-US" sz="2400" dirty="0"/>
+          </a:p>
+        </p:txBody>
+      </p:sp>
+      <p:sp>
+        <p:nvSpPr>
+          <p:cNvPr id="3" name="Text Placeholder 2">
+            <a:extLst>
+              <a:ext uri="{FF2B5EF4-FFF2-40B4-BE49-F238E27FC236}">
+                <a16:creationId xmlns:a16="http://schemas.microsoft.com/office/drawing/2014/main" id="{07ADF3A1-3D88-4FDE-A893-996589CD14E3}"/>
+              </a:ext>
+            </a:extLst>
+          </p:cNvPr>
+          <p:cNvSpPr>
+            <a:spLocks noGrp="1"/>
+          </p:cNvSpPr>
+          <p:nvPr>
+            <p:ph type="body" idx="1"/>
+          </p:nvPr>
+        </p:nvSpPr>
+        <p:spPr>
+          <a:xfrm>
+            <a:off x="681738" y="5240045"/>
+            <a:ext cx="4649787" cy="576262"/>
+          </a:xfrm>
+        </p:spPr>
+        <p:txBody>
+          <a:bodyPr/>
+          <a:lstStyle/>
+          <a:p>
+            <a:r>
+              <a:rPr lang="en-US" dirty="0"/>
+              <a:t>Interest Rates 2019-2020</a:t>
+            </a:r>
+          </a:p>
+        </p:txBody>
+      </p:sp>
+      <p:pic>
+        <p:nvPicPr>
+          <p:cNvPr id="8" name="Content Placeholder 7" descr="Chart&#10;&#10;Description automatically generated">
+            <a:extLst>
+              <a:ext uri="{FF2B5EF4-FFF2-40B4-BE49-F238E27FC236}">
+                <a16:creationId xmlns:a16="http://schemas.microsoft.com/office/drawing/2014/main" id="{D833EA95-EEC3-47F5-9F93-6F546176A4CE}"/>
+              </a:ext>
+            </a:extLst>
+          </p:cNvPr>
+          <p:cNvPicPr>
+            <a:picLocks noGrp="1" noChangeAspect="1"/>
+          </p:cNvPicPr>
+          <p:nvPr>
+            <p:ph sz="half" idx="2"/>
+          </p:nvPr>
+        </p:nvPicPr>
+        <p:blipFill>
+          <a:blip r:embed="rId2">
+            <a:extLst>
+              <a:ext uri="{28A0092B-C50C-407E-A947-70E740481C1C}">
+                <a14:useLocalDpi xmlns:a14="http://schemas.microsoft.com/office/drawing/2010/main" val="0"/>
+              </a:ext>
+            </a:extLst>
+          </a:blip>
+          <a:stretch>
+            <a:fillRect/>
+          </a:stretch>
+        </p:blipFill>
+        <p:spPr>
+          <a:xfrm>
+            <a:off x="538070" y="2123056"/>
+            <a:ext cx="4937125" cy="2821213"/>
+          </a:xfrm>
+        </p:spPr>
+      </p:pic>
+      <p:sp>
+        <p:nvSpPr>
+          <p:cNvPr id="5" name="Text Placeholder 4">
+            <a:extLst>
+              <a:ext uri="{FF2B5EF4-FFF2-40B4-BE49-F238E27FC236}">
+                <a16:creationId xmlns:a16="http://schemas.microsoft.com/office/drawing/2014/main" id="{BD381A34-FF9D-46B2-9D19-D9CD69D03246}"/>
+              </a:ext>
+            </a:extLst>
+          </p:cNvPr>
+          <p:cNvSpPr>
+            <a:spLocks noGrp="1"/>
+          </p:cNvSpPr>
+          <p:nvPr>
+            <p:ph type="body" sz="quarter" idx="3"/>
+          </p:nvPr>
+        </p:nvSpPr>
+        <p:spPr>
+          <a:xfrm>
+            <a:off x="6079066" y="5240045"/>
+            <a:ext cx="4665134" cy="576262"/>
+          </a:xfrm>
+        </p:spPr>
+        <p:txBody>
+          <a:bodyPr/>
+          <a:lstStyle/>
+          <a:p>
+            <a:r>
+              <a:rPr lang="en-US" dirty="0"/>
+              <a:t>Car sales</a:t>
+            </a:r>
+          </a:p>
+        </p:txBody>
+      </p:sp>
+      <p:sp>
+        <p:nvSpPr>
+          <p:cNvPr id="6" name="Content Placeholder 5">
+            <a:extLst>
+              <a:ext uri="{FF2B5EF4-FFF2-40B4-BE49-F238E27FC236}">
+                <a16:creationId xmlns:a16="http://schemas.microsoft.com/office/drawing/2014/main" id="{BE0C6E31-3709-43C5-80E5-DF71681BDE67}"/>
+              </a:ext>
+            </a:extLst>
+          </p:cNvPr>
+          <p:cNvSpPr>
+            <a:spLocks noGrp="1"/>
+          </p:cNvSpPr>
+          <p:nvPr>
+            <p:ph sz="quarter" idx="4"/>
+          </p:nvPr>
+        </p:nvSpPr>
+        <p:spPr>
+          <a:xfrm>
+            <a:off x="5815012" y="1913731"/>
+            <a:ext cx="4929188" cy="3030538"/>
+          </a:xfrm>
+        </p:spPr>
+        <p:txBody>
+          <a:bodyPr/>
+          <a:lstStyle/>
+          <a:p>
+            <a:endParaRPr lang="en-US"/>
+          </a:p>
+        </p:txBody>
+      </p:sp>
+    </p:spTree>
+    <p:extLst>
+      <p:ext uri="{BB962C8B-B14F-4D97-AF65-F5344CB8AC3E}">
+        <p14:creationId xmlns:p14="http://schemas.microsoft.com/office/powerpoint/2010/main" val="2656675635"/>
+      </p:ext>
+    </p:extLst>
+  </p:cSld>
+  <p:clrMapOvr>
+    <a:masterClrMapping/>
+  </p:clrMapOvr>
+</p:sld>
+</file>
+
+<file path=ppt/slides/slide6.xml><?xml version="1.0" encoding="utf-8"?>
+<p:sld xmlns:a="http://schemas.openxmlformats.org/drawingml/2006/main" xmlns:r="http://schemas.openxmlformats.org/officeDocument/2006/relationships" xmlns:p="http://schemas.openxmlformats.org/presentationml/2006/main" showMasterSp="0">
+  <p:cSld>
+    <p:spTree>
+      <p:nvGrpSpPr>
+        <p:cNvPr id="1" name=""/>
+        <p:cNvGrpSpPr/>
+        <p:nvPr/>
+      </p:nvGrpSpPr>
+      <p:grpSpPr>
+        <a:xfrm>
+          <a:off x="0" y="0"/>
+          <a:ext cx="0" cy="0"/>
+          <a:chOff x="0" y="0"/>
+          <a:chExt cx="0" cy="0"/>
+        </a:xfrm>
+      </p:grpSpPr>
+      <p:sp>
+        <p:nvSpPr>
+          <p:cNvPr id="2" name="Title 1">
+            <a:extLst>
+              <a:ext uri="{FF2B5EF4-FFF2-40B4-BE49-F238E27FC236}">
+                <a16:creationId xmlns:a16="http://schemas.microsoft.com/office/drawing/2014/main" id="{05817FB4-FEC5-44F5-8A7C-792B01D8DB76}"/>
+              </a:ext>
+            </a:extLst>
+          </p:cNvPr>
+          <p:cNvSpPr>
+            <a:spLocks noGrp="1"/>
+          </p:cNvSpPr>
+          <p:nvPr>
+            <p:ph type="title"/>
+          </p:nvPr>
+        </p:nvSpPr>
+        <p:spPr>
+          <a:xfrm>
+            <a:off x="4052711" y="551771"/>
+            <a:ext cx="4052711" cy="1796318"/>
+          </a:xfrm>
+        </p:spPr>
+        <p:txBody>
+          <a:bodyPr vert="horz" wrap="square" lIns="0" tIns="0" rIns="0" bIns="0" rtlCol="0" anchor="t" anchorCtr="0">
+            <a:normAutofit fontScale="90000"/>
+          </a:bodyPr>
+          <a:lstStyle/>
+          <a:p>
+            <a:pPr algn="ctr">
+              <a:lnSpc>
+                <a:spcPct val="100000"/>
+              </a:lnSpc>
+            </a:pPr>
+            <a:r>
+              <a:rPr lang="en-US" sz="1600" dirty="0"/>
+              <a:t>Ultra-Luxury Auto Groups Tracked the S&amp;P 500 performance  the best…implying that the stock market is a driving factor in their success.</a:t>
+            </a:r>
+            <a:br>
+              <a:rPr lang="en-US" sz="1600" dirty="0"/>
+            </a:br>
+            <a:br>
+              <a:rPr lang="en-US" sz="1600" dirty="0"/>
+            </a:br>
+            <a:r>
+              <a:rPr lang="en-US" sz="1600" dirty="0"/>
+              <a:t>Tesla’s sales skyrocketed their stock price and pulled the luxury index from flat performance to outpacing the S&amp;P.</a:t>
+            </a:r>
+          </a:p>
+        </p:txBody>
+      </p:sp>
+      <p:pic>
+        <p:nvPicPr>
+          <p:cNvPr id="18" name="Content Placeholder 17" descr="Chart&#10;&#10;Description automatically generated">
+            <a:extLst>
+              <a:ext uri="{FF2B5EF4-FFF2-40B4-BE49-F238E27FC236}">
+                <a16:creationId xmlns:a16="http://schemas.microsoft.com/office/drawing/2014/main" id="{F7A71560-C9AD-42CF-AC21-A87F88CB6242}"/>
+              </a:ext>
+            </a:extLst>
+          </p:cNvPr>
+          <p:cNvPicPr>
+            <a:picLocks noGrp="1" noChangeAspect="1"/>
+          </p:cNvPicPr>
+          <p:nvPr>
+            <p:ph sz="half" idx="1"/>
+          </p:nvPr>
+        </p:nvPicPr>
+        <p:blipFill>
+          <a:blip r:embed="rId2">
+            <a:extLst>
+              <a:ext uri="{28A0092B-C50C-407E-A947-70E740481C1C}">
+                <a14:useLocalDpi xmlns:a14="http://schemas.microsoft.com/office/drawing/2010/main" val="0"/>
+              </a:ext>
+            </a:extLst>
+          </a:blip>
+          <a:stretch>
+            <a:fillRect/>
+          </a:stretch>
+        </p:blipFill>
+        <p:spPr>
+          <a:xfrm>
+            <a:off x="4162887" y="2525096"/>
+            <a:ext cx="3832358" cy="2554904"/>
+          </a:xfrm>
+        </p:spPr>
+      </p:pic>
+      <p:pic>
+        <p:nvPicPr>
+          <p:cNvPr id="8" name="Content Placeholder 7" descr="Chart&#10;&#10;Description automatically generated">
+            <a:extLst>
+              <a:ext uri="{FF2B5EF4-FFF2-40B4-BE49-F238E27FC236}">
+                <a16:creationId xmlns:a16="http://schemas.microsoft.com/office/drawing/2014/main" id="{4B64B59F-F3A4-47ED-B0A5-FE6F680BE0F7}"/>
+              </a:ext>
+            </a:extLst>
+          </p:cNvPr>
+          <p:cNvPicPr>
+            <a:picLocks noGrp="1" noChangeAspect="1"/>
+          </p:cNvPicPr>
+          <p:nvPr>
+            <p:ph sz="half" idx="2"/>
+          </p:nvPr>
+        </p:nvPicPr>
+        <p:blipFill>
+          <a:blip r:embed="rId3">
+            <a:extLst>
+              <a:ext uri="{28A0092B-C50C-407E-A947-70E740481C1C}">
+                <a14:useLocalDpi xmlns:a14="http://schemas.microsoft.com/office/drawing/2010/main" val="0"/>
+              </a:ext>
+            </a:extLst>
+          </a:blip>
+          <a:stretch>
+            <a:fillRect/>
+          </a:stretch>
+        </p:blipFill>
+        <p:spPr>
+          <a:xfrm>
+            <a:off x="442857" y="3464630"/>
+            <a:ext cx="3283464" cy="2188975"/>
+          </a:xfrm>
+          <a:custGeom>
+            <a:avLst/>
+            <a:gdLst/>
+            <a:ahLst/>
+            <a:cxnLst/>
+            <a:rect l="l" t="t" r="r" b="b"/>
+            <a:pathLst>
+              <a:path w="2327400" h="2524669">
+                <a:moveTo>
+                  <a:pt x="0" y="0"/>
+                </a:moveTo>
+                <a:lnTo>
+                  <a:pt x="2327400" y="0"/>
+                </a:lnTo>
+                <a:lnTo>
+                  <a:pt x="2327400" y="2524669"/>
+                </a:lnTo>
+                <a:lnTo>
+                  <a:pt x="0" y="2524669"/>
+                </a:lnTo>
+                <a:close/>
+              </a:path>
+            </a:pathLst>
+          </a:custGeom>
+        </p:spPr>
+      </p:pic>
+      <p:pic>
+        <p:nvPicPr>
+          <p:cNvPr id="14" name="Picture 13" descr="Chart&#10;&#10;Description automatically generated">
+            <a:extLst>
+              <a:ext uri="{FF2B5EF4-FFF2-40B4-BE49-F238E27FC236}">
+                <a16:creationId xmlns:a16="http://schemas.microsoft.com/office/drawing/2014/main" id="{8F55E7A4-8FD9-4DD3-ACE0-BCA44AE2734C}"/>
+              </a:ext>
+            </a:extLst>
+          </p:cNvPr>
+          <p:cNvPicPr>
+            <a:picLocks noChangeAspect="1"/>
+          </p:cNvPicPr>
+          <p:nvPr/>
+        </p:nvPicPr>
+        <p:blipFill>
+          <a:blip r:embed="rId4">
+            <a:extLst>
+              <a:ext uri="{28A0092B-C50C-407E-A947-70E740481C1C}">
+                <a14:useLocalDpi xmlns:a14="http://schemas.microsoft.com/office/drawing/2010/main" val="0"/>
+              </a:ext>
+            </a:extLst>
+          </a:blip>
+          <a:stretch>
+            <a:fillRect/>
+          </a:stretch>
+        </p:blipFill>
+        <p:spPr>
+          <a:xfrm>
+            <a:off x="8415445" y="551771"/>
+            <a:ext cx="3333698" cy="2222464"/>
+          </a:xfrm>
+          <a:custGeom>
+            <a:avLst/>
+            <a:gdLst/>
+            <a:ahLst/>
+            <a:cxnLst/>
+            <a:rect l="l" t="t" r="r" b="b"/>
+            <a:pathLst>
+              <a:path w="2327400" h="2524669">
+                <a:moveTo>
+                  <a:pt x="0" y="0"/>
+                </a:moveTo>
+                <a:lnTo>
+                  <a:pt x="2327400" y="0"/>
+                </a:lnTo>
+                <a:lnTo>
+                  <a:pt x="2327400" y="2524669"/>
+                </a:lnTo>
+                <a:lnTo>
+                  <a:pt x="0" y="2524669"/>
+                </a:lnTo>
+                <a:close/>
+              </a:path>
+            </a:pathLst>
+          </a:custGeom>
+        </p:spPr>
+      </p:pic>
+      <p:pic>
+        <p:nvPicPr>
+          <p:cNvPr id="16" name="Picture 15" descr="Chart&#10;&#10;Description automatically generated">
+            <a:extLst>
+              <a:ext uri="{FF2B5EF4-FFF2-40B4-BE49-F238E27FC236}">
+                <a16:creationId xmlns:a16="http://schemas.microsoft.com/office/drawing/2014/main" id="{848F1E87-E8CE-4666-848F-B182ECBD5B76}"/>
+              </a:ext>
+            </a:extLst>
+          </p:cNvPr>
+          <p:cNvPicPr>
+            <a:picLocks noChangeAspect="1"/>
+          </p:cNvPicPr>
+          <p:nvPr/>
+        </p:nvPicPr>
+        <p:blipFill>
+          <a:blip r:embed="rId5">
+            <a:extLst>
+              <a:ext uri="{28A0092B-C50C-407E-A947-70E740481C1C}">
+                <a14:useLocalDpi xmlns:a14="http://schemas.microsoft.com/office/drawing/2010/main" val="0"/>
+              </a:ext>
+            </a:extLst>
+          </a:blip>
+          <a:stretch>
+            <a:fillRect/>
+          </a:stretch>
+        </p:blipFill>
+        <p:spPr>
+          <a:xfrm>
+            <a:off x="8415446" y="3464630"/>
+            <a:ext cx="3333697" cy="2222463"/>
+          </a:xfrm>
+          <a:custGeom>
+            <a:avLst/>
+            <a:gdLst/>
+            <a:ahLst/>
+            <a:cxnLst/>
+            <a:rect l="l" t="t" r="r" b="b"/>
+            <a:pathLst>
+              <a:path w="2327400" h="2524669">
+                <a:moveTo>
+                  <a:pt x="0" y="0"/>
+                </a:moveTo>
+                <a:lnTo>
+                  <a:pt x="2327400" y="0"/>
+                </a:lnTo>
+                <a:lnTo>
+                  <a:pt x="2327400" y="2524669"/>
+                </a:lnTo>
+                <a:lnTo>
+                  <a:pt x="0" y="2524669"/>
+                </a:lnTo>
+                <a:close/>
+              </a:path>
+            </a:pathLst>
+          </a:custGeom>
+        </p:spPr>
+      </p:pic>
+      <p:pic>
+        <p:nvPicPr>
+          <p:cNvPr id="6" name="Content Placeholder 5" descr="Chart&#10;&#10;Description automatically generated">
+            <a:extLst>
+              <a:ext uri="{FF2B5EF4-FFF2-40B4-BE49-F238E27FC236}">
+                <a16:creationId xmlns:a16="http://schemas.microsoft.com/office/drawing/2014/main" id="{707D4AD0-ABD6-4E4D-8BF2-3144F4FB4522}"/>
+              </a:ext>
+            </a:extLst>
+          </p:cNvPr>
+          <p:cNvPicPr>
+            <a:picLocks noChangeAspect="1"/>
+          </p:cNvPicPr>
+          <p:nvPr/>
+        </p:nvPicPr>
+        <p:blipFill>
+          <a:blip r:embed="rId6">
+            <a:extLst>
+              <a:ext uri="{28A0092B-C50C-407E-A947-70E740481C1C}">
+                <a14:useLocalDpi xmlns:a14="http://schemas.microsoft.com/office/drawing/2010/main" val="0"/>
+              </a:ext>
+            </a:extLst>
+          </a:blip>
+          <a:stretch>
+            <a:fillRect/>
+          </a:stretch>
+        </p:blipFill>
+        <p:spPr>
+          <a:xfrm>
+            <a:off x="410116" y="572361"/>
+            <a:ext cx="3302813" cy="2201874"/>
+          </a:xfrm>
+          <a:custGeom>
+            <a:avLst/>
+            <a:gdLst/>
+            <a:ahLst/>
+            <a:cxnLst/>
+            <a:rect l="l" t="t" r="r" b="b"/>
+            <a:pathLst>
+              <a:path w="2327400" h="2524669">
+                <a:moveTo>
+                  <a:pt x="0" y="0"/>
+                </a:moveTo>
+                <a:lnTo>
+                  <a:pt x="2327400" y="0"/>
+                </a:lnTo>
+                <a:lnTo>
+                  <a:pt x="2327400" y="2524669"/>
+                </a:lnTo>
+                <a:lnTo>
+                  <a:pt x="0" y="2524669"/>
+                </a:lnTo>
+                <a:close/>
+              </a:path>
+            </a:pathLst>
+          </a:custGeom>
+        </p:spPr>
+      </p:pic>
+    </p:spTree>
+    <p:extLst>
+      <p:ext uri="{BB962C8B-B14F-4D97-AF65-F5344CB8AC3E}">
+        <p14:creationId xmlns:p14="http://schemas.microsoft.com/office/powerpoint/2010/main" val="812567914"/>
+      </p:ext>
+    </p:extLst>
+  </p:cSld>
+  <p:clrMapOvr>
+    <a:masterClrMapping/>
+  </p:clrMapOvr>
+</p:sld>
+</file>
+
+<file path=ppt/slides/slide7.xml><?xml version="1.0" encoding="utf-8"?>
 <p:sld xmlns:a="http://schemas.openxmlformats.org/drawingml/2006/main" xmlns:r="http://schemas.openxmlformats.org/officeDocument/2006/relationships" xmlns:p="http://schemas.openxmlformats.org/presentationml/2006/main">
   <p:cSld>
     <p:bg>
@@ -7214,7 +8314,7 @@
                   <a:srgbClr val="FFFFFF"/>
                 </a:solidFill>
               </a:rPr>
-              <a:t>S&amp;P 500 index vs Mid-Range Auto Group index</a:t>
+              <a:t>S&amp;P 500 index vs Economy Auto Group index</a:t>
             </a:r>
           </a:p>
         </p:txBody>
@@ -7589,12 +8689,14 @@
         </p:nvSpPr>
         <p:spPr>
           <a:xfrm>
-            <a:off x="7516616" y="2152521"/>
-            <a:ext cx="3938505" cy="4050804"/>
-          </a:xfrm>
-        </p:spPr>
-        <p:txBody>
-          <a:bodyPr/>
+            <a:off x="7516615" y="2323307"/>
+            <a:ext cx="3938505" cy="3584253"/>
+          </a:xfrm>
+        </p:spPr>
+        <p:txBody>
+          <a:bodyPr>
+            <a:normAutofit lnSpcReduction="10000"/>
+          </a:bodyPr>
           <a:lstStyle/>
           <a:p>
             <a:r>
@@ -7613,7 +8715,7 @@
                   <a:schemeClr val="bg1"/>
                 </a:solidFill>
               </a:rPr>
-              <a:t>Mid-Range Auto Groups like Ford and Toyota did not enjoy the same rise in stock prices but suffered less severely when the pandemic hit.</a:t>
+              <a:t>Tracks the S&amp;P closely with slightly less volatility.</a:t>
             </a:r>
           </a:p>
           <a:p>
@@ -7623,7 +8725,7 @@
                   <a:schemeClr val="bg1"/>
                 </a:solidFill>
               </a:rPr>
-              <a:t>Stimulus package on March 27, 2020 (red square) had less effect on Mid-Range Auto Groups.</a:t>
+              <a:t>Stimulus package on March 27, 2020 (red square) brightened the investor outlook.</a:t>
             </a:r>
           </a:p>
           <a:p>
@@ -7649,7 +8751,7 @@
                   <a:schemeClr val="bg1"/>
                 </a:solidFill>
               </a:rPr>
-              <a:t> red square) flattened auto group stock prices.</a:t>
+              <a:t> red square) had little effect on stock price.</a:t>
             </a:r>
           </a:p>
           <a:p>
@@ -7659,17 +8761,24 @@
                   <a:schemeClr val="bg1"/>
                 </a:solidFill>
               </a:rPr>
-              <a:t>Implication is that investors had a less positive outlook on the near future of this vehicle segment’s buyers.</a:t>
-            </a:r>
+              <a:t>Implication is that investors had a positive outlook on the near future of economy vehicle sales by companies like Hyundai and Kia.</a:t>
+            </a:r>
+          </a:p>
+          <a:p>
+            <a:endParaRPr lang="en-US" dirty="0">
+              <a:solidFill>
+                <a:schemeClr val="bg1"/>
+              </a:solidFill>
+            </a:endParaRPr>
           </a:p>
         </p:txBody>
       </p:sp>
       <p:pic>
         <p:nvPicPr>
-          <p:cNvPr id="8" name="Content Placeholder 7" descr="Chart&#10;&#10;Description automatically generated">
+          <p:cNvPr id="6" name="Content Placeholder 5" descr="Chart&#10;&#10;Description automatically generated">
             <a:extLst>
               <a:ext uri="{FF2B5EF4-FFF2-40B4-BE49-F238E27FC236}">
-                <a16:creationId xmlns:a16="http://schemas.microsoft.com/office/drawing/2014/main" id="{9798CFB4-7D8C-42A7-B6B5-33C1DA037F9F}"/>
+                <a16:creationId xmlns:a16="http://schemas.microsoft.com/office/drawing/2014/main" id="{613F8CAD-0FFD-41BF-B750-D2491B6D9002}"/>
               </a:ext>
             </a:extLst>
           </p:cNvPr>
@@ -7694,15 +8803,15 @@
         </p:blipFill>
         <p:spPr>
           <a:xfrm>
-            <a:off x="774706" y="1075589"/>
-            <a:ext cx="6159017" cy="4106011"/>
+            <a:off x="736879" y="1154961"/>
+            <a:ext cx="6196843" cy="4131228"/>
           </a:xfrm>
         </p:spPr>
       </p:pic>
     </p:spTree>
     <p:extLst>
       <p:ext uri="{BB962C8B-B14F-4D97-AF65-F5344CB8AC3E}">
-        <p14:creationId xmlns:p14="http://schemas.microsoft.com/office/powerpoint/2010/main" val="3159290180"/>
+        <p14:creationId xmlns:p14="http://schemas.microsoft.com/office/powerpoint/2010/main" val="3656836066"/>
       </p:ext>
     </p:extLst>
   </p:cSld>
@@ -7712,7 +8821,7 @@
 </p:sld>
 </file>
 
-<file path=ppt/slides/slide5.xml><?xml version="1.0" encoding="utf-8"?>
+<file path=ppt/slides/slide8.xml><?xml version="1.0" encoding="utf-8"?>
 <p:sld xmlns:a="http://schemas.openxmlformats.org/drawingml/2006/main" xmlns:r="http://schemas.openxmlformats.org/officeDocument/2006/relationships" xmlns:p="http://schemas.openxmlformats.org/presentationml/2006/main">
   <p:cSld>
     <p:bg>
@@ -8092,7 +9201,7 @@
                   <a:srgbClr val="FFFFFF"/>
                 </a:solidFill>
               </a:rPr>
-              <a:t>S&amp;P 500 index vs Luxury Auto Group index</a:t>
+              <a:t>S&amp;P 500 index vs Mid-Range Auto Group index</a:t>
             </a:r>
           </a:p>
         </p:txBody>
@@ -8467,14 +9576,12 @@
         </p:nvSpPr>
         <p:spPr>
           <a:xfrm>
-            <a:off x="7516616" y="2049430"/>
+            <a:off x="7516616" y="2152521"/>
             <a:ext cx="3938505" cy="4050804"/>
           </a:xfrm>
         </p:spPr>
         <p:txBody>
-          <a:bodyPr>
-            <a:normAutofit/>
-          </a:bodyPr>
+          <a:bodyPr/>
           <a:lstStyle/>
           <a:p>
             <a:r>
@@ -8493,33 +9600,63 @@
                   <a:schemeClr val="bg1"/>
                 </a:solidFill>
               </a:rPr>
-              <a:t>Luxury Auto Groups like Mercedes and BMW initially look like nothing stood in the way of luxury cars rolling onto the roads... but this is misleading. Tesla sales </a:t>
-            </a:r>
-            <a:r>
-              <a:rPr lang="en-US" sz="1600" dirty="0">
-                <a:solidFill>
-                  <a:schemeClr val="bg1"/>
-                </a:solidFill>
-              </a:rPr>
-              <a:t>skyrocketed their stock price and drove the luxury index from flat performance to outpacing the S&amp;P. While relatively flat throughout 2018 and 2019 the stock has increased in value ten </a:t>
-            </a:r>
+              <a:t>Mid-Range Auto Groups like Ford and Toyota did not enjoy the same rise in stock prices but suffered less severely when the pandemic hit.</a:t>
+            </a:r>
+          </a:p>
+          <a:p>
             <a:r>
               <a:rPr lang="en-US" dirty="0">
                 <a:solidFill>
                   <a:schemeClr val="bg1"/>
                 </a:solidFill>
               </a:rPr>
-              <a:t>times over. This has dominated the index and other broad economic factors though a flattening in the slope is observed in April through June.</a:t>
+              <a:t>Stimulus package on March 27, 2020 (red square) had less effect on Mid-Range Auto Groups.</a:t>
+            </a:r>
+          </a:p>
+          <a:p>
+            <a:r>
+              <a:rPr lang="en-US" dirty="0">
+                <a:solidFill>
+                  <a:schemeClr val="bg1"/>
+                </a:solidFill>
+              </a:rPr>
+              <a:t>Hitting 100,000 COVID deaths on May 27, 2020 (indicated by 2</a:t>
+            </a:r>
+            <a:r>
+              <a:rPr lang="en-US" baseline="30000" dirty="0">
+                <a:solidFill>
+                  <a:schemeClr val="bg1"/>
+                </a:solidFill>
+              </a:rPr>
+              <a:t>nd</a:t>
+            </a:r>
+            <a:r>
+              <a:rPr lang="en-US" dirty="0">
+                <a:solidFill>
+                  <a:schemeClr val="bg1"/>
+                </a:solidFill>
+              </a:rPr>
+              <a:t> red square) flattened auto group stock prices.</a:t>
+            </a:r>
+          </a:p>
+          <a:p>
+            <a:r>
+              <a:rPr lang="en-US" dirty="0">
+                <a:solidFill>
+                  <a:schemeClr val="bg1"/>
+                </a:solidFill>
+              </a:rPr>
+              <a:t>Implication is that investors had a less positive outlook on the near future of this vehicle segment’s buyers.</a:t>
             </a:r>
           </a:p>
         </p:txBody>
       </p:sp>
       <p:pic>
         <p:nvPicPr>
-          <p:cNvPr id="6" name="Content Placeholder 5" descr="Chart, scatter chart&#10;&#10;Description automatically generated">
+          <p:cNvPr id="8" name="Content Placeholder 7" descr="Chart&#10;&#10;Description automatically generated">
             <a:extLst>
               <a:ext uri="{FF2B5EF4-FFF2-40B4-BE49-F238E27FC236}">
-                <a16:creationId xmlns:a16="http://schemas.microsoft.com/office/drawing/2014/main" id="{29C72DC6-2730-4009-85AE-223E2DB55D7E}"/>
+                <a16:creationId xmlns:a16="http://schemas.microsoft.com/office/drawing/2014/main" id="{9798CFB4-7D8C-42A7-B6B5-33C1DA037F9F}"/>
               </a:ext>
             </a:extLst>
           </p:cNvPr>
@@ -8544,15 +9681,15 @@
         </p:blipFill>
         <p:spPr>
           <a:xfrm>
-            <a:off x="837127" y="1142422"/>
-            <a:ext cx="6215651" cy="4143767"/>
+            <a:off x="774706" y="1075589"/>
+            <a:ext cx="6159017" cy="4106011"/>
           </a:xfrm>
         </p:spPr>
       </p:pic>
     </p:spTree>
     <p:extLst>
       <p:ext uri="{BB962C8B-B14F-4D97-AF65-F5344CB8AC3E}">
-        <p14:creationId xmlns:p14="http://schemas.microsoft.com/office/powerpoint/2010/main" val="1626599140"/>
+        <p14:creationId xmlns:p14="http://schemas.microsoft.com/office/powerpoint/2010/main" val="3159290180"/>
       </p:ext>
     </p:extLst>
   </p:cSld>
@@ -8562,7 +9699,7 @@
 </p:sld>
 </file>
 
-<file path=ppt/slides/slide6.xml><?xml version="1.0" encoding="utf-8"?>
+<file path=ppt/slides/slide9.xml><?xml version="1.0" encoding="utf-8"?>
 <p:sld xmlns:a="http://schemas.openxmlformats.org/drawingml/2006/main" xmlns:r="http://schemas.openxmlformats.org/officeDocument/2006/relationships" xmlns:p="http://schemas.openxmlformats.org/presentationml/2006/main">
   <p:cSld>
     <p:bg>
@@ -8942,7 +10079,7 @@
                   <a:srgbClr val="FFFFFF"/>
                 </a:solidFill>
               </a:rPr>
-              <a:t>S&amp;P 500 index vs ULTRA Luxury Auto Group index</a:t>
+              <a:t>S&amp;P 500 index vs Luxury Auto Group index</a:t>
             </a:r>
           </a:p>
         </p:txBody>
@@ -9343,17 +10480,33 @@
                   <a:schemeClr val="bg1"/>
                 </a:solidFill>
               </a:rPr>
-              <a:t>Interestingly, ultra luxury auto groups like Porsche, Ferrari, and McLaren tracked the stock market the most closely of the four segments and only marginally better than Economy auto groups. This implies that stock market performance may factor into car sales which, in turn, supports stock price.  </a:t>
+              <a:t>Luxury Auto Groups like Mercedes and BMW initially look like nothing stood in the way of luxury cars rolling onto the roads... but this is misleading. Tesla sales </a:t>
+            </a:r>
+            <a:r>
+              <a:rPr lang="en-US" sz="1600" dirty="0">
+                <a:solidFill>
+                  <a:schemeClr val="bg1"/>
+                </a:solidFill>
+              </a:rPr>
+              <a:t>skyrocketed their stock price and drove the luxury index from flat performance to outpacing the S&amp;P. While relatively flat throughout 2018 and 2019 the stock has increased in value ten </a:t>
+            </a:r>
+            <a:r>
+              <a:rPr lang="en-US" dirty="0">
+                <a:solidFill>
+                  <a:schemeClr val="bg1"/>
+                </a:solidFill>
+              </a:rPr>
+              <a:t>times over. This has dominated the index and other broad economic factors though a flattening in the slope is observed in April through June.</a:t>
             </a:r>
           </a:p>
         </p:txBody>
       </p:sp>
       <p:pic>
         <p:nvPicPr>
-          <p:cNvPr id="8" name="Content Placeholder 7" descr="Chart&#10;&#10;Description automatically generated">
+          <p:cNvPr id="6" name="Content Placeholder 5" descr="Chart, scatter chart&#10;&#10;Description automatically generated">
             <a:extLst>
               <a:ext uri="{FF2B5EF4-FFF2-40B4-BE49-F238E27FC236}">
-                <a16:creationId xmlns:a16="http://schemas.microsoft.com/office/drawing/2014/main" id="{3FBF23BD-028B-43E3-896C-790E67EC4A25}"/>
+                <a16:creationId xmlns:a16="http://schemas.microsoft.com/office/drawing/2014/main" id="{29C72DC6-2730-4009-85AE-223E2DB55D7E}"/>
               </a:ext>
             </a:extLst>
           </p:cNvPr>
@@ -9378,486 +10531,20 @@
         </p:blipFill>
         <p:spPr>
           <a:xfrm>
-            <a:off x="816482" y="1081825"/>
-            <a:ext cx="6131238" cy="4087492"/>
+            <a:off x="837127" y="1142422"/>
+            <a:ext cx="6215651" cy="4143767"/>
           </a:xfrm>
         </p:spPr>
       </p:pic>
     </p:spTree>
     <p:extLst>
       <p:ext uri="{BB962C8B-B14F-4D97-AF65-F5344CB8AC3E}">
-        <p14:creationId xmlns:p14="http://schemas.microsoft.com/office/powerpoint/2010/main" val="3056262080"/>
+        <p14:creationId xmlns:p14="http://schemas.microsoft.com/office/powerpoint/2010/main" val="1626599140"/>
       </p:ext>
     </p:extLst>
   </p:cSld>
   <p:clrMapOvr>
     <a:overrideClrMapping bg1="lt1" tx1="dk1" bg2="lt2" tx2="dk2" accent1="accent1" accent2="accent2" accent3="accent3" accent4="accent4" accent5="accent5" accent6="accent6" hlink="hlink" folHlink="folHlink"/>
-  </p:clrMapOvr>
-</p:sld>
-</file>
-
-<file path=ppt/slides/slide7.xml><?xml version="1.0" encoding="utf-8"?>
-<p:sld xmlns:a="http://schemas.openxmlformats.org/drawingml/2006/main" xmlns:r="http://schemas.openxmlformats.org/officeDocument/2006/relationships" xmlns:p="http://schemas.openxmlformats.org/presentationml/2006/main">
-  <p:cSld>
-    <p:spTree>
-      <p:nvGrpSpPr>
-        <p:cNvPr id="1" name=""/>
-        <p:cNvGrpSpPr/>
-        <p:nvPr/>
-      </p:nvGrpSpPr>
-      <p:grpSpPr>
-        <a:xfrm>
-          <a:off x="0" y="0"/>
-          <a:ext cx="0" cy="0"/>
-          <a:chOff x="0" y="0"/>
-          <a:chExt cx="0" cy="0"/>
-        </a:xfrm>
-      </p:grpSpPr>
-      <p:sp>
-        <p:nvSpPr>
-          <p:cNvPr id="2" name="Title 1">
-            <a:extLst>
-              <a:ext uri="{FF2B5EF4-FFF2-40B4-BE49-F238E27FC236}">
-                <a16:creationId xmlns:a16="http://schemas.microsoft.com/office/drawing/2014/main" id="{6CBE862C-82C3-4133-B194-BB8D5564D871}"/>
-              </a:ext>
-            </a:extLst>
-          </p:cNvPr>
-          <p:cNvSpPr>
-            <a:spLocks noGrp="1"/>
-          </p:cNvSpPr>
-          <p:nvPr>
-            <p:ph type="title"/>
-          </p:nvPr>
-        </p:nvSpPr>
-        <p:spPr/>
-        <p:txBody>
-          <a:bodyPr/>
-          <a:lstStyle/>
-          <a:p>
-            <a:r>
-              <a:rPr lang="en-US" dirty="0"/>
-              <a:t>Team 6 Analysts</a:t>
-            </a:r>
-          </a:p>
-        </p:txBody>
-      </p:sp>
-      <p:pic>
-        <p:nvPicPr>
-          <p:cNvPr id="6" name="Content Placeholder 5" descr="A person wearing a uniform&#10;&#10;Description automatically generated with low confidence">
-            <a:extLst>
-              <a:ext uri="{FF2B5EF4-FFF2-40B4-BE49-F238E27FC236}">
-                <a16:creationId xmlns:a16="http://schemas.microsoft.com/office/drawing/2014/main" id="{480EC34A-A090-4DEF-AD49-6EA6CFF45BD8}"/>
-              </a:ext>
-            </a:extLst>
-          </p:cNvPr>
-          <p:cNvPicPr>
-            <a:picLocks noGrp="1" noChangeAspect="1"/>
-          </p:cNvPicPr>
-          <p:nvPr>
-            <p:ph idx="1"/>
-          </p:nvPr>
-        </p:nvPicPr>
-        <p:blipFill>
-          <a:blip r:embed="rId2">
-            <a:extLst>
-              <a:ext uri="{28A0092B-C50C-407E-A947-70E740481C1C}">
-                <a14:useLocalDpi xmlns:a14="http://schemas.microsoft.com/office/drawing/2010/main" val="0"/>
-              </a:ext>
-            </a:extLst>
-          </a:blip>
-          <a:stretch>
-            <a:fillRect/>
-          </a:stretch>
-        </p:blipFill>
-        <p:spPr>
-          <a:xfrm>
-            <a:off x="1032436" y="5065713"/>
-            <a:ext cx="1106487" cy="1106487"/>
-          </a:xfrm>
-          <a:prstGeom prst="ellipse">
-            <a:avLst/>
-          </a:prstGeom>
-          <a:ln w="63500" cap="rnd">
-            <a:solidFill>
-              <a:schemeClr val="bg2"/>
-            </a:solidFill>
-          </a:ln>
-          <a:effectLst>
-            <a:outerShdw blurRad="381000" dist="292100" dir="5400000" sx="-80000" sy="-18000" rotWithShape="0">
-              <a:srgbClr val="000000">
-                <a:alpha val="22000"/>
-              </a:srgbClr>
-            </a:outerShdw>
-          </a:effectLst>
-          <a:scene3d>
-            <a:camera prst="orthographicFront"/>
-            <a:lightRig rig="contrasting" dir="t">
-              <a:rot lat="0" lon="0" rev="3000000"/>
-            </a:lightRig>
-          </a:scene3d>
-          <a:sp3d contourW="7620">
-            <a:bevelT w="95250" h="31750"/>
-            <a:contourClr>
-              <a:srgbClr val="333333"/>
-            </a:contourClr>
-          </a:sp3d>
-        </p:spPr>
-      </p:pic>
-      <p:sp>
-        <p:nvSpPr>
-          <p:cNvPr id="4" name="Text Placeholder 3">
-            <a:extLst>
-              <a:ext uri="{FF2B5EF4-FFF2-40B4-BE49-F238E27FC236}">
-                <a16:creationId xmlns:a16="http://schemas.microsoft.com/office/drawing/2014/main" id="{BE93A2DA-6AC4-48BB-93CE-4EEC0A83C825}"/>
-              </a:ext>
-            </a:extLst>
-          </p:cNvPr>
-          <p:cNvSpPr>
-            <a:spLocks noGrp="1"/>
-          </p:cNvSpPr>
-          <p:nvPr>
-            <p:ph type="body" sz="half" idx="2"/>
-          </p:nvPr>
-        </p:nvSpPr>
-        <p:spPr/>
-        <p:txBody>
-          <a:bodyPr/>
-          <a:lstStyle/>
-          <a:p>
-            <a:r>
-              <a:rPr lang="en-US" dirty="0"/>
-              <a:t>Team 6 Analytical Group uses data to explain how world and national events affect the financial markets. </a:t>
-            </a:r>
-          </a:p>
-          <a:p>
-            <a:r>
-              <a:rPr lang="en-US" dirty="0"/>
-              <a:t>Contact us for your next research project.</a:t>
-            </a:r>
-          </a:p>
-        </p:txBody>
-      </p:sp>
-      <p:pic>
-        <p:nvPicPr>
-          <p:cNvPr id="10" name="Picture 9">
-            <a:extLst>
-              <a:ext uri="{FF2B5EF4-FFF2-40B4-BE49-F238E27FC236}">
-                <a16:creationId xmlns:a16="http://schemas.microsoft.com/office/drawing/2014/main" id="{7E5B45FD-07BB-492D-8DB4-C628F9CFCC66}"/>
-              </a:ext>
-            </a:extLst>
-          </p:cNvPr>
-          <p:cNvPicPr>
-            <a:picLocks noChangeAspect="1"/>
-          </p:cNvPicPr>
-          <p:nvPr/>
-        </p:nvPicPr>
-        <p:blipFill>
-          <a:blip r:embed="rId3"/>
-          <a:stretch>
-            <a:fillRect/>
-          </a:stretch>
-        </p:blipFill>
-        <p:spPr>
-          <a:xfrm>
-            <a:off x="479193" y="3673210"/>
-            <a:ext cx="1106487" cy="1106487"/>
-          </a:xfrm>
-          <a:prstGeom prst="ellipse">
-            <a:avLst/>
-          </a:prstGeom>
-          <a:ln w="63500" cap="rnd">
-            <a:solidFill>
-              <a:schemeClr val="bg2"/>
-            </a:solidFill>
-          </a:ln>
-          <a:effectLst>
-            <a:outerShdw blurRad="381000" dist="292100" dir="5400000" sx="-80000" sy="-18000" rotWithShape="0">
-              <a:srgbClr val="000000">
-                <a:alpha val="22000"/>
-              </a:srgbClr>
-            </a:outerShdw>
-          </a:effectLst>
-          <a:scene3d>
-            <a:camera prst="orthographicFront"/>
-            <a:lightRig rig="contrasting" dir="t">
-              <a:rot lat="0" lon="0" rev="3000000"/>
-            </a:lightRig>
-          </a:scene3d>
-          <a:sp3d contourW="7620">
-            <a:bevelT w="95250" h="31750"/>
-            <a:contourClr>
-              <a:srgbClr val="333333"/>
-            </a:contourClr>
-          </a:sp3d>
-        </p:spPr>
-      </p:pic>
-      <p:pic>
-        <p:nvPicPr>
-          <p:cNvPr id="11" name="Picture 10">
-            <a:extLst>
-              <a:ext uri="{FF2B5EF4-FFF2-40B4-BE49-F238E27FC236}">
-                <a16:creationId xmlns:a16="http://schemas.microsoft.com/office/drawing/2014/main" id="{30733EC8-B0EA-468A-A11F-4BF9037BAB07}"/>
-              </a:ext>
-            </a:extLst>
-          </p:cNvPr>
-          <p:cNvPicPr>
-            <a:picLocks noChangeAspect="1"/>
-          </p:cNvPicPr>
-          <p:nvPr/>
-        </p:nvPicPr>
-        <p:blipFill>
-          <a:blip r:embed="rId4"/>
-          <a:stretch>
-            <a:fillRect/>
-          </a:stretch>
-        </p:blipFill>
-        <p:spPr>
-          <a:xfrm>
-            <a:off x="1032437" y="2148945"/>
-            <a:ext cx="1106487" cy="1106487"/>
-          </a:xfrm>
-          <a:prstGeom prst="ellipse">
-            <a:avLst/>
-          </a:prstGeom>
-          <a:ln w="63500" cap="rnd">
-            <a:solidFill>
-              <a:schemeClr val="bg2"/>
-            </a:solidFill>
-          </a:ln>
-          <a:effectLst>
-            <a:outerShdw blurRad="381000" dist="292100" dir="5400000" sx="-80000" sy="-18000" rotWithShape="0">
-              <a:srgbClr val="000000">
-                <a:alpha val="22000"/>
-              </a:srgbClr>
-            </a:outerShdw>
-          </a:effectLst>
-          <a:scene3d>
-            <a:camera prst="orthographicFront"/>
-            <a:lightRig rig="contrasting" dir="t">
-              <a:rot lat="0" lon="0" rev="3000000"/>
-            </a:lightRig>
-          </a:scene3d>
-          <a:sp3d contourW="7620">
-            <a:bevelT w="95250" h="31750"/>
-            <a:contourClr>
-              <a:srgbClr val="333333"/>
-            </a:contourClr>
-          </a:sp3d>
-        </p:spPr>
-      </p:pic>
-      <p:pic>
-        <p:nvPicPr>
-          <p:cNvPr id="14" name="Picture 13" descr="A person with a beard&#10;&#10;Description automatically generated with low confidence">
-            <a:extLst>
-              <a:ext uri="{FF2B5EF4-FFF2-40B4-BE49-F238E27FC236}">
-                <a16:creationId xmlns:a16="http://schemas.microsoft.com/office/drawing/2014/main" id="{863DAAD5-85A8-4ACE-93EE-DB3B5D111923}"/>
-              </a:ext>
-            </a:extLst>
-          </p:cNvPr>
-          <p:cNvPicPr>
-            <a:picLocks noChangeAspect="1"/>
-          </p:cNvPicPr>
-          <p:nvPr/>
-        </p:nvPicPr>
-        <p:blipFill>
-          <a:blip r:embed="rId5">
-            <a:extLst>
-              <a:ext uri="{28A0092B-C50C-407E-A947-70E740481C1C}">
-                <a14:useLocalDpi xmlns:a14="http://schemas.microsoft.com/office/drawing/2010/main" val="0"/>
-              </a:ext>
-            </a:extLst>
-          </a:blip>
-          <a:stretch>
-            <a:fillRect/>
-          </a:stretch>
-        </p:blipFill>
-        <p:spPr>
-          <a:xfrm>
-            <a:off x="479194" y="685800"/>
-            <a:ext cx="1150944" cy="1106487"/>
-          </a:xfrm>
-          <a:prstGeom prst="ellipse">
-            <a:avLst/>
-          </a:prstGeom>
-          <a:ln w="63500" cap="rnd">
-            <a:solidFill>
-              <a:schemeClr val="bg2"/>
-            </a:solidFill>
-          </a:ln>
-          <a:effectLst>
-            <a:outerShdw blurRad="381000" dist="292100" dir="5400000" sx="-80000" sy="-18000" rotWithShape="0">
-              <a:srgbClr val="000000">
-                <a:alpha val="22000"/>
-              </a:srgbClr>
-            </a:outerShdw>
-          </a:effectLst>
-          <a:scene3d>
-            <a:camera prst="orthographicFront"/>
-            <a:lightRig rig="contrasting" dir="t">
-              <a:rot lat="0" lon="0" rev="3000000"/>
-            </a:lightRig>
-          </a:scene3d>
-          <a:sp3d contourW="7620">
-            <a:bevelT w="95250" h="31750"/>
-            <a:contourClr>
-              <a:srgbClr val="333333"/>
-            </a:contourClr>
-          </a:sp3d>
-        </p:spPr>
-      </p:pic>
-      <p:sp>
-        <p:nvSpPr>
-          <p:cNvPr id="15" name="TextBox 14">
-            <a:extLst>
-              <a:ext uri="{FF2B5EF4-FFF2-40B4-BE49-F238E27FC236}">
-                <a16:creationId xmlns:a16="http://schemas.microsoft.com/office/drawing/2014/main" id="{29F54FF5-2F9F-4B67-8A89-CA8A4090AEAF}"/>
-              </a:ext>
-            </a:extLst>
-          </p:cNvPr>
-          <p:cNvSpPr txBox="1"/>
-          <p:nvPr/>
-        </p:nvSpPr>
-        <p:spPr>
-          <a:xfrm>
-            <a:off x="2138923" y="685800"/>
-            <a:ext cx="3322077" cy="1077218"/>
-          </a:xfrm>
-          <a:prstGeom prst="rect">
-            <a:avLst/>
-          </a:prstGeom>
-          <a:noFill/>
-        </p:spPr>
-        <p:txBody>
-          <a:bodyPr wrap="square" rtlCol="0">
-            <a:spAutoFit/>
-          </a:bodyPr>
-          <a:lstStyle/>
-          <a:p>
-            <a:r>
-              <a:rPr lang="en-US" sz="1600" dirty="0"/>
-              <a:t>Luis Fernando Ruiz delves into government data and highlights what we need to know.</a:t>
-            </a:r>
-          </a:p>
-        </p:txBody>
-      </p:sp>
-      <p:sp>
-        <p:nvSpPr>
-          <p:cNvPr id="16" name="TextBox 15">
-            <a:extLst>
-              <a:ext uri="{FF2B5EF4-FFF2-40B4-BE49-F238E27FC236}">
-                <a16:creationId xmlns:a16="http://schemas.microsoft.com/office/drawing/2014/main" id="{A9C7F89D-E4F4-4DDF-BCA1-C18B932640C2}"/>
-              </a:ext>
-            </a:extLst>
-          </p:cNvPr>
-          <p:cNvSpPr txBox="1"/>
-          <p:nvPr/>
-        </p:nvSpPr>
-        <p:spPr>
-          <a:xfrm>
-            <a:off x="2507223" y="2040468"/>
-            <a:ext cx="3322077" cy="1323439"/>
-          </a:xfrm>
-          <a:prstGeom prst="rect">
-            <a:avLst/>
-          </a:prstGeom>
-          <a:noFill/>
-        </p:spPr>
-        <p:txBody>
-          <a:bodyPr wrap="square" rtlCol="0">
-            <a:spAutoFit/>
-          </a:bodyPr>
-          <a:lstStyle/>
-          <a:p>
-            <a:r>
-              <a:rPr lang="en-US" sz="1600" dirty="0" err="1"/>
-              <a:t>Phillecia</a:t>
-            </a:r>
-            <a:r>
-              <a:rPr lang="en-US" sz="1600" dirty="0"/>
-              <a:t> Qualls is our automotive sector guru and keeps an eye on who is  in front of the pack and who has been left on the side of the road.</a:t>
-            </a:r>
-          </a:p>
-        </p:txBody>
-      </p:sp>
-      <p:sp>
-        <p:nvSpPr>
-          <p:cNvPr id="17" name="TextBox 16">
-            <a:extLst>
-              <a:ext uri="{FF2B5EF4-FFF2-40B4-BE49-F238E27FC236}">
-                <a16:creationId xmlns:a16="http://schemas.microsoft.com/office/drawing/2014/main" id="{B1C8E6A2-68C5-44B2-840F-463B664CE58D}"/>
-              </a:ext>
-            </a:extLst>
-          </p:cNvPr>
-          <p:cNvSpPr txBox="1"/>
-          <p:nvPr/>
-        </p:nvSpPr>
-        <p:spPr>
-          <a:xfrm>
-            <a:off x="2138922" y="3560598"/>
-            <a:ext cx="3322077" cy="1077218"/>
-          </a:xfrm>
-          <a:prstGeom prst="rect">
-            <a:avLst/>
-          </a:prstGeom>
-          <a:noFill/>
-        </p:spPr>
-        <p:txBody>
-          <a:bodyPr wrap="square" rtlCol="0">
-            <a:spAutoFit/>
-          </a:bodyPr>
-          <a:lstStyle/>
-          <a:p>
-            <a:r>
-              <a:rPr lang="en-US" sz="1600" dirty="0"/>
-              <a:t>Karen Pearson is our healthcare sector guru and offers us a prognosis of the factors and the players in this space.</a:t>
-            </a:r>
-          </a:p>
-        </p:txBody>
-      </p:sp>
-      <p:sp>
-        <p:nvSpPr>
-          <p:cNvPr id="18" name="TextBox 17">
-            <a:extLst>
-              <a:ext uri="{FF2B5EF4-FFF2-40B4-BE49-F238E27FC236}">
-                <a16:creationId xmlns:a16="http://schemas.microsoft.com/office/drawing/2014/main" id="{CFC1BC62-76D3-4F7F-AE1C-BE6083D2FFBF}"/>
-              </a:ext>
-            </a:extLst>
-          </p:cNvPr>
-          <p:cNvSpPr txBox="1"/>
-          <p:nvPr/>
-        </p:nvSpPr>
-        <p:spPr>
-          <a:xfrm>
-            <a:off x="2507222" y="5065713"/>
-            <a:ext cx="3322077" cy="1077218"/>
-          </a:xfrm>
-          <a:prstGeom prst="rect">
-            <a:avLst/>
-          </a:prstGeom>
-          <a:noFill/>
-        </p:spPr>
-        <p:txBody>
-          <a:bodyPr wrap="square" rtlCol="0">
-            <a:spAutoFit/>
-          </a:bodyPr>
-          <a:lstStyle/>
-          <a:p>
-            <a:r>
-              <a:rPr lang="en-US" sz="1600" dirty="0"/>
-              <a:t>Dana Woodruff tracks the stock market’s reactions to news and events… what happened and why.</a:t>
-            </a:r>
-          </a:p>
-        </p:txBody>
-      </p:sp>
-    </p:spTree>
-    <p:extLst>
-      <p:ext uri="{BB962C8B-B14F-4D97-AF65-F5344CB8AC3E}">
-        <p14:creationId xmlns:p14="http://schemas.microsoft.com/office/powerpoint/2010/main" val="1992665179"/>
-      </p:ext>
-    </p:extLst>
-  </p:cSld>
-  <p:clrMapOvr>
-    <a:masterClrMapping/>
   </p:clrMapOvr>
 </p:sld>
 </file>

</xml_diff>

<commit_message>
Changed consumer sentiment graph in stocks plot
</commit_message>
<xml_diff>
--- a/StockPowerPointSlideMockup.pptx
+++ b/StockPowerPointSlideMockup.pptx
@@ -5,25 +5,28 @@
     <p:sldMasterId id="2147483700" r:id="rId1"/>
   </p:sldMasterIdLst>
   <p:notesMasterIdLst>
-    <p:notesMasterId r:id="rId18"/>
+    <p:notesMasterId r:id="rId21"/>
   </p:notesMasterIdLst>
   <p:sldIdLst>
     <p:sldId id="256" r:id="rId2"/>
-    <p:sldId id="263" r:id="rId3"/>
-    <p:sldId id="264" r:id="rId4"/>
-    <p:sldId id="270" r:id="rId5"/>
-    <p:sldId id="267" r:id="rId6"/>
-    <p:sldId id="268" r:id="rId7"/>
-    <p:sldId id="266" r:id="rId8"/>
-    <p:sldId id="265" r:id="rId9"/>
-    <p:sldId id="269" r:id="rId10"/>
-    <p:sldId id="258" r:id="rId11"/>
-    <p:sldId id="272" r:id="rId12"/>
-    <p:sldId id="271" r:id="rId13"/>
-    <p:sldId id="259" r:id="rId14"/>
-    <p:sldId id="260" r:id="rId15"/>
-    <p:sldId id="261" r:id="rId16"/>
-    <p:sldId id="262" r:id="rId17"/>
+    <p:sldId id="273" r:id="rId3"/>
+    <p:sldId id="263" r:id="rId4"/>
+    <p:sldId id="264" r:id="rId5"/>
+    <p:sldId id="270" r:id="rId6"/>
+    <p:sldId id="267" r:id="rId7"/>
+    <p:sldId id="268" r:id="rId8"/>
+    <p:sldId id="266" r:id="rId9"/>
+    <p:sldId id="274" r:id="rId10"/>
+    <p:sldId id="265" r:id="rId11"/>
+    <p:sldId id="269" r:id="rId12"/>
+    <p:sldId id="258" r:id="rId13"/>
+    <p:sldId id="272" r:id="rId14"/>
+    <p:sldId id="271" r:id="rId15"/>
+    <p:sldId id="259" r:id="rId16"/>
+    <p:sldId id="260" r:id="rId17"/>
+    <p:sldId id="261" r:id="rId18"/>
+    <p:sldId id="275" r:id="rId19"/>
+    <p:sldId id="262" r:id="rId20"/>
   </p:sldIdLst>
   <p:sldSz cx="12192000" cy="6858000"/>
   <p:notesSz cx="6858000" cy="9144000"/>
@@ -556,7 +559,7 @@
           <a:p>
             <a:fld id="{93D46B6A-9325-4C51-AC58-73EE988D03CD}" type="slidenum">
               <a:rPr lang="en-US" smtClean="0"/>
-              <a:t>10</a:t>
+              <a:t>12</a:t>
             </a:fld>
             <a:endParaRPr lang="en-US"/>
           </a:p>
@@ -652,7 +655,7 @@
           <a:p>
             <a:fld id="{93D46B6A-9325-4C51-AC58-73EE988D03CD}" type="slidenum">
               <a:rPr lang="en-US" smtClean="0"/>
-              <a:t>11</a:t>
+              <a:t>13</a:t>
             </a:fld>
             <a:endParaRPr lang="en-US"/>
           </a:p>
@@ -748,7 +751,7 @@
           <a:p>
             <a:fld id="{93D46B6A-9325-4C51-AC58-73EE988D03CD}" type="slidenum">
               <a:rPr lang="en-US" smtClean="0"/>
-              <a:t>12</a:t>
+              <a:t>14</a:t>
             </a:fld>
             <a:endParaRPr lang="en-US"/>
           </a:p>
@@ -852,7 +855,7 @@
           <a:p>
             <a:fld id="{93D46B6A-9325-4C51-AC58-73EE988D03CD}" type="slidenum">
               <a:rPr lang="en-US" smtClean="0"/>
-              <a:t>13</a:t>
+              <a:t>15</a:t>
             </a:fld>
             <a:endParaRPr lang="en-US"/>
           </a:p>
@@ -956,7 +959,7 @@
           <a:p>
             <a:fld id="{93D46B6A-9325-4C51-AC58-73EE988D03CD}" type="slidenum">
               <a:rPr lang="en-US" smtClean="0"/>
-              <a:t>14</a:t>
+              <a:t>16</a:t>
             </a:fld>
             <a:endParaRPr lang="en-US"/>
           </a:p>
@@ -1049,7 +1052,7 @@
           <a:p>
             <a:fld id="{93D46B6A-9325-4C51-AC58-73EE988D03CD}" type="slidenum">
               <a:rPr lang="en-US" smtClean="0"/>
-              <a:t>15</a:t>
+              <a:t>17</a:t>
             </a:fld>
             <a:endParaRPr lang="en-US"/>
           </a:p>
@@ -6581,6 +6584,761 @@
   <p:cSld>
     <p:bg>
       <p:bgPr>
+        <a:gradFill rotWithShape="1">
+          <a:gsLst>
+            <a:gs pos="10000">
+              <a:schemeClr val="bg2">
+                <a:tint val="97000"/>
+                <a:hueMod val="92000"/>
+                <a:satMod val="169000"/>
+                <a:lumMod val="164000"/>
+              </a:schemeClr>
+            </a:gs>
+            <a:gs pos="100000">
+              <a:schemeClr val="bg2">
+                <a:shade val="96000"/>
+                <a:satMod val="120000"/>
+                <a:lumMod val="90000"/>
+              </a:schemeClr>
+            </a:gs>
+          </a:gsLst>
+          <a:lin ang="6120000" scaled="1"/>
+        </a:gradFill>
+        <a:effectLst/>
+      </p:bgPr>
+    </p:bg>
+    <p:spTree>
+      <p:nvGrpSpPr>
+        <p:cNvPr id="1" name=""/>
+        <p:cNvGrpSpPr/>
+        <p:nvPr/>
+      </p:nvGrpSpPr>
+      <p:grpSpPr>
+        <a:xfrm>
+          <a:off x="0" y="0"/>
+          <a:ext cx="0" cy="0"/>
+          <a:chOff x="0" y="0"/>
+          <a:chExt cx="0" cy="0"/>
+        </a:xfrm>
+      </p:grpSpPr>
+      <p:grpSp>
+        <p:nvGrpSpPr>
+          <p:cNvPr id="44" name="Group 32">
+            <a:extLst>
+              <a:ext uri="{FF2B5EF4-FFF2-40B4-BE49-F238E27FC236}">
+                <a16:creationId xmlns:a16="http://schemas.microsoft.com/office/drawing/2014/main" id="{2103B461-323C-4912-BFFD-C37582662085}"/>
+              </a:ext>
+              <a:ext uri="{C183D7F6-B498-43B3-948B-1728B52AA6E4}">
+                <adec:decorative xmlns:adec="http://schemas.microsoft.com/office/drawing/2017/decorative" val="1"/>
+              </a:ext>
+            </a:extLst>
+          </p:cNvPr>
+          <p:cNvGrpSpPr>
+            <a:grpSpLocks noGrp="1" noUngrp="1" noRot="1" noChangeAspect="1" noMove="1" noResize="1"/>
+          </p:cNvGrpSpPr>
+          <p:nvPr>
+            <p:extLst>
+              <p:ext uri="{386F3935-93C4-4BCD-93E2-E3B085C9AB24}">
+                <p16:designElem xmlns:p16="http://schemas.microsoft.com/office/powerpoint/2015/main" val="1"/>
+              </p:ext>
+            </p:extLst>
+          </p:nvPr>
+        </p:nvGrpSpPr>
+        <p:grpSpPr>
+          <a:xfrm>
+            <a:off x="9206969" y="2963333"/>
+            <a:ext cx="2981858" cy="3208867"/>
+            <a:chOff x="9206969" y="2963333"/>
+            <a:chExt cx="2981858" cy="3208867"/>
+          </a:xfrm>
+        </p:grpSpPr>
+        <p:cxnSp>
+          <p:nvCxnSpPr>
+            <p:cNvPr id="34" name="Straight Connector 33">
+              <a:extLst>
+                <a:ext uri="{FF2B5EF4-FFF2-40B4-BE49-F238E27FC236}">
+                  <a16:creationId xmlns:a16="http://schemas.microsoft.com/office/drawing/2014/main" id="{FBC21318-F4F4-4524-95D1-6B7FE0A788A3}"/>
+                </a:ext>
+                <a:ext uri="{C183D7F6-B498-43B3-948B-1728B52AA6E4}">
+                  <adec:decorative xmlns:adec="http://schemas.microsoft.com/office/drawing/2017/decorative" val="1"/>
+                </a:ext>
+              </a:extLst>
+            </p:cNvPr>
+            <p:cNvCxnSpPr/>
+            <p:nvPr>
+              <p:extLst>
+                <p:ext uri="{386F3935-93C4-4BCD-93E2-E3B085C9AB24}">
+                  <p16:designElem xmlns:p16="http://schemas.microsoft.com/office/powerpoint/2015/main" val="1"/>
+                </p:ext>
+              </p:extLst>
+            </p:nvPr>
+          </p:nvCxnSpPr>
+          <p:spPr>
+            <a:xfrm flipH="1">
+              <a:off x="11276012" y="2963333"/>
+              <a:ext cx="912814" cy="912812"/>
+            </a:xfrm>
+            <a:prstGeom prst="line">
+              <a:avLst/>
+            </a:prstGeom>
+            <a:ln w="9525">
+              <a:solidFill>
+                <a:schemeClr val="tx1"/>
+              </a:solidFill>
+            </a:ln>
+          </p:spPr>
+          <p:style>
+            <a:lnRef idx="2">
+              <a:schemeClr val="accent1"/>
+            </a:lnRef>
+            <a:fillRef idx="0">
+              <a:schemeClr val="accent1"/>
+            </a:fillRef>
+            <a:effectRef idx="1">
+              <a:schemeClr val="accent1"/>
+            </a:effectRef>
+            <a:fontRef idx="minor">
+              <a:schemeClr val="tx1"/>
+            </a:fontRef>
+          </p:style>
+        </p:cxnSp>
+        <p:cxnSp>
+          <p:nvCxnSpPr>
+            <p:cNvPr id="35" name="Straight Connector 34">
+              <a:extLst>
+                <a:ext uri="{FF2B5EF4-FFF2-40B4-BE49-F238E27FC236}">
+                  <a16:creationId xmlns:a16="http://schemas.microsoft.com/office/drawing/2014/main" id="{D9FFA8E5-974F-409E-89C6-E185BD90933C}"/>
+                </a:ext>
+                <a:ext uri="{C183D7F6-B498-43B3-948B-1728B52AA6E4}">
+                  <adec:decorative xmlns:adec="http://schemas.microsoft.com/office/drawing/2017/decorative" val="1"/>
+                </a:ext>
+              </a:extLst>
+            </p:cNvPr>
+            <p:cNvCxnSpPr/>
+            <p:nvPr>
+              <p:extLst>
+                <p:ext uri="{386F3935-93C4-4BCD-93E2-E3B085C9AB24}">
+                  <p16:designElem xmlns:p16="http://schemas.microsoft.com/office/powerpoint/2015/main" val="1"/>
+                </p:ext>
+              </p:extLst>
+            </p:nvPr>
+          </p:nvCxnSpPr>
+          <p:spPr>
+            <a:xfrm flipH="1">
+              <a:off x="9206969" y="3190344"/>
+              <a:ext cx="2981857" cy="2981856"/>
+            </a:xfrm>
+            <a:prstGeom prst="line">
+              <a:avLst/>
+            </a:prstGeom>
+            <a:ln w="9525">
+              <a:solidFill>
+                <a:schemeClr val="tx1"/>
+              </a:solidFill>
+            </a:ln>
+          </p:spPr>
+          <p:style>
+            <a:lnRef idx="2">
+              <a:schemeClr val="accent1"/>
+            </a:lnRef>
+            <a:fillRef idx="0">
+              <a:schemeClr val="accent1"/>
+            </a:fillRef>
+            <a:effectRef idx="1">
+              <a:schemeClr val="accent1"/>
+            </a:effectRef>
+            <a:fontRef idx="minor">
+              <a:schemeClr val="tx1"/>
+            </a:fontRef>
+          </p:style>
+        </p:cxnSp>
+        <p:cxnSp>
+          <p:nvCxnSpPr>
+            <p:cNvPr id="36" name="Straight Connector 35">
+              <a:extLst>
+                <a:ext uri="{FF2B5EF4-FFF2-40B4-BE49-F238E27FC236}">
+                  <a16:creationId xmlns:a16="http://schemas.microsoft.com/office/drawing/2014/main" id="{C384E2B1-7008-45EE-9F2E-FEF3A089780F}"/>
+                </a:ext>
+                <a:ext uri="{C183D7F6-B498-43B3-948B-1728B52AA6E4}">
+                  <adec:decorative xmlns:adec="http://schemas.microsoft.com/office/drawing/2017/decorative" val="1"/>
+                </a:ext>
+              </a:extLst>
+            </p:cNvPr>
+            <p:cNvCxnSpPr/>
+            <p:nvPr>
+              <p:extLst>
+                <p:ext uri="{386F3935-93C4-4BCD-93E2-E3B085C9AB24}">
+                  <p16:designElem xmlns:p16="http://schemas.microsoft.com/office/powerpoint/2015/main" val="1"/>
+                </p:ext>
+              </p:extLst>
+            </p:nvPr>
+          </p:nvCxnSpPr>
+          <p:spPr>
+            <a:xfrm flipH="1">
+              <a:off x="10292292" y="3285067"/>
+              <a:ext cx="1896534" cy="1896533"/>
+            </a:xfrm>
+            <a:prstGeom prst="line">
+              <a:avLst/>
+            </a:prstGeom>
+            <a:ln w="9525">
+              <a:solidFill>
+                <a:schemeClr val="tx1"/>
+              </a:solidFill>
+            </a:ln>
+          </p:spPr>
+          <p:style>
+            <a:lnRef idx="2">
+              <a:schemeClr val="accent1"/>
+            </a:lnRef>
+            <a:fillRef idx="0">
+              <a:schemeClr val="accent1"/>
+            </a:fillRef>
+            <a:effectRef idx="1">
+              <a:schemeClr val="accent1"/>
+            </a:effectRef>
+            <a:fontRef idx="minor">
+              <a:schemeClr val="tx1"/>
+            </a:fontRef>
+          </p:style>
+        </p:cxnSp>
+        <p:cxnSp>
+          <p:nvCxnSpPr>
+            <p:cNvPr id="37" name="Straight Connector 36">
+              <a:extLst>
+                <a:ext uri="{FF2B5EF4-FFF2-40B4-BE49-F238E27FC236}">
+                  <a16:creationId xmlns:a16="http://schemas.microsoft.com/office/drawing/2014/main" id="{D4563410-7FE9-4955-89C6-0FB9326CD3A8}"/>
+                </a:ext>
+                <a:ext uri="{C183D7F6-B498-43B3-948B-1728B52AA6E4}">
+                  <adec:decorative xmlns:adec="http://schemas.microsoft.com/office/drawing/2017/decorative" val="1"/>
+                </a:ext>
+              </a:extLst>
+            </p:cNvPr>
+            <p:cNvCxnSpPr/>
+            <p:nvPr>
+              <p:extLst>
+                <p:ext uri="{386F3935-93C4-4BCD-93E2-E3B085C9AB24}">
+                  <p16:designElem xmlns:p16="http://schemas.microsoft.com/office/powerpoint/2015/main" val="1"/>
+                </p:ext>
+              </p:extLst>
+            </p:nvPr>
+          </p:nvCxnSpPr>
+          <p:spPr>
+            <a:xfrm flipH="1">
+              <a:off x="10443103" y="3131080"/>
+              <a:ext cx="1745722" cy="1745720"/>
+            </a:xfrm>
+            <a:prstGeom prst="line">
+              <a:avLst/>
+            </a:prstGeom>
+            <a:ln w="28575">
+              <a:solidFill>
+                <a:schemeClr val="tx1"/>
+              </a:solidFill>
+            </a:ln>
+          </p:spPr>
+          <p:style>
+            <a:lnRef idx="2">
+              <a:schemeClr val="accent1"/>
+            </a:lnRef>
+            <a:fillRef idx="0">
+              <a:schemeClr val="accent1"/>
+            </a:fillRef>
+            <a:effectRef idx="1">
+              <a:schemeClr val="accent1"/>
+            </a:effectRef>
+            <a:fontRef idx="minor">
+              <a:schemeClr val="tx1"/>
+            </a:fontRef>
+          </p:style>
+        </p:cxnSp>
+        <p:cxnSp>
+          <p:nvCxnSpPr>
+            <p:cNvPr id="38" name="Straight Connector 37">
+              <a:extLst>
+                <a:ext uri="{FF2B5EF4-FFF2-40B4-BE49-F238E27FC236}">
+                  <a16:creationId xmlns:a16="http://schemas.microsoft.com/office/drawing/2014/main" id="{3AD14C0E-D5DF-4BDC-BD92-642CFF18018D}"/>
+                </a:ext>
+                <a:ext uri="{C183D7F6-B498-43B3-948B-1728B52AA6E4}">
+                  <adec:decorative xmlns:adec="http://schemas.microsoft.com/office/drawing/2017/decorative" val="1"/>
+                </a:ext>
+              </a:extLst>
+            </p:cNvPr>
+            <p:cNvCxnSpPr/>
+            <p:nvPr>
+              <p:extLst>
+                <p:ext uri="{386F3935-93C4-4BCD-93E2-E3B085C9AB24}">
+                  <p16:designElem xmlns:p16="http://schemas.microsoft.com/office/powerpoint/2015/main" val="1"/>
+                </p:ext>
+              </p:extLst>
+            </p:nvPr>
+          </p:nvCxnSpPr>
+          <p:spPr>
+            <a:xfrm flipH="1">
+              <a:off x="10918826" y="3683001"/>
+              <a:ext cx="1270001" cy="1269999"/>
+            </a:xfrm>
+            <a:prstGeom prst="line">
+              <a:avLst/>
+            </a:prstGeom>
+            <a:ln w="28575">
+              <a:solidFill>
+                <a:schemeClr val="tx1"/>
+              </a:solidFill>
+            </a:ln>
+          </p:spPr>
+          <p:style>
+            <a:lnRef idx="2">
+              <a:schemeClr val="accent1"/>
+            </a:lnRef>
+            <a:fillRef idx="0">
+              <a:schemeClr val="accent1"/>
+            </a:fillRef>
+            <a:effectRef idx="1">
+              <a:schemeClr val="accent1"/>
+            </a:effectRef>
+            <a:fontRef idx="minor">
+              <a:schemeClr val="tx1"/>
+            </a:fontRef>
+          </p:style>
+        </p:cxnSp>
+      </p:grpSp>
+      <p:sp useBgFill="1">
+        <p:nvSpPr>
+          <p:cNvPr id="45" name="Rectangle 39">
+            <a:extLst>
+              <a:ext uri="{FF2B5EF4-FFF2-40B4-BE49-F238E27FC236}">
+                <a16:creationId xmlns:a16="http://schemas.microsoft.com/office/drawing/2014/main" id="{9A212F8F-D812-4A16-BE82-F3500DE32174}"/>
+              </a:ext>
+              <a:ext uri="{C183D7F6-B498-43B3-948B-1728B52AA6E4}">
+                <adec:decorative xmlns:adec="http://schemas.microsoft.com/office/drawing/2017/decorative" val="1"/>
+              </a:ext>
+            </a:extLst>
+          </p:cNvPr>
+          <p:cNvSpPr>
+            <a:spLocks noGrp="1" noRot="1" noChangeAspect="1" noMove="1" noResize="1" noEditPoints="1" noAdjustHandles="1" noChangeArrowheads="1" noChangeShapeType="1" noTextEdit="1"/>
+          </p:cNvSpPr>
+          <p:nvPr>
+            <p:extLst>
+              <p:ext uri="{386F3935-93C4-4BCD-93E2-E3B085C9AB24}">
+                <p16:designElem xmlns:p16="http://schemas.microsoft.com/office/powerpoint/2015/main" val="1"/>
+              </p:ext>
+            </p:extLst>
+          </p:nvPr>
+        </p:nvSpPr>
+        <p:spPr>
+          <a:xfrm>
+            <a:off x="0" y="0"/>
+            <a:ext cx="12192000" cy="6858000"/>
+          </a:xfrm>
+          <a:prstGeom prst="rect">
+            <a:avLst/>
+          </a:prstGeom>
+          <a:ln>
+            <a:noFill/>
+          </a:ln>
+        </p:spPr>
+        <p:style>
+          <a:lnRef idx="2">
+            <a:schemeClr val="accent1">
+              <a:shade val="50000"/>
+            </a:schemeClr>
+          </a:lnRef>
+          <a:fillRef idx="1">
+            <a:schemeClr val="accent1"/>
+          </a:fillRef>
+          <a:effectRef idx="0">
+            <a:schemeClr val="accent1"/>
+          </a:effectRef>
+          <a:fontRef idx="minor">
+            <a:schemeClr val="lt1"/>
+          </a:fontRef>
+        </p:style>
+        <p:txBody>
+          <a:bodyPr rtlCol="0" anchor="ctr"/>
+          <a:lstStyle/>
+          <a:p>
+            <a:pPr algn="ctr"/>
+            <a:endParaRPr lang="en-US"/>
+          </a:p>
+        </p:txBody>
+      </p:sp>
+      <p:sp>
+        <p:nvSpPr>
+          <p:cNvPr id="5" name="Footer Placeholder 4">
+            <a:extLst>
+              <a:ext uri="{FF2B5EF4-FFF2-40B4-BE49-F238E27FC236}">
+                <a16:creationId xmlns:a16="http://schemas.microsoft.com/office/drawing/2014/main" id="{0D2F664F-EE22-4F1C-9903-F0C8EA62ED93}"/>
+              </a:ext>
+            </a:extLst>
+          </p:cNvPr>
+          <p:cNvSpPr>
+            <a:spLocks noGrp="1"/>
+          </p:cNvSpPr>
+          <p:nvPr>
+            <p:ph type="ftr" sz="quarter" idx="11"/>
+          </p:nvPr>
+        </p:nvSpPr>
+        <p:spPr>
+          <a:xfrm>
+            <a:off x="684212" y="6290187"/>
+            <a:ext cx="7543800" cy="365125"/>
+          </a:xfrm>
+        </p:spPr>
+        <p:txBody>
+          <a:bodyPr vert="horz" lIns="91440" tIns="45720" rIns="91440" bIns="45720" rtlCol="0" anchor="t">
+            <a:normAutofit/>
+          </a:bodyPr>
+          <a:lstStyle/>
+          <a:p>
+            <a:pPr>
+              <a:spcAft>
+                <a:spcPts val="600"/>
+              </a:spcAft>
+            </a:pPr>
+            <a:r>
+              <a:rPr lang="en-US" b="0" i="0" kern="1200">
+                <a:solidFill>
+                  <a:schemeClr val="bg2">
+                    <a:lumMod val="50000"/>
+                  </a:schemeClr>
+                </a:solidFill>
+                <a:effectLst/>
+                <a:latin typeface="+mn-lt"/>
+                <a:ea typeface="+mn-ea"/>
+                <a:cs typeface="+mn-cs"/>
+              </a:rPr>
+              <a:t>Data sourced from Yahoo Finance.</a:t>
+            </a:r>
+          </a:p>
+        </p:txBody>
+      </p:sp>
+      <p:sp>
+        <p:nvSpPr>
+          <p:cNvPr id="46" name="Snip Diagonal Corner Rectangle 24">
+            <a:extLst>
+              <a:ext uri="{FF2B5EF4-FFF2-40B4-BE49-F238E27FC236}">
+                <a16:creationId xmlns:a16="http://schemas.microsoft.com/office/drawing/2014/main" id="{D2CF1D1B-04ED-443D-A9FE-68BF8859BDD6}"/>
+              </a:ext>
+              <a:ext uri="{C183D7F6-B498-43B3-948B-1728B52AA6E4}">
+                <adec:decorative xmlns:adec="http://schemas.microsoft.com/office/drawing/2017/decorative" val="1"/>
+              </a:ext>
+            </a:extLst>
+          </p:cNvPr>
+          <p:cNvSpPr>
+            <a:spLocks noGrp="1" noRot="1" noChangeAspect="1" noMove="1" noResize="1" noEditPoints="1" noAdjustHandles="1" noChangeArrowheads="1" noChangeShapeType="1" noTextEdit="1"/>
+          </p:cNvSpPr>
+          <p:nvPr>
+            <p:extLst>
+              <p:ext uri="{386F3935-93C4-4BCD-93E2-E3B085C9AB24}">
+                <p16:designElem xmlns:p16="http://schemas.microsoft.com/office/powerpoint/2015/main" val="1"/>
+              </p:ext>
+            </p:extLst>
+          </p:nvPr>
+        </p:nvSpPr>
+        <p:spPr>
+          <a:xfrm>
+            <a:off x="628229" y="620722"/>
+            <a:ext cx="10935543" cy="5286838"/>
+          </a:xfrm>
+          <a:prstGeom prst="snip2DiagRect">
+            <a:avLst>
+              <a:gd name="adj1" fmla="val 10787"/>
+              <a:gd name="adj2" fmla="val 0"/>
+            </a:avLst>
+          </a:prstGeom>
+          <a:solidFill>
+            <a:schemeClr val="tx1"/>
+          </a:solidFill>
+          <a:ln>
+            <a:noFill/>
+          </a:ln>
+          <a:effectLst>
+            <a:innerShdw blurRad="57150" dist="38100" dir="14460000">
+              <a:prstClr val="black">
+                <a:alpha val="70000"/>
+              </a:prstClr>
+            </a:innerShdw>
+          </a:effectLst>
+        </p:spPr>
+        <p:style>
+          <a:lnRef idx="2">
+            <a:schemeClr val="accent1">
+              <a:shade val="50000"/>
+            </a:schemeClr>
+          </a:lnRef>
+          <a:fillRef idx="1">
+            <a:schemeClr val="accent1"/>
+          </a:fillRef>
+          <a:effectRef idx="0">
+            <a:schemeClr val="accent1"/>
+          </a:effectRef>
+          <a:fontRef idx="minor">
+            <a:schemeClr val="lt1"/>
+          </a:fontRef>
+        </p:style>
+        <p:txBody>
+          <a:bodyPr rtlCol="0" anchor="ctr"/>
+          <a:lstStyle/>
+          <a:p>
+            <a:pPr algn="ctr"/>
+            <a:endParaRPr lang="en-US"/>
+          </a:p>
+        </p:txBody>
+      </p:sp>
+      <p:pic>
+        <p:nvPicPr>
+          <p:cNvPr id="28" name="Content Placeholder 27" descr="Chart, box and whisker chart&#10;&#10;Description automatically generated">
+            <a:extLst>
+              <a:ext uri="{FF2B5EF4-FFF2-40B4-BE49-F238E27FC236}">
+                <a16:creationId xmlns:a16="http://schemas.microsoft.com/office/drawing/2014/main" id="{4B8E017F-F8C9-4B16-9759-3DAD5ED62CD4}"/>
+              </a:ext>
+            </a:extLst>
+          </p:cNvPr>
+          <p:cNvPicPr>
+            <a:picLocks noGrp="1" noChangeAspect="1"/>
+          </p:cNvPicPr>
+          <p:nvPr>
+            <p:ph idx="1"/>
+          </p:nvPr>
+        </p:nvPicPr>
+        <p:blipFill>
+          <a:blip r:embed="rId2">
+            <a:extLst>
+              <a:ext uri="{28A0092B-C50C-407E-A947-70E740481C1C}">
+                <a14:useLocalDpi xmlns:a14="http://schemas.microsoft.com/office/drawing/2010/main" val="0"/>
+              </a:ext>
+            </a:extLst>
+          </a:blip>
+          <a:stretch>
+            <a:fillRect/>
+          </a:stretch>
+        </p:blipFill>
+        <p:spPr>
+          <a:xfrm>
+            <a:off x="2162628" y="786117"/>
+            <a:ext cx="7866744" cy="4956048"/>
+          </a:xfrm>
+          <a:custGeom>
+            <a:avLst/>
+            <a:gdLst/>
+            <a:ahLst/>
+            <a:cxnLst/>
+            <a:rect l="l" t="t" r="r" b="b"/>
+            <a:pathLst>
+              <a:path w="10607040" h="4956048">
+                <a:moveTo>
+                  <a:pt x="497480" y="0"/>
+                </a:moveTo>
+                <a:lnTo>
+                  <a:pt x="10607040" y="0"/>
+                </a:lnTo>
+                <a:lnTo>
+                  <a:pt x="10607040" y="4485407"/>
+                </a:lnTo>
+                <a:lnTo>
+                  <a:pt x="10131692" y="4956048"/>
+                </a:lnTo>
+                <a:lnTo>
+                  <a:pt x="0" y="4956048"/>
+                </a:lnTo>
+                <a:lnTo>
+                  <a:pt x="0" y="492554"/>
+                </a:lnTo>
+                <a:close/>
+              </a:path>
+            </a:pathLst>
+          </a:custGeom>
+        </p:spPr>
+      </p:pic>
+    </p:spTree>
+    <p:extLst>
+      <p:ext uri="{BB962C8B-B14F-4D97-AF65-F5344CB8AC3E}">
+        <p14:creationId xmlns:p14="http://schemas.microsoft.com/office/powerpoint/2010/main" val="2520762730"/>
+      </p:ext>
+    </p:extLst>
+  </p:cSld>
+  <p:clrMapOvr>
+    <a:masterClrMapping/>
+  </p:clrMapOvr>
+</p:sld>
+</file>
+
+<file path=ppt/slides/slide11.xml><?xml version="1.0" encoding="utf-8"?>
+<p:sld xmlns:a="http://schemas.openxmlformats.org/drawingml/2006/main" xmlns:r="http://schemas.openxmlformats.org/officeDocument/2006/relationships" xmlns:p="http://schemas.openxmlformats.org/presentationml/2006/main">
+  <p:cSld>
+    <p:bg>
+      <p:bgPr>
+        <a:gradFill rotWithShape="1">
+          <a:gsLst>
+            <a:gs pos="10000">
+              <a:schemeClr val="bg2">
+                <a:tint val="97000"/>
+                <a:hueMod val="92000"/>
+                <a:satMod val="169000"/>
+                <a:lumMod val="164000"/>
+              </a:schemeClr>
+            </a:gs>
+            <a:gs pos="100000">
+              <a:schemeClr val="bg2">
+                <a:shade val="96000"/>
+                <a:satMod val="120000"/>
+                <a:lumMod val="90000"/>
+              </a:schemeClr>
+            </a:gs>
+          </a:gsLst>
+          <a:lin ang="6120000" scaled="1"/>
+        </a:gradFill>
+        <a:effectLst/>
+      </p:bgPr>
+    </p:bg>
+    <p:spTree>
+      <p:nvGrpSpPr>
+        <p:cNvPr id="1" name=""/>
+        <p:cNvGrpSpPr/>
+        <p:nvPr/>
+      </p:nvGrpSpPr>
+      <p:grpSpPr>
+        <a:xfrm>
+          <a:off x="0" y="0"/>
+          <a:ext cx="0" cy="0"/>
+          <a:chOff x="0" y="0"/>
+          <a:chExt cx="0" cy="0"/>
+        </a:xfrm>
+      </p:grpSpPr>
+      <p:pic>
+        <p:nvPicPr>
+          <p:cNvPr id="11" name="Content Placeholder 10" descr="Chart, line chart&#10;&#10;Description automatically generated">
+            <a:extLst>
+              <a:ext uri="{FF2B5EF4-FFF2-40B4-BE49-F238E27FC236}">
+                <a16:creationId xmlns:a16="http://schemas.microsoft.com/office/drawing/2014/main" id="{D1F6CEFF-81A1-4B40-8B83-190DF5221D86}"/>
+              </a:ext>
+            </a:extLst>
+          </p:cNvPr>
+          <p:cNvPicPr>
+            <a:picLocks noGrp="1" noChangeAspect="1"/>
+          </p:cNvPicPr>
+          <p:nvPr>
+            <p:ph sz="half" idx="1"/>
+          </p:nvPr>
+        </p:nvPicPr>
+        <p:blipFill>
+          <a:blip r:embed="rId2">
+            <a:extLst>
+              <a:ext uri="{28A0092B-C50C-407E-A947-70E740481C1C}">
+                <a14:useLocalDpi xmlns:a14="http://schemas.microsoft.com/office/drawing/2010/main" val="0"/>
+              </a:ext>
+            </a:extLst>
+          </a:blip>
+          <a:stretch>
+            <a:fillRect/>
+          </a:stretch>
+        </p:blipFill>
+        <p:spPr>
+          <a:xfrm>
+            <a:off x="483491" y="626184"/>
+            <a:ext cx="5214605" cy="3142928"/>
+          </a:xfrm>
+        </p:spPr>
+      </p:pic>
+      <p:pic>
+        <p:nvPicPr>
+          <p:cNvPr id="13" name="Content Placeholder 12" descr="Chart, line chart&#10;&#10;Description automatically generated">
+            <a:extLst>
+              <a:ext uri="{FF2B5EF4-FFF2-40B4-BE49-F238E27FC236}">
+                <a16:creationId xmlns:a16="http://schemas.microsoft.com/office/drawing/2014/main" id="{E38FFD55-D4A2-417B-9061-063921ED5E22}"/>
+              </a:ext>
+            </a:extLst>
+          </p:cNvPr>
+          <p:cNvPicPr>
+            <a:picLocks noGrp="1" noChangeAspect="1"/>
+          </p:cNvPicPr>
+          <p:nvPr>
+            <p:ph sz="half" idx="2"/>
+          </p:nvPr>
+        </p:nvPicPr>
+        <p:blipFill>
+          <a:blip r:embed="rId3">
+            <a:extLst>
+              <a:ext uri="{28A0092B-C50C-407E-A947-70E740481C1C}">
+                <a14:useLocalDpi xmlns:a14="http://schemas.microsoft.com/office/drawing/2010/main" val="0"/>
+              </a:ext>
+            </a:extLst>
+          </a:blip>
+          <a:stretch>
+            <a:fillRect/>
+          </a:stretch>
+        </p:blipFill>
+        <p:spPr>
+          <a:xfrm>
+            <a:off x="5139589" y="2734721"/>
+            <a:ext cx="5543008" cy="3340861"/>
+          </a:xfrm>
+        </p:spPr>
+      </p:pic>
+      <p:sp>
+        <p:nvSpPr>
+          <p:cNvPr id="5" name="Footer Placeholder 4">
+            <a:extLst>
+              <a:ext uri="{FF2B5EF4-FFF2-40B4-BE49-F238E27FC236}">
+                <a16:creationId xmlns:a16="http://schemas.microsoft.com/office/drawing/2014/main" id="{0D2F664F-EE22-4F1C-9903-F0C8EA62ED93}"/>
+              </a:ext>
+            </a:extLst>
+          </p:cNvPr>
+          <p:cNvSpPr>
+            <a:spLocks noGrp="1"/>
+          </p:cNvSpPr>
+          <p:nvPr>
+            <p:ph type="ftr" sz="quarter" idx="11"/>
+          </p:nvPr>
+        </p:nvSpPr>
+        <p:spPr/>
+        <p:txBody>
+          <a:bodyPr vert="horz" lIns="91440" tIns="45720" rIns="91440" bIns="45720" rtlCol="0" anchor="t">
+            <a:normAutofit/>
+          </a:bodyPr>
+          <a:lstStyle/>
+          <a:p>
+            <a:pPr>
+              <a:spcAft>
+                <a:spcPts val="600"/>
+              </a:spcAft>
+            </a:pPr>
+            <a:r>
+              <a:rPr lang="en-US" b="0" i="0" kern="1200">
+                <a:solidFill>
+                  <a:schemeClr val="bg2">
+                    <a:lumMod val="50000"/>
+                  </a:schemeClr>
+                </a:solidFill>
+                <a:effectLst/>
+                <a:latin typeface="+mn-lt"/>
+                <a:ea typeface="+mn-ea"/>
+                <a:cs typeface="+mn-cs"/>
+              </a:rPr>
+              <a:t>Data sourced from Yahoo Finance.</a:t>
+            </a:r>
+          </a:p>
+        </p:txBody>
+      </p:sp>
+    </p:spTree>
+    <p:extLst>
+      <p:ext uri="{BB962C8B-B14F-4D97-AF65-F5344CB8AC3E}">
+        <p14:creationId xmlns:p14="http://schemas.microsoft.com/office/powerpoint/2010/main" val="4203457135"/>
+      </p:ext>
+    </p:extLst>
+  </p:cSld>
+  <p:clrMapOvr>
+    <a:masterClrMapping/>
+  </p:clrMapOvr>
+</p:sld>
+</file>
+
+<file path=ppt/slides/slide12.xml><?xml version="1.0" encoding="utf-8"?>
+<p:sld xmlns:a="http://schemas.openxmlformats.org/drawingml/2006/main" xmlns:r="http://schemas.openxmlformats.org/officeDocument/2006/relationships" xmlns:p="http://schemas.openxmlformats.org/presentationml/2006/main">
+  <p:cSld>
+    <p:bg>
+      <p:bgPr>
         <a:solidFill>
           <a:schemeClr val="bg1"/>
         </a:solidFill>
@@ -7471,7 +8229,7 @@
 </p:sld>
 </file>
 
-<file path=ppt/slides/slide11.xml><?xml version="1.0" encoding="utf-8"?>
+<file path=ppt/slides/slide13.xml><?xml version="1.0" encoding="utf-8"?>
 <p:sld xmlns:a="http://schemas.openxmlformats.org/drawingml/2006/main" xmlns:r="http://schemas.openxmlformats.org/officeDocument/2006/relationships" xmlns:p="http://schemas.openxmlformats.org/presentationml/2006/main">
   <p:cSld>
     <p:bg>
@@ -8366,7 +9124,7 @@
 </p:sld>
 </file>
 
-<file path=ppt/slides/slide12.xml><?xml version="1.0" encoding="utf-8"?>
+<file path=ppt/slides/slide14.xml><?xml version="1.0" encoding="utf-8"?>
 <p:sld xmlns:a="http://schemas.openxmlformats.org/drawingml/2006/main" xmlns:r="http://schemas.openxmlformats.org/officeDocument/2006/relationships" xmlns:p="http://schemas.openxmlformats.org/presentationml/2006/main">
   <p:cSld>
     <p:bg>
@@ -9281,7 +10039,7 @@
 </p:sld>
 </file>
 
-<file path=ppt/slides/slide13.xml><?xml version="1.0" encoding="utf-8"?>
+<file path=ppt/slides/slide15.xml><?xml version="1.0" encoding="utf-8"?>
 <p:sld xmlns:a="http://schemas.openxmlformats.org/drawingml/2006/main" xmlns:r="http://schemas.openxmlformats.org/officeDocument/2006/relationships" xmlns:p="http://schemas.openxmlformats.org/presentationml/2006/main">
   <p:cSld>
     <p:bg>
@@ -10187,7 +10945,7 @@
 </p:sld>
 </file>
 
-<file path=ppt/slides/slide14.xml><?xml version="1.0" encoding="utf-8"?>
+<file path=ppt/slides/slide16.xml><?xml version="1.0" encoding="utf-8"?>
 <p:sld xmlns:a="http://schemas.openxmlformats.org/drawingml/2006/main" xmlns:r="http://schemas.openxmlformats.org/officeDocument/2006/relationships" xmlns:p="http://schemas.openxmlformats.org/presentationml/2006/main">
   <p:cSld>
     <p:bg>
@@ -11065,7 +11823,7 @@
 </p:sld>
 </file>
 
-<file path=ppt/slides/slide15.xml><?xml version="1.0" encoding="utf-8"?>
+<file path=ppt/slides/slide17.xml><?xml version="1.0" encoding="utf-8"?>
 <p:sld xmlns:a="http://schemas.openxmlformats.org/drawingml/2006/main" xmlns:r="http://schemas.openxmlformats.org/officeDocument/2006/relationships" xmlns:p="http://schemas.openxmlformats.org/presentationml/2006/main">
   <p:cSld>
     <p:bg>
@@ -11927,7 +12685,300 @@
 </p:sld>
 </file>
 
-<file path=ppt/slides/slide16.xml><?xml version="1.0" encoding="utf-8"?>
+<file path=ppt/slides/slide18.xml><?xml version="1.0" encoding="utf-8"?>
+<p:sld xmlns:a="http://schemas.openxmlformats.org/drawingml/2006/main" xmlns:r="http://schemas.openxmlformats.org/officeDocument/2006/relationships" xmlns:p="http://schemas.openxmlformats.org/presentationml/2006/main">
+  <p:cSld>
+    <p:bg>
+      <p:bgPr>
+        <a:gradFill rotWithShape="1">
+          <a:gsLst>
+            <a:gs pos="10000">
+              <a:schemeClr val="bg2">
+                <a:tint val="97000"/>
+                <a:hueMod val="92000"/>
+                <a:satMod val="169000"/>
+                <a:lumMod val="164000"/>
+              </a:schemeClr>
+            </a:gs>
+            <a:gs pos="100000">
+              <a:schemeClr val="bg2">
+                <a:shade val="96000"/>
+                <a:satMod val="120000"/>
+                <a:lumMod val="90000"/>
+              </a:schemeClr>
+            </a:gs>
+          </a:gsLst>
+          <a:lin ang="6120000" scaled="1"/>
+        </a:gradFill>
+        <a:effectLst/>
+      </p:bgPr>
+    </p:bg>
+    <p:spTree>
+      <p:nvGrpSpPr>
+        <p:cNvPr id="1" name=""/>
+        <p:cNvGrpSpPr/>
+        <p:nvPr/>
+      </p:nvGrpSpPr>
+      <p:grpSpPr>
+        <a:xfrm>
+          <a:off x="0" y="0"/>
+          <a:ext cx="0" cy="0"/>
+          <a:chOff x="0" y="0"/>
+          <a:chExt cx="0" cy="0"/>
+        </a:xfrm>
+      </p:grpSpPr>
+      <p:sp>
+        <p:nvSpPr>
+          <p:cNvPr id="9" name="Rectangle 8">
+            <a:extLst>
+              <a:ext uri="{FF2B5EF4-FFF2-40B4-BE49-F238E27FC236}">
+                <a16:creationId xmlns:a16="http://schemas.microsoft.com/office/drawing/2014/main" id="{4609862E-48F9-45AC-8D44-67A0268A7935}"/>
+              </a:ext>
+              <a:ext uri="{C183D7F6-B498-43B3-948B-1728B52AA6E4}">
+                <adec:decorative xmlns:adec="http://schemas.microsoft.com/office/drawing/2017/decorative" val="1"/>
+              </a:ext>
+            </a:extLst>
+          </p:cNvPr>
+          <p:cNvSpPr>
+            <a:spLocks noGrp="1" noRot="1" noChangeAspect="1" noMove="1" noResize="1" noEditPoints="1" noAdjustHandles="1" noChangeArrowheads="1" noChangeShapeType="1" noTextEdit="1"/>
+          </p:cNvSpPr>
+          <p:nvPr>
+            <p:extLst>
+              <p:ext uri="{386F3935-93C4-4BCD-93E2-E3B085C9AB24}">
+                <p16:designElem xmlns:p16="http://schemas.microsoft.com/office/powerpoint/2015/main" val="1"/>
+              </p:ext>
+            </p:extLst>
+          </p:nvPr>
+        </p:nvSpPr>
+        <p:spPr>
+          <a:xfrm>
+            <a:off x="925" y="2"/>
+            <a:ext cx="12192000" cy="6858000"/>
+          </a:xfrm>
+          <a:prstGeom prst="rect">
+            <a:avLst/>
+          </a:prstGeom>
+          <a:solidFill>
+            <a:schemeClr val="bg2">
+              <a:alpha val="60000"/>
+            </a:schemeClr>
+          </a:solidFill>
+          <a:ln>
+            <a:noFill/>
+          </a:ln>
+        </p:spPr>
+        <p:style>
+          <a:lnRef idx="2">
+            <a:schemeClr val="accent1">
+              <a:shade val="50000"/>
+            </a:schemeClr>
+          </a:lnRef>
+          <a:fillRef idx="1003">
+            <a:schemeClr val="dk2"/>
+          </a:fillRef>
+          <a:effectRef idx="0">
+            <a:schemeClr val="accent1"/>
+          </a:effectRef>
+          <a:fontRef idx="minor">
+            <a:schemeClr val="lt1"/>
+          </a:fontRef>
+        </p:style>
+        <p:txBody>
+          <a:bodyPr rtlCol="0" anchor="ctr"/>
+          <a:lstStyle/>
+          <a:p>
+            <a:pPr algn="ctr"/>
+            <a:endParaRPr lang="en-US"/>
+          </a:p>
+        </p:txBody>
+      </p:sp>
+      <p:sp useBgFill="1">
+        <p:nvSpPr>
+          <p:cNvPr id="11" name="Snip Diagonal Corner Rectangle 6">
+            <a:extLst>
+              <a:ext uri="{FF2B5EF4-FFF2-40B4-BE49-F238E27FC236}">
+                <a16:creationId xmlns:a16="http://schemas.microsoft.com/office/drawing/2014/main" id="{2D5EEA8B-2D86-4D1D-96B3-6B8290303786}"/>
+              </a:ext>
+              <a:ext uri="{C183D7F6-B498-43B3-948B-1728B52AA6E4}">
+                <adec:decorative xmlns:adec="http://schemas.microsoft.com/office/drawing/2017/decorative" val="1"/>
+              </a:ext>
+            </a:extLst>
+          </p:cNvPr>
+          <p:cNvSpPr>
+            <a:spLocks noGrp="1" noRot="1" noChangeAspect="1" noMove="1" noResize="1" noEditPoints="1" noAdjustHandles="1" noChangeArrowheads="1" noChangeShapeType="1" noTextEdit="1"/>
+          </p:cNvSpPr>
+          <p:nvPr>
+            <p:extLst>
+              <p:ext uri="{386F3935-93C4-4BCD-93E2-E3B085C9AB24}">
+                <p16:designElem xmlns:p16="http://schemas.microsoft.com/office/powerpoint/2015/main" val="1"/>
+              </p:ext>
+            </p:extLst>
+          </p:nvPr>
+        </p:nvSpPr>
+        <p:spPr>
+          <a:xfrm flipH="1">
+            <a:off x="925" y="2"/>
+            <a:ext cx="12191075" cy="6857998"/>
+          </a:xfrm>
+          <a:prstGeom prst="snip2DiagRect">
+            <a:avLst>
+              <a:gd name="adj1" fmla="val 0"/>
+              <a:gd name="adj2" fmla="val 37605"/>
+            </a:avLst>
+          </a:prstGeom>
+          <a:ln>
+            <a:noFill/>
+          </a:ln>
+          <a:effectLst/>
+        </p:spPr>
+        <p:style>
+          <a:lnRef idx="2">
+            <a:schemeClr val="accent1">
+              <a:shade val="50000"/>
+            </a:schemeClr>
+          </a:lnRef>
+          <a:fillRef idx="1003">
+            <a:schemeClr val="dk2"/>
+          </a:fillRef>
+          <a:effectRef idx="0">
+            <a:schemeClr val="accent1"/>
+          </a:effectRef>
+          <a:fontRef idx="minor">
+            <a:schemeClr val="lt1"/>
+          </a:fontRef>
+        </p:style>
+        <p:txBody>
+          <a:bodyPr wrap="square" rtlCol="0" anchor="ctr">
+            <a:noAutofit/>
+          </a:bodyPr>
+          <a:lstStyle/>
+          <a:p>
+            <a:pPr algn="ctr"/>
+            <a:endParaRPr lang="en-US"/>
+          </a:p>
+        </p:txBody>
+      </p:sp>
+      <p:sp>
+        <p:nvSpPr>
+          <p:cNvPr id="2" name="Title 1">
+            <a:extLst>
+              <a:ext uri="{FF2B5EF4-FFF2-40B4-BE49-F238E27FC236}">
+                <a16:creationId xmlns:a16="http://schemas.microsoft.com/office/drawing/2014/main" id="{028E8147-4943-4E9D-A17A-BB422460FCE8}"/>
+              </a:ext>
+            </a:extLst>
+          </p:cNvPr>
+          <p:cNvSpPr>
+            <a:spLocks noGrp="1"/>
+          </p:cNvSpPr>
+          <p:nvPr>
+            <p:ph type="ctrTitle"/>
+          </p:nvPr>
+        </p:nvSpPr>
+        <p:spPr>
+          <a:xfrm>
+            <a:off x="1675645" y="685799"/>
+            <a:ext cx="8001000" cy="2971801"/>
+          </a:xfrm>
+        </p:spPr>
+        <p:txBody>
+          <a:bodyPr>
+            <a:normAutofit/>
+          </a:bodyPr>
+          <a:lstStyle/>
+          <a:p>
+            <a:r>
+              <a:rPr lang="en-US" dirty="0"/>
+              <a:t>Summary/data methodology</a:t>
+            </a:r>
+          </a:p>
+        </p:txBody>
+      </p:sp>
+      <p:sp>
+        <p:nvSpPr>
+          <p:cNvPr id="3" name="Subtitle 2">
+            <a:extLst>
+              <a:ext uri="{FF2B5EF4-FFF2-40B4-BE49-F238E27FC236}">
+                <a16:creationId xmlns:a16="http://schemas.microsoft.com/office/drawing/2014/main" id="{F9EDD7AE-6584-44E2-B817-56804C043E64}"/>
+              </a:ext>
+            </a:extLst>
+          </p:cNvPr>
+          <p:cNvSpPr>
+            <a:spLocks noGrp="1"/>
+          </p:cNvSpPr>
+          <p:nvPr>
+            <p:ph type="subTitle" idx="1"/>
+          </p:nvPr>
+        </p:nvSpPr>
+        <p:spPr>
+          <a:xfrm>
+            <a:off x="1675645" y="3843867"/>
+            <a:ext cx="6400800" cy="1947333"/>
+          </a:xfrm>
+        </p:spPr>
+        <p:txBody>
+          <a:bodyPr>
+            <a:normAutofit/>
+          </a:bodyPr>
+          <a:lstStyle/>
+          <a:p>
+            <a:endParaRPr lang="en-US"/>
+          </a:p>
+        </p:txBody>
+      </p:sp>
+      <p:sp>
+        <p:nvSpPr>
+          <p:cNvPr id="4" name="Footer Placeholder 3">
+            <a:extLst>
+              <a:ext uri="{FF2B5EF4-FFF2-40B4-BE49-F238E27FC236}">
+                <a16:creationId xmlns:a16="http://schemas.microsoft.com/office/drawing/2014/main" id="{738A522A-6DAB-45DE-8633-182B4A0082BF}"/>
+              </a:ext>
+            </a:extLst>
+          </p:cNvPr>
+          <p:cNvSpPr>
+            <a:spLocks noGrp="1"/>
+          </p:cNvSpPr>
+          <p:nvPr>
+            <p:ph type="ftr" sz="quarter" idx="11"/>
+          </p:nvPr>
+        </p:nvSpPr>
+        <p:spPr>
+          <a:xfrm>
+            <a:off x="1675645" y="6172200"/>
+            <a:ext cx="7543800" cy="365125"/>
+          </a:xfrm>
+        </p:spPr>
+        <p:txBody>
+          <a:bodyPr>
+            <a:normAutofit/>
+          </a:bodyPr>
+          <a:lstStyle/>
+          <a:p>
+            <a:pPr>
+              <a:spcAft>
+                <a:spcPts val="600"/>
+              </a:spcAft>
+            </a:pPr>
+            <a:r>
+              <a:rPr lang="en-US"/>
+              <a:t>Data sourced from Yahoo Finance.</a:t>
+            </a:r>
+          </a:p>
+        </p:txBody>
+      </p:sp>
+    </p:spTree>
+    <p:extLst>
+      <p:ext uri="{BB962C8B-B14F-4D97-AF65-F5344CB8AC3E}">
+        <p14:creationId xmlns:p14="http://schemas.microsoft.com/office/powerpoint/2010/main" val="1326272278"/>
+      </p:ext>
+    </p:extLst>
+  </p:cSld>
+  <p:clrMapOvr>
+    <a:masterClrMapping/>
+  </p:clrMapOvr>
+</p:sld>
+</file>
+
+<file path=ppt/slides/slide19.xml><?xml version="1.0" encoding="utf-8"?>
 <p:sld xmlns:a="http://schemas.openxmlformats.org/drawingml/2006/main" xmlns:r="http://schemas.openxmlformats.org/officeDocument/2006/relationships" xmlns:p="http://schemas.openxmlformats.org/presentationml/2006/main">
   <p:cSld>
     <p:spTree>
@@ -12506,6 +13557,122 @@
 </file>
 
 <file path=ppt/slides/slide2.xml><?xml version="1.0" encoding="utf-8"?>
+<p:sld xmlns:a="http://schemas.openxmlformats.org/drawingml/2006/main" xmlns:r="http://schemas.openxmlformats.org/officeDocument/2006/relationships" xmlns:p="http://schemas.openxmlformats.org/presentationml/2006/main">
+  <p:cSld>
+    <p:spTree>
+      <p:nvGrpSpPr>
+        <p:cNvPr id="1" name=""/>
+        <p:cNvGrpSpPr/>
+        <p:nvPr/>
+      </p:nvGrpSpPr>
+      <p:grpSpPr>
+        <a:xfrm>
+          <a:off x="0" y="0"/>
+          <a:ext cx="0" cy="0"/>
+          <a:chOff x="0" y="0"/>
+          <a:chExt cx="0" cy="0"/>
+        </a:xfrm>
+      </p:grpSpPr>
+      <p:sp>
+        <p:nvSpPr>
+          <p:cNvPr id="2" name="Title 1">
+            <a:extLst>
+              <a:ext uri="{FF2B5EF4-FFF2-40B4-BE49-F238E27FC236}">
+                <a16:creationId xmlns:a16="http://schemas.microsoft.com/office/drawing/2014/main" id="{85DE2178-B783-4C52-9B25-C5368685BDAB}"/>
+              </a:ext>
+            </a:extLst>
+          </p:cNvPr>
+          <p:cNvSpPr>
+            <a:spLocks noGrp="1"/>
+          </p:cNvSpPr>
+          <p:nvPr>
+            <p:ph type="ctrTitle"/>
+          </p:nvPr>
+        </p:nvSpPr>
+        <p:spPr/>
+        <p:txBody>
+          <a:bodyPr/>
+          <a:lstStyle/>
+          <a:p>
+            <a:r>
+              <a:rPr lang="en-US" dirty="0"/>
+              <a:t>Introduction points</a:t>
+            </a:r>
+          </a:p>
+        </p:txBody>
+      </p:sp>
+      <p:sp>
+        <p:nvSpPr>
+          <p:cNvPr id="3" name="Subtitle 2">
+            <a:extLst>
+              <a:ext uri="{FF2B5EF4-FFF2-40B4-BE49-F238E27FC236}">
+                <a16:creationId xmlns:a16="http://schemas.microsoft.com/office/drawing/2014/main" id="{D2CECCFB-EB5E-4C58-B76C-FF2840F3B6CE}"/>
+              </a:ext>
+            </a:extLst>
+          </p:cNvPr>
+          <p:cNvSpPr>
+            <a:spLocks noGrp="1"/>
+          </p:cNvSpPr>
+          <p:nvPr>
+            <p:ph type="subTitle" idx="1"/>
+          </p:nvPr>
+        </p:nvSpPr>
+        <p:spPr/>
+        <p:txBody>
+          <a:bodyPr/>
+          <a:lstStyle/>
+          <a:p>
+            <a:r>
+              <a:rPr lang="en-US" dirty="0"/>
+              <a:t>Car manufacturers live and die on consumer sentiment and the consumers ability to buy a car…</a:t>
+            </a:r>
+          </a:p>
+        </p:txBody>
+      </p:sp>
+      <p:sp>
+        <p:nvSpPr>
+          <p:cNvPr id="4" name="Footer Placeholder 3">
+            <a:extLst>
+              <a:ext uri="{FF2B5EF4-FFF2-40B4-BE49-F238E27FC236}">
+                <a16:creationId xmlns:a16="http://schemas.microsoft.com/office/drawing/2014/main" id="{18D66A5A-E155-4B61-9817-8CD6E36A28CD}"/>
+              </a:ext>
+            </a:extLst>
+          </p:cNvPr>
+          <p:cNvSpPr>
+            <a:spLocks noGrp="1"/>
+          </p:cNvSpPr>
+          <p:nvPr>
+            <p:ph type="ftr" sz="quarter" idx="11"/>
+          </p:nvPr>
+        </p:nvSpPr>
+        <p:spPr/>
+        <p:txBody>
+          <a:bodyPr/>
+          <a:lstStyle/>
+          <a:p>
+            <a:pPr algn="l"/>
+            <a:r>
+              <a:rPr lang="en-US"/>
+              <a:t>Data sourced from Yahoo Finance.</a:t>
+            </a:r>
+            <a:endParaRPr lang="en-US" dirty="0"/>
+          </a:p>
+        </p:txBody>
+      </p:sp>
+    </p:spTree>
+    <p:extLst>
+      <p:ext uri="{BB962C8B-B14F-4D97-AF65-F5344CB8AC3E}">
+        <p14:creationId xmlns:p14="http://schemas.microsoft.com/office/powerpoint/2010/main" val="2631611507"/>
+      </p:ext>
+    </p:extLst>
+  </p:cSld>
+  <p:clrMapOvr>
+    <a:masterClrMapping/>
+  </p:clrMapOvr>
+</p:sld>
+</file>
+
+<file path=ppt/slides/slide3.xml><?xml version="1.0" encoding="utf-8"?>
 <p:sld xmlns:a="http://schemas.openxmlformats.org/drawingml/2006/main" xmlns:r="http://schemas.openxmlformats.org/officeDocument/2006/relationships" xmlns:p="http://schemas.openxmlformats.org/presentationml/2006/main">
   <p:cSld>
     <p:bg>
@@ -13090,7 +14257,7 @@
 </p:sld>
 </file>
 
-<file path=ppt/slides/slide3.xml><?xml version="1.0" encoding="utf-8"?>
+<file path=ppt/slides/slide4.xml><?xml version="1.0" encoding="utf-8"?>
 <p:sld xmlns:a="http://schemas.openxmlformats.org/drawingml/2006/main" xmlns:r="http://schemas.openxmlformats.org/officeDocument/2006/relationships" xmlns:p="http://schemas.openxmlformats.org/presentationml/2006/main">
   <p:cSld>
     <p:bg>
@@ -13674,7 +14841,7 @@
 </p:sld>
 </file>
 
-<file path=ppt/slides/slide4.xml><?xml version="1.0" encoding="utf-8"?>
+<file path=ppt/slides/slide5.xml><?xml version="1.0" encoding="utf-8"?>
 <p:sld xmlns:a="http://schemas.openxmlformats.org/drawingml/2006/main" xmlns:r="http://schemas.openxmlformats.org/officeDocument/2006/relationships" xmlns:p="http://schemas.openxmlformats.org/presentationml/2006/main">
   <p:cSld>
     <p:bg>
@@ -14250,591 +15417,6 @@
     <p:extLst>
       <p:ext uri="{BB962C8B-B14F-4D97-AF65-F5344CB8AC3E}">
         <p14:creationId xmlns:p14="http://schemas.microsoft.com/office/powerpoint/2010/main" val="1091036398"/>
-      </p:ext>
-    </p:extLst>
-  </p:cSld>
-  <p:clrMapOvr>
-    <a:masterClrMapping/>
-  </p:clrMapOvr>
-</p:sld>
-</file>
-
-<file path=ppt/slides/slide5.xml><?xml version="1.0" encoding="utf-8"?>
-<p:sld xmlns:a="http://schemas.openxmlformats.org/drawingml/2006/main" xmlns:r="http://schemas.openxmlformats.org/officeDocument/2006/relationships" xmlns:p="http://schemas.openxmlformats.org/presentationml/2006/main">
-  <p:cSld>
-    <p:bg>
-      <p:bgPr>
-        <a:gradFill rotWithShape="1">
-          <a:gsLst>
-            <a:gs pos="10000">
-              <a:schemeClr val="bg2">
-                <a:tint val="97000"/>
-                <a:hueMod val="92000"/>
-                <a:satMod val="169000"/>
-                <a:lumMod val="164000"/>
-              </a:schemeClr>
-            </a:gs>
-            <a:gs pos="100000">
-              <a:schemeClr val="bg2">
-                <a:shade val="96000"/>
-                <a:satMod val="120000"/>
-                <a:lumMod val="90000"/>
-              </a:schemeClr>
-            </a:gs>
-          </a:gsLst>
-          <a:lin ang="6120000" scaled="1"/>
-        </a:gradFill>
-        <a:effectLst/>
-      </p:bgPr>
-    </p:bg>
-    <p:spTree>
-      <p:nvGrpSpPr>
-        <p:cNvPr id="1" name=""/>
-        <p:cNvGrpSpPr/>
-        <p:nvPr/>
-      </p:nvGrpSpPr>
-      <p:grpSpPr>
-        <a:xfrm>
-          <a:off x="0" y="0"/>
-          <a:ext cx="0" cy="0"/>
-          <a:chOff x="0" y="0"/>
-          <a:chExt cx="0" cy="0"/>
-        </a:xfrm>
-      </p:grpSpPr>
-      <p:grpSp>
-        <p:nvGrpSpPr>
-          <p:cNvPr id="49" name="Group 48">
-            <a:extLst>
-              <a:ext uri="{FF2B5EF4-FFF2-40B4-BE49-F238E27FC236}">
-                <a16:creationId xmlns:a16="http://schemas.microsoft.com/office/drawing/2014/main" id="{2103B461-323C-4912-BFFD-C37582662085}"/>
-              </a:ext>
-              <a:ext uri="{C183D7F6-B498-43B3-948B-1728B52AA6E4}">
-                <adec:decorative xmlns:adec="http://schemas.microsoft.com/office/drawing/2017/decorative" val="1"/>
-              </a:ext>
-            </a:extLst>
-          </p:cNvPr>
-          <p:cNvGrpSpPr>
-            <a:grpSpLocks noGrp="1" noUngrp="1" noRot="1" noChangeAspect="1" noMove="1" noResize="1"/>
-          </p:cNvGrpSpPr>
-          <p:nvPr>
-            <p:extLst>
-              <p:ext uri="{386F3935-93C4-4BCD-93E2-E3B085C9AB24}">
-                <p16:designElem xmlns:p16="http://schemas.microsoft.com/office/powerpoint/2015/main" val="1"/>
-              </p:ext>
-            </p:extLst>
-          </p:nvPr>
-        </p:nvGrpSpPr>
-        <p:grpSpPr>
-          <a:xfrm>
-            <a:off x="9206969" y="2963333"/>
-            <a:ext cx="2981858" cy="3208867"/>
-            <a:chOff x="9206969" y="2963333"/>
-            <a:chExt cx="2981858" cy="3208867"/>
-          </a:xfrm>
-        </p:grpSpPr>
-        <p:cxnSp>
-          <p:nvCxnSpPr>
-            <p:cNvPr id="50" name="Straight Connector 49">
-              <a:extLst>
-                <a:ext uri="{FF2B5EF4-FFF2-40B4-BE49-F238E27FC236}">
-                  <a16:creationId xmlns:a16="http://schemas.microsoft.com/office/drawing/2014/main" id="{FBC21318-F4F4-4524-95D1-6B7FE0A788A3}"/>
-                </a:ext>
-                <a:ext uri="{C183D7F6-B498-43B3-948B-1728B52AA6E4}">
-                  <adec:decorative xmlns:adec="http://schemas.microsoft.com/office/drawing/2017/decorative" val="1"/>
-                </a:ext>
-              </a:extLst>
-            </p:cNvPr>
-            <p:cNvCxnSpPr/>
-            <p:nvPr>
-              <p:extLst>
-                <p:ext uri="{386F3935-93C4-4BCD-93E2-E3B085C9AB24}">
-                  <p16:designElem xmlns:p16="http://schemas.microsoft.com/office/powerpoint/2015/main" val="1"/>
-                </p:ext>
-              </p:extLst>
-            </p:nvPr>
-          </p:nvCxnSpPr>
-          <p:spPr>
-            <a:xfrm flipH="1">
-              <a:off x="11276012" y="2963333"/>
-              <a:ext cx="912814" cy="912812"/>
-            </a:xfrm>
-            <a:prstGeom prst="line">
-              <a:avLst/>
-            </a:prstGeom>
-            <a:ln w="9525">
-              <a:solidFill>
-                <a:schemeClr val="tx1"/>
-              </a:solidFill>
-            </a:ln>
-          </p:spPr>
-          <p:style>
-            <a:lnRef idx="2">
-              <a:schemeClr val="accent1"/>
-            </a:lnRef>
-            <a:fillRef idx="0">
-              <a:schemeClr val="accent1"/>
-            </a:fillRef>
-            <a:effectRef idx="1">
-              <a:schemeClr val="accent1"/>
-            </a:effectRef>
-            <a:fontRef idx="minor">
-              <a:schemeClr val="tx1"/>
-            </a:fontRef>
-          </p:style>
-        </p:cxnSp>
-        <p:cxnSp>
-          <p:nvCxnSpPr>
-            <p:cNvPr id="51" name="Straight Connector 50">
-              <a:extLst>
-                <a:ext uri="{FF2B5EF4-FFF2-40B4-BE49-F238E27FC236}">
-                  <a16:creationId xmlns:a16="http://schemas.microsoft.com/office/drawing/2014/main" id="{D9FFA8E5-974F-409E-89C6-E185BD90933C}"/>
-                </a:ext>
-                <a:ext uri="{C183D7F6-B498-43B3-948B-1728B52AA6E4}">
-                  <adec:decorative xmlns:adec="http://schemas.microsoft.com/office/drawing/2017/decorative" val="1"/>
-                </a:ext>
-              </a:extLst>
-            </p:cNvPr>
-            <p:cNvCxnSpPr/>
-            <p:nvPr>
-              <p:extLst>
-                <p:ext uri="{386F3935-93C4-4BCD-93E2-E3B085C9AB24}">
-                  <p16:designElem xmlns:p16="http://schemas.microsoft.com/office/powerpoint/2015/main" val="1"/>
-                </p:ext>
-              </p:extLst>
-            </p:nvPr>
-          </p:nvCxnSpPr>
-          <p:spPr>
-            <a:xfrm flipH="1">
-              <a:off x="9206969" y="3190344"/>
-              <a:ext cx="2981857" cy="2981856"/>
-            </a:xfrm>
-            <a:prstGeom prst="line">
-              <a:avLst/>
-            </a:prstGeom>
-            <a:ln w="9525">
-              <a:solidFill>
-                <a:schemeClr val="tx1"/>
-              </a:solidFill>
-            </a:ln>
-          </p:spPr>
-          <p:style>
-            <a:lnRef idx="2">
-              <a:schemeClr val="accent1"/>
-            </a:lnRef>
-            <a:fillRef idx="0">
-              <a:schemeClr val="accent1"/>
-            </a:fillRef>
-            <a:effectRef idx="1">
-              <a:schemeClr val="accent1"/>
-            </a:effectRef>
-            <a:fontRef idx="minor">
-              <a:schemeClr val="tx1"/>
-            </a:fontRef>
-          </p:style>
-        </p:cxnSp>
-        <p:cxnSp>
-          <p:nvCxnSpPr>
-            <p:cNvPr id="52" name="Straight Connector 51">
-              <a:extLst>
-                <a:ext uri="{FF2B5EF4-FFF2-40B4-BE49-F238E27FC236}">
-                  <a16:creationId xmlns:a16="http://schemas.microsoft.com/office/drawing/2014/main" id="{C384E2B1-7008-45EE-9F2E-FEF3A089780F}"/>
-                </a:ext>
-                <a:ext uri="{C183D7F6-B498-43B3-948B-1728B52AA6E4}">
-                  <adec:decorative xmlns:adec="http://schemas.microsoft.com/office/drawing/2017/decorative" val="1"/>
-                </a:ext>
-              </a:extLst>
-            </p:cNvPr>
-            <p:cNvCxnSpPr/>
-            <p:nvPr>
-              <p:extLst>
-                <p:ext uri="{386F3935-93C4-4BCD-93E2-E3B085C9AB24}">
-                  <p16:designElem xmlns:p16="http://schemas.microsoft.com/office/powerpoint/2015/main" val="1"/>
-                </p:ext>
-              </p:extLst>
-            </p:nvPr>
-          </p:nvCxnSpPr>
-          <p:spPr>
-            <a:xfrm flipH="1">
-              <a:off x="10292292" y="3285067"/>
-              <a:ext cx="1896534" cy="1896533"/>
-            </a:xfrm>
-            <a:prstGeom prst="line">
-              <a:avLst/>
-            </a:prstGeom>
-            <a:ln w="9525">
-              <a:solidFill>
-                <a:schemeClr val="tx1"/>
-              </a:solidFill>
-            </a:ln>
-          </p:spPr>
-          <p:style>
-            <a:lnRef idx="2">
-              <a:schemeClr val="accent1"/>
-            </a:lnRef>
-            <a:fillRef idx="0">
-              <a:schemeClr val="accent1"/>
-            </a:fillRef>
-            <a:effectRef idx="1">
-              <a:schemeClr val="accent1"/>
-            </a:effectRef>
-            <a:fontRef idx="minor">
-              <a:schemeClr val="tx1"/>
-            </a:fontRef>
-          </p:style>
-        </p:cxnSp>
-        <p:cxnSp>
-          <p:nvCxnSpPr>
-            <p:cNvPr id="53" name="Straight Connector 52">
-              <a:extLst>
-                <a:ext uri="{FF2B5EF4-FFF2-40B4-BE49-F238E27FC236}">
-                  <a16:creationId xmlns:a16="http://schemas.microsoft.com/office/drawing/2014/main" id="{D4563410-7FE9-4955-89C6-0FB9326CD3A8}"/>
-                </a:ext>
-                <a:ext uri="{C183D7F6-B498-43B3-948B-1728B52AA6E4}">
-                  <adec:decorative xmlns:adec="http://schemas.microsoft.com/office/drawing/2017/decorative" val="1"/>
-                </a:ext>
-              </a:extLst>
-            </p:cNvPr>
-            <p:cNvCxnSpPr/>
-            <p:nvPr>
-              <p:extLst>
-                <p:ext uri="{386F3935-93C4-4BCD-93E2-E3B085C9AB24}">
-                  <p16:designElem xmlns:p16="http://schemas.microsoft.com/office/powerpoint/2015/main" val="1"/>
-                </p:ext>
-              </p:extLst>
-            </p:nvPr>
-          </p:nvCxnSpPr>
-          <p:spPr>
-            <a:xfrm flipH="1">
-              <a:off x="10443103" y="3131080"/>
-              <a:ext cx="1745722" cy="1745720"/>
-            </a:xfrm>
-            <a:prstGeom prst="line">
-              <a:avLst/>
-            </a:prstGeom>
-            <a:ln w="28575">
-              <a:solidFill>
-                <a:schemeClr val="tx1"/>
-              </a:solidFill>
-            </a:ln>
-          </p:spPr>
-          <p:style>
-            <a:lnRef idx="2">
-              <a:schemeClr val="accent1"/>
-            </a:lnRef>
-            <a:fillRef idx="0">
-              <a:schemeClr val="accent1"/>
-            </a:fillRef>
-            <a:effectRef idx="1">
-              <a:schemeClr val="accent1"/>
-            </a:effectRef>
-            <a:fontRef idx="minor">
-              <a:schemeClr val="tx1"/>
-            </a:fontRef>
-          </p:style>
-        </p:cxnSp>
-        <p:cxnSp>
-          <p:nvCxnSpPr>
-            <p:cNvPr id="54" name="Straight Connector 53">
-              <a:extLst>
-                <a:ext uri="{FF2B5EF4-FFF2-40B4-BE49-F238E27FC236}">
-                  <a16:creationId xmlns:a16="http://schemas.microsoft.com/office/drawing/2014/main" id="{3AD14C0E-D5DF-4BDC-BD92-642CFF18018D}"/>
-                </a:ext>
-                <a:ext uri="{C183D7F6-B498-43B3-948B-1728B52AA6E4}">
-                  <adec:decorative xmlns:adec="http://schemas.microsoft.com/office/drawing/2017/decorative" val="1"/>
-                </a:ext>
-              </a:extLst>
-            </p:cNvPr>
-            <p:cNvCxnSpPr/>
-            <p:nvPr>
-              <p:extLst>
-                <p:ext uri="{386F3935-93C4-4BCD-93E2-E3B085C9AB24}">
-                  <p16:designElem xmlns:p16="http://schemas.microsoft.com/office/powerpoint/2015/main" val="1"/>
-                </p:ext>
-              </p:extLst>
-            </p:nvPr>
-          </p:nvCxnSpPr>
-          <p:spPr>
-            <a:xfrm flipH="1">
-              <a:off x="10918826" y="3683001"/>
-              <a:ext cx="1270001" cy="1269999"/>
-            </a:xfrm>
-            <a:prstGeom prst="line">
-              <a:avLst/>
-            </a:prstGeom>
-            <a:ln w="28575">
-              <a:solidFill>
-                <a:schemeClr val="tx1"/>
-              </a:solidFill>
-            </a:ln>
-          </p:spPr>
-          <p:style>
-            <a:lnRef idx="2">
-              <a:schemeClr val="accent1"/>
-            </a:lnRef>
-            <a:fillRef idx="0">
-              <a:schemeClr val="accent1"/>
-            </a:fillRef>
-            <a:effectRef idx="1">
-              <a:schemeClr val="accent1"/>
-            </a:effectRef>
-            <a:fontRef idx="minor">
-              <a:schemeClr val="tx1"/>
-            </a:fontRef>
-          </p:style>
-        </p:cxnSp>
-      </p:grpSp>
-      <p:sp useBgFill="1">
-        <p:nvSpPr>
-          <p:cNvPr id="56" name="Rectangle 55">
-            <a:extLst>
-              <a:ext uri="{FF2B5EF4-FFF2-40B4-BE49-F238E27FC236}">
-                <a16:creationId xmlns:a16="http://schemas.microsoft.com/office/drawing/2014/main" id="{9A212F8F-D812-4A16-BE82-F3500DE32174}"/>
-              </a:ext>
-              <a:ext uri="{C183D7F6-B498-43B3-948B-1728B52AA6E4}">
-                <adec:decorative xmlns:adec="http://schemas.microsoft.com/office/drawing/2017/decorative" val="1"/>
-              </a:ext>
-            </a:extLst>
-          </p:cNvPr>
-          <p:cNvSpPr>
-            <a:spLocks noGrp="1" noRot="1" noChangeAspect="1" noMove="1" noResize="1" noEditPoints="1" noAdjustHandles="1" noChangeArrowheads="1" noChangeShapeType="1" noTextEdit="1"/>
-          </p:cNvSpPr>
-          <p:nvPr>
-            <p:extLst>
-              <p:ext uri="{386F3935-93C4-4BCD-93E2-E3B085C9AB24}">
-                <p16:designElem xmlns:p16="http://schemas.microsoft.com/office/powerpoint/2015/main" val="1"/>
-              </p:ext>
-            </p:extLst>
-          </p:nvPr>
-        </p:nvSpPr>
-        <p:spPr>
-          <a:xfrm>
-            <a:off x="0" y="0"/>
-            <a:ext cx="12192000" cy="6858000"/>
-          </a:xfrm>
-          <a:prstGeom prst="rect">
-            <a:avLst/>
-          </a:prstGeom>
-          <a:ln>
-            <a:noFill/>
-          </a:ln>
-        </p:spPr>
-        <p:style>
-          <a:lnRef idx="2">
-            <a:schemeClr val="accent1">
-              <a:shade val="50000"/>
-            </a:schemeClr>
-          </a:lnRef>
-          <a:fillRef idx="1">
-            <a:schemeClr val="accent1"/>
-          </a:fillRef>
-          <a:effectRef idx="0">
-            <a:schemeClr val="accent1"/>
-          </a:effectRef>
-          <a:fontRef idx="minor">
-            <a:schemeClr val="lt1"/>
-          </a:fontRef>
-        </p:style>
-        <p:txBody>
-          <a:bodyPr rtlCol="0" anchor="ctr"/>
-          <a:lstStyle/>
-          <a:p>
-            <a:pPr algn="ctr"/>
-            <a:endParaRPr lang="en-US"/>
-          </a:p>
-        </p:txBody>
-      </p:sp>
-      <p:sp>
-        <p:nvSpPr>
-          <p:cNvPr id="4" name="Footer Placeholder 3">
-            <a:extLst>
-              <a:ext uri="{FF2B5EF4-FFF2-40B4-BE49-F238E27FC236}">
-                <a16:creationId xmlns:a16="http://schemas.microsoft.com/office/drawing/2014/main" id="{19111D3B-875C-466E-8065-835C1077A343}"/>
-              </a:ext>
-            </a:extLst>
-          </p:cNvPr>
-          <p:cNvSpPr>
-            <a:spLocks noGrp="1"/>
-          </p:cNvSpPr>
-          <p:nvPr>
-            <p:ph type="ftr" sz="quarter" idx="11"/>
-          </p:nvPr>
-        </p:nvSpPr>
-        <p:spPr>
-          <a:xfrm>
-            <a:off x="684212" y="6290187"/>
-            <a:ext cx="7543800" cy="365125"/>
-          </a:xfrm>
-        </p:spPr>
-        <p:txBody>
-          <a:bodyPr vert="horz" lIns="91440" tIns="45720" rIns="91440" bIns="45720" rtlCol="0" anchor="t">
-            <a:normAutofit/>
-          </a:bodyPr>
-          <a:lstStyle/>
-          <a:p>
-            <a:pPr>
-              <a:spcAft>
-                <a:spcPts val="600"/>
-              </a:spcAft>
-            </a:pPr>
-            <a:r>
-              <a:rPr lang="en-US" b="0" i="0" kern="1200">
-                <a:solidFill>
-                  <a:schemeClr val="bg2">
-                    <a:lumMod val="50000"/>
-                  </a:schemeClr>
-                </a:solidFill>
-                <a:effectLst/>
-                <a:latin typeface="+mn-lt"/>
-                <a:ea typeface="+mn-ea"/>
-                <a:cs typeface="+mn-cs"/>
-              </a:rPr>
-              <a:t>Data sourced from Yahoo Finance.</a:t>
-            </a:r>
-          </a:p>
-        </p:txBody>
-      </p:sp>
-      <p:sp>
-        <p:nvSpPr>
-          <p:cNvPr id="58" name="Snip Diagonal Corner Rectangle 24">
-            <a:extLst>
-              <a:ext uri="{FF2B5EF4-FFF2-40B4-BE49-F238E27FC236}">
-                <a16:creationId xmlns:a16="http://schemas.microsoft.com/office/drawing/2014/main" id="{D2CF1D1B-04ED-443D-A9FE-68BF8859BDD6}"/>
-              </a:ext>
-              <a:ext uri="{C183D7F6-B498-43B3-948B-1728B52AA6E4}">
-                <adec:decorative xmlns:adec="http://schemas.microsoft.com/office/drawing/2017/decorative" val="1"/>
-              </a:ext>
-            </a:extLst>
-          </p:cNvPr>
-          <p:cNvSpPr>
-            <a:spLocks noGrp="1" noRot="1" noChangeAspect="1" noMove="1" noResize="1" noEditPoints="1" noAdjustHandles="1" noChangeArrowheads="1" noChangeShapeType="1" noTextEdit="1"/>
-          </p:cNvSpPr>
-          <p:nvPr>
-            <p:extLst>
-              <p:ext uri="{386F3935-93C4-4BCD-93E2-E3B085C9AB24}">
-                <p16:designElem xmlns:p16="http://schemas.microsoft.com/office/powerpoint/2015/main" val="1"/>
-              </p:ext>
-            </p:extLst>
-          </p:nvPr>
-        </p:nvSpPr>
-        <p:spPr>
-          <a:xfrm>
-            <a:off x="628229" y="620722"/>
-            <a:ext cx="10935543" cy="5286838"/>
-          </a:xfrm>
-          <a:prstGeom prst="snip2DiagRect">
-            <a:avLst>
-              <a:gd name="adj1" fmla="val 10787"/>
-              <a:gd name="adj2" fmla="val 0"/>
-            </a:avLst>
-          </a:prstGeom>
-          <a:solidFill>
-            <a:schemeClr val="tx1"/>
-          </a:solidFill>
-          <a:ln>
-            <a:noFill/>
-          </a:ln>
-          <a:effectLst>
-            <a:innerShdw blurRad="57150" dist="38100" dir="14460000">
-              <a:prstClr val="black">
-                <a:alpha val="70000"/>
-              </a:prstClr>
-            </a:innerShdw>
-          </a:effectLst>
-        </p:spPr>
-        <p:style>
-          <a:lnRef idx="2">
-            <a:schemeClr val="accent1">
-              <a:shade val="50000"/>
-            </a:schemeClr>
-          </a:lnRef>
-          <a:fillRef idx="1">
-            <a:schemeClr val="accent1"/>
-          </a:fillRef>
-          <a:effectRef idx="0">
-            <a:schemeClr val="accent1"/>
-          </a:effectRef>
-          <a:fontRef idx="minor">
-            <a:schemeClr val="lt1"/>
-          </a:fontRef>
-        </p:style>
-        <p:txBody>
-          <a:bodyPr rtlCol="0" anchor="ctr"/>
-          <a:lstStyle/>
-          <a:p>
-            <a:pPr algn="ctr"/>
-            <a:endParaRPr lang="en-US"/>
-          </a:p>
-        </p:txBody>
-      </p:sp>
-      <p:pic>
-        <p:nvPicPr>
-          <p:cNvPr id="6" name="Content Placeholder 5" descr="Chart&#10;&#10;Description automatically generated">
-            <a:extLst>
-              <a:ext uri="{FF2B5EF4-FFF2-40B4-BE49-F238E27FC236}">
-                <a16:creationId xmlns:a16="http://schemas.microsoft.com/office/drawing/2014/main" id="{7BCD5424-6057-4E9E-8593-22BEB08EDDB2}"/>
-              </a:ext>
-            </a:extLst>
-          </p:cNvPr>
-          <p:cNvPicPr>
-            <a:picLocks noGrp="1" noChangeAspect="1"/>
-          </p:cNvPicPr>
-          <p:nvPr>
-            <p:ph idx="1"/>
-          </p:nvPr>
-        </p:nvPicPr>
-        <p:blipFill>
-          <a:blip r:embed="rId2">
-            <a:extLst>
-              <a:ext uri="{28A0092B-C50C-407E-A947-70E740481C1C}">
-                <a14:useLocalDpi xmlns:a14="http://schemas.microsoft.com/office/drawing/2010/main" val="0"/>
-              </a:ext>
-            </a:extLst>
-          </a:blip>
-          <a:stretch>
-            <a:fillRect/>
-          </a:stretch>
-        </p:blipFill>
-        <p:spPr>
-          <a:xfrm>
-            <a:off x="1353370" y="786117"/>
-            <a:ext cx="9485259" cy="4956048"/>
-          </a:xfrm>
-          <a:custGeom>
-            <a:avLst/>
-            <a:gdLst/>
-            <a:ahLst/>
-            <a:cxnLst/>
-            <a:rect l="l" t="t" r="r" b="b"/>
-            <a:pathLst>
-              <a:path w="10607040" h="4956048">
-                <a:moveTo>
-                  <a:pt x="497480" y="0"/>
-                </a:moveTo>
-                <a:lnTo>
-                  <a:pt x="10607040" y="0"/>
-                </a:lnTo>
-                <a:lnTo>
-                  <a:pt x="10607040" y="4485407"/>
-                </a:lnTo>
-                <a:lnTo>
-                  <a:pt x="10131692" y="4956048"/>
-                </a:lnTo>
-                <a:lnTo>
-                  <a:pt x="0" y="4956048"/>
-                </a:lnTo>
-                <a:lnTo>
-                  <a:pt x="0" y="492554"/>
-                </a:lnTo>
-                <a:close/>
-              </a:path>
-            </a:pathLst>
-          </a:custGeom>
-        </p:spPr>
-      </p:pic>
-    </p:spTree>
-    <p:extLst>
-      <p:ext uri="{BB962C8B-B14F-4D97-AF65-F5344CB8AC3E}">
-        <p14:creationId xmlns:p14="http://schemas.microsoft.com/office/powerpoint/2010/main" val="848042870"/>
       </p:ext>
     </p:extLst>
   </p:cSld>
@@ -14969,6 +15551,591 @@
         </p:cxnSp>
         <p:cxnSp>
           <p:nvCxnSpPr>
+            <p:cNvPr id="76" name="Straight Connector 64">
+              <a:extLst>
+                <a:ext uri="{FF2B5EF4-FFF2-40B4-BE49-F238E27FC236}">
+                  <a16:creationId xmlns:a16="http://schemas.microsoft.com/office/drawing/2014/main" id="{D9FFA8E5-974F-409E-89C6-E185BD90933C}"/>
+                </a:ext>
+                <a:ext uri="{C183D7F6-B498-43B3-948B-1728B52AA6E4}">
+                  <adec:decorative xmlns:adec="http://schemas.microsoft.com/office/drawing/2017/decorative" val="1"/>
+                </a:ext>
+              </a:extLst>
+            </p:cNvPr>
+            <p:cNvCxnSpPr/>
+            <p:nvPr>
+              <p:extLst>
+                <p:ext uri="{386F3935-93C4-4BCD-93E2-E3B085C9AB24}">
+                  <p16:designElem xmlns:p16="http://schemas.microsoft.com/office/powerpoint/2015/main" val="1"/>
+                </p:ext>
+              </p:extLst>
+            </p:nvPr>
+          </p:nvCxnSpPr>
+          <p:spPr>
+            <a:xfrm flipH="1">
+              <a:off x="9206969" y="3190344"/>
+              <a:ext cx="2981857" cy="2981856"/>
+            </a:xfrm>
+            <a:prstGeom prst="line">
+              <a:avLst/>
+            </a:prstGeom>
+            <a:ln w="9525">
+              <a:solidFill>
+                <a:schemeClr val="tx1"/>
+              </a:solidFill>
+            </a:ln>
+          </p:spPr>
+          <p:style>
+            <a:lnRef idx="2">
+              <a:schemeClr val="accent1"/>
+            </a:lnRef>
+            <a:fillRef idx="0">
+              <a:schemeClr val="accent1"/>
+            </a:fillRef>
+            <a:effectRef idx="1">
+              <a:schemeClr val="accent1"/>
+            </a:effectRef>
+            <a:fontRef idx="minor">
+              <a:schemeClr val="tx1"/>
+            </a:fontRef>
+          </p:style>
+        </p:cxnSp>
+        <p:cxnSp>
+          <p:nvCxnSpPr>
+            <p:cNvPr id="66" name="Straight Connector 65">
+              <a:extLst>
+                <a:ext uri="{FF2B5EF4-FFF2-40B4-BE49-F238E27FC236}">
+                  <a16:creationId xmlns:a16="http://schemas.microsoft.com/office/drawing/2014/main" id="{C384E2B1-7008-45EE-9F2E-FEF3A089780F}"/>
+                </a:ext>
+                <a:ext uri="{C183D7F6-B498-43B3-948B-1728B52AA6E4}">
+                  <adec:decorative xmlns:adec="http://schemas.microsoft.com/office/drawing/2017/decorative" val="1"/>
+                </a:ext>
+              </a:extLst>
+            </p:cNvPr>
+            <p:cNvCxnSpPr/>
+            <p:nvPr>
+              <p:extLst>
+                <p:ext uri="{386F3935-93C4-4BCD-93E2-E3B085C9AB24}">
+                  <p16:designElem xmlns:p16="http://schemas.microsoft.com/office/powerpoint/2015/main" val="1"/>
+                </p:ext>
+              </p:extLst>
+            </p:nvPr>
+          </p:nvCxnSpPr>
+          <p:spPr>
+            <a:xfrm flipH="1">
+              <a:off x="10292292" y="3285067"/>
+              <a:ext cx="1896534" cy="1896533"/>
+            </a:xfrm>
+            <a:prstGeom prst="line">
+              <a:avLst/>
+            </a:prstGeom>
+            <a:ln w="9525">
+              <a:solidFill>
+                <a:schemeClr val="tx1"/>
+              </a:solidFill>
+            </a:ln>
+          </p:spPr>
+          <p:style>
+            <a:lnRef idx="2">
+              <a:schemeClr val="accent1"/>
+            </a:lnRef>
+            <a:fillRef idx="0">
+              <a:schemeClr val="accent1"/>
+            </a:fillRef>
+            <a:effectRef idx="1">
+              <a:schemeClr val="accent1"/>
+            </a:effectRef>
+            <a:fontRef idx="minor">
+              <a:schemeClr val="tx1"/>
+            </a:fontRef>
+          </p:style>
+        </p:cxnSp>
+        <p:cxnSp>
+          <p:nvCxnSpPr>
+            <p:cNvPr id="77" name="Straight Connector 66">
+              <a:extLst>
+                <a:ext uri="{FF2B5EF4-FFF2-40B4-BE49-F238E27FC236}">
+                  <a16:creationId xmlns:a16="http://schemas.microsoft.com/office/drawing/2014/main" id="{D4563410-7FE9-4955-89C6-0FB9326CD3A8}"/>
+                </a:ext>
+                <a:ext uri="{C183D7F6-B498-43B3-948B-1728B52AA6E4}">
+                  <adec:decorative xmlns:adec="http://schemas.microsoft.com/office/drawing/2017/decorative" val="1"/>
+                </a:ext>
+              </a:extLst>
+            </p:cNvPr>
+            <p:cNvCxnSpPr/>
+            <p:nvPr>
+              <p:extLst>
+                <p:ext uri="{386F3935-93C4-4BCD-93E2-E3B085C9AB24}">
+                  <p16:designElem xmlns:p16="http://schemas.microsoft.com/office/powerpoint/2015/main" val="1"/>
+                </p:ext>
+              </p:extLst>
+            </p:nvPr>
+          </p:nvCxnSpPr>
+          <p:spPr>
+            <a:xfrm flipH="1">
+              <a:off x="10443103" y="3131080"/>
+              <a:ext cx="1745722" cy="1745720"/>
+            </a:xfrm>
+            <a:prstGeom prst="line">
+              <a:avLst/>
+            </a:prstGeom>
+            <a:ln w="28575">
+              <a:solidFill>
+                <a:schemeClr val="tx1"/>
+              </a:solidFill>
+            </a:ln>
+          </p:spPr>
+          <p:style>
+            <a:lnRef idx="2">
+              <a:schemeClr val="accent1"/>
+            </a:lnRef>
+            <a:fillRef idx="0">
+              <a:schemeClr val="accent1"/>
+            </a:fillRef>
+            <a:effectRef idx="1">
+              <a:schemeClr val="accent1"/>
+            </a:effectRef>
+            <a:fontRef idx="minor">
+              <a:schemeClr val="tx1"/>
+            </a:fontRef>
+          </p:style>
+        </p:cxnSp>
+        <p:cxnSp>
+          <p:nvCxnSpPr>
+            <p:cNvPr id="68" name="Straight Connector 67">
+              <a:extLst>
+                <a:ext uri="{FF2B5EF4-FFF2-40B4-BE49-F238E27FC236}">
+                  <a16:creationId xmlns:a16="http://schemas.microsoft.com/office/drawing/2014/main" id="{3AD14C0E-D5DF-4BDC-BD92-642CFF18018D}"/>
+                </a:ext>
+                <a:ext uri="{C183D7F6-B498-43B3-948B-1728B52AA6E4}">
+                  <adec:decorative xmlns:adec="http://schemas.microsoft.com/office/drawing/2017/decorative" val="1"/>
+                </a:ext>
+              </a:extLst>
+            </p:cNvPr>
+            <p:cNvCxnSpPr/>
+            <p:nvPr>
+              <p:extLst>
+                <p:ext uri="{386F3935-93C4-4BCD-93E2-E3B085C9AB24}">
+                  <p16:designElem xmlns:p16="http://schemas.microsoft.com/office/powerpoint/2015/main" val="1"/>
+                </p:ext>
+              </p:extLst>
+            </p:nvPr>
+          </p:nvCxnSpPr>
+          <p:spPr>
+            <a:xfrm flipH="1">
+              <a:off x="10918826" y="3683001"/>
+              <a:ext cx="1270001" cy="1269999"/>
+            </a:xfrm>
+            <a:prstGeom prst="line">
+              <a:avLst/>
+            </a:prstGeom>
+            <a:ln w="28575">
+              <a:solidFill>
+                <a:schemeClr val="tx1"/>
+              </a:solidFill>
+            </a:ln>
+          </p:spPr>
+          <p:style>
+            <a:lnRef idx="2">
+              <a:schemeClr val="accent1"/>
+            </a:lnRef>
+            <a:fillRef idx="0">
+              <a:schemeClr val="accent1"/>
+            </a:fillRef>
+            <a:effectRef idx="1">
+              <a:schemeClr val="accent1"/>
+            </a:effectRef>
+            <a:fontRef idx="minor">
+              <a:schemeClr val="tx1"/>
+            </a:fontRef>
+          </p:style>
+        </p:cxnSp>
+      </p:grpSp>
+      <p:sp useBgFill="1">
+        <p:nvSpPr>
+          <p:cNvPr id="70" name="Rectangle 69">
+            <a:extLst>
+              <a:ext uri="{FF2B5EF4-FFF2-40B4-BE49-F238E27FC236}">
+                <a16:creationId xmlns:a16="http://schemas.microsoft.com/office/drawing/2014/main" id="{9A212F8F-D812-4A16-BE82-F3500DE32174}"/>
+              </a:ext>
+              <a:ext uri="{C183D7F6-B498-43B3-948B-1728B52AA6E4}">
+                <adec:decorative xmlns:adec="http://schemas.microsoft.com/office/drawing/2017/decorative" val="1"/>
+              </a:ext>
+            </a:extLst>
+          </p:cNvPr>
+          <p:cNvSpPr>
+            <a:spLocks noGrp="1" noRot="1" noChangeAspect="1" noMove="1" noResize="1" noEditPoints="1" noAdjustHandles="1" noChangeArrowheads="1" noChangeShapeType="1" noTextEdit="1"/>
+          </p:cNvSpPr>
+          <p:nvPr>
+            <p:extLst>
+              <p:ext uri="{386F3935-93C4-4BCD-93E2-E3B085C9AB24}">
+                <p16:designElem xmlns:p16="http://schemas.microsoft.com/office/powerpoint/2015/main" val="1"/>
+              </p:ext>
+            </p:extLst>
+          </p:nvPr>
+        </p:nvSpPr>
+        <p:spPr>
+          <a:xfrm>
+            <a:off x="0" y="0"/>
+            <a:ext cx="12192000" cy="6858000"/>
+          </a:xfrm>
+          <a:prstGeom prst="rect">
+            <a:avLst/>
+          </a:prstGeom>
+          <a:ln>
+            <a:noFill/>
+          </a:ln>
+        </p:spPr>
+        <p:style>
+          <a:lnRef idx="2">
+            <a:schemeClr val="accent1">
+              <a:shade val="50000"/>
+            </a:schemeClr>
+          </a:lnRef>
+          <a:fillRef idx="1">
+            <a:schemeClr val="accent1"/>
+          </a:fillRef>
+          <a:effectRef idx="0">
+            <a:schemeClr val="accent1"/>
+          </a:effectRef>
+          <a:fontRef idx="minor">
+            <a:schemeClr val="lt1"/>
+          </a:fontRef>
+        </p:style>
+        <p:txBody>
+          <a:bodyPr rtlCol="0" anchor="ctr"/>
+          <a:lstStyle/>
+          <a:p>
+            <a:pPr algn="ctr"/>
+            <a:endParaRPr lang="en-US"/>
+          </a:p>
+        </p:txBody>
+      </p:sp>
+      <p:sp>
+        <p:nvSpPr>
+          <p:cNvPr id="4" name="Footer Placeholder 3">
+            <a:extLst>
+              <a:ext uri="{FF2B5EF4-FFF2-40B4-BE49-F238E27FC236}">
+                <a16:creationId xmlns:a16="http://schemas.microsoft.com/office/drawing/2014/main" id="{19111D3B-875C-466E-8065-835C1077A343}"/>
+              </a:ext>
+            </a:extLst>
+          </p:cNvPr>
+          <p:cNvSpPr>
+            <a:spLocks noGrp="1"/>
+          </p:cNvSpPr>
+          <p:nvPr>
+            <p:ph type="ftr" sz="quarter" idx="11"/>
+          </p:nvPr>
+        </p:nvSpPr>
+        <p:spPr>
+          <a:xfrm>
+            <a:off x="684212" y="6290187"/>
+            <a:ext cx="7543800" cy="365125"/>
+          </a:xfrm>
+        </p:spPr>
+        <p:txBody>
+          <a:bodyPr vert="horz" lIns="91440" tIns="45720" rIns="91440" bIns="45720" rtlCol="0" anchor="t">
+            <a:normAutofit/>
+          </a:bodyPr>
+          <a:lstStyle/>
+          <a:p>
+            <a:pPr>
+              <a:spcAft>
+                <a:spcPts val="600"/>
+              </a:spcAft>
+            </a:pPr>
+            <a:r>
+              <a:rPr lang="en-US" b="0" i="0" kern="1200">
+                <a:solidFill>
+                  <a:schemeClr val="bg2">
+                    <a:lumMod val="50000"/>
+                  </a:schemeClr>
+                </a:solidFill>
+                <a:effectLst/>
+                <a:latin typeface="+mn-lt"/>
+                <a:ea typeface="+mn-ea"/>
+                <a:cs typeface="+mn-cs"/>
+              </a:rPr>
+              <a:t>Data sourced from Yahoo Finance.</a:t>
+            </a:r>
+          </a:p>
+        </p:txBody>
+      </p:sp>
+      <p:sp>
+        <p:nvSpPr>
+          <p:cNvPr id="72" name="Snip Diagonal Corner Rectangle 24">
+            <a:extLst>
+              <a:ext uri="{FF2B5EF4-FFF2-40B4-BE49-F238E27FC236}">
+                <a16:creationId xmlns:a16="http://schemas.microsoft.com/office/drawing/2014/main" id="{D2CF1D1B-04ED-443D-A9FE-68BF8859BDD6}"/>
+              </a:ext>
+              <a:ext uri="{C183D7F6-B498-43B3-948B-1728B52AA6E4}">
+                <adec:decorative xmlns:adec="http://schemas.microsoft.com/office/drawing/2017/decorative" val="1"/>
+              </a:ext>
+            </a:extLst>
+          </p:cNvPr>
+          <p:cNvSpPr>
+            <a:spLocks noGrp="1" noRot="1" noChangeAspect="1" noMove="1" noResize="1" noEditPoints="1" noAdjustHandles="1" noChangeArrowheads="1" noChangeShapeType="1" noTextEdit="1"/>
+          </p:cNvSpPr>
+          <p:nvPr>
+            <p:extLst>
+              <p:ext uri="{386F3935-93C4-4BCD-93E2-E3B085C9AB24}">
+                <p16:designElem xmlns:p16="http://schemas.microsoft.com/office/powerpoint/2015/main" val="1"/>
+              </p:ext>
+            </p:extLst>
+          </p:nvPr>
+        </p:nvSpPr>
+        <p:spPr>
+          <a:xfrm>
+            <a:off x="628229" y="620722"/>
+            <a:ext cx="10935543" cy="5286838"/>
+          </a:xfrm>
+          <a:prstGeom prst="snip2DiagRect">
+            <a:avLst>
+              <a:gd name="adj1" fmla="val 10787"/>
+              <a:gd name="adj2" fmla="val 0"/>
+            </a:avLst>
+          </a:prstGeom>
+          <a:solidFill>
+            <a:schemeClr val="tx1"/>
+          </a:solidFill>
+          <a:ln>
+            <a:noFill/>
+          </a:ln>
+          <a:effectLst>
+            <a:innerShdw blurRad="57150" dist="38100" dir="14460000">
+              <a:prstClr val="black">
+                <a:alpha val="70000"/>
+              </a:prstClr>
+            </a:innerShdw>
+          </a:effectLst>
+        </p:spPr>
+        <p:style>
+          <a:lnRef idx="2">
+            <a:schemeClr val="accent1">
+              <a:shade val="50000"/>
+            </a:schemeClr>
+          </a:lnRef>
+          <a:fillRef idx="1">
+            <a:schemeClr val="accent1"/>
+          </a:fillRef>
+          <a:effectRef idx="0">
+            <a:schemeClr val="accent1"/>
+          </a:effectRef>
+          <a:fontRef idx="minor">
+            <a:schemeClr val="lt1"/>
+          </a:fontRef>
+        </p:style>
+        <p:txBody>
+          <a:bodyPr rtlCol="0" anchor="ctr"/>
+          <a:lstStyle/>
+          <a:p>
+            <a:pPr algn="ctr"/>
+            <a:endParaRPr lang="en-US"/>
+          </a:p>
+        </p:txBody>
+      </p:sp>
+      <p:pic>
+        <p:nvPicPr>
+          <p:cNvPr id="6" name="Content Placeholder 5" descr="Chart&#10;&#10;Description automatically generated">
+            <a:extLst>
+              <a:ext uri="{FF2B5EF4-FFF2-40B4-BE49-F238E27FC236}">
+                <a16:creationId xmlns:a16="http://schemas.microsoft.com/office/drawing/2014/main" id="{7BCD5424-6057-4E9E-8593-22BEB08EDDB2}"/>
+              </a:ext>
+            </a:extLst>
+          </p:cNvPr>
+          <p:cNvPicPr>
+            <a:picLocks noGrp="1" noChangeAspect="1"/>
+          </p:cNvPicPr>
+          <p:nvPr>
+            <p:ph idx="1"/>
+          </p:nvPr>
+        </p:nvPicPr>
+        <p:blipFill>
+          <a:blip r:embed="rId2">
+            <a:extLst>
+              <a:ext uri="{28A0092B-C50C-407E-A947-70E740481C1C}">
+                <a14:useLocalDpi xmlns:a14="http://schemas.microsoft.com/office/drawing/2010/main" val="0"/>
+              </a:ext>
+            </a:extLst>
+          </a:blip>
+          <a:stretch>
+            <a:fillRect/>
+          </a:stretch>
+        </p:blipFill>
+        <p:spPr>
+          <a:xfrm>
+            <a:off x="1353370" y="786117"/>
+            <a:ext cx="9485259" cy="4956048"/>
+          </a:xfrm>
+          <a:custGeom>
+            <a:avLst/>
+            <a:gdLst/>
+            <a:ahLst/>
+            <a:cxnLst/>
+            <a:rect l="l" t="t" r="r" b="b"/>
+            <a:pathLst>
+              <a:path w="10607040" h="4956048">
+                <a:moveTo>
+                  <a:pt x="497480" y="0"/>
+                </a:moveTo>
+                <a:lnTo>
+                  <a:pt x="10607040" y="0"/>
+                </a:lnTo>
+                <a:lnTo>
+                  <a:pt x="10607040" y="4485407"/>
+                </a:lnTo>
+                <a:lnTo>
+                  <a:pt x="10131692" y="4956048"/>
+                </a:lnTo>
+                <a:lnTo>
+                  <a:pt x="0" y="4956048"/>
+                </a:lnTo>
+                <a:lnTo>
+                  <a:pt x="0" y="492554"/>
+                </a:lnTo>
+                <a:close/>
+              </a:path>
+            </a:pathLst>
+          </a:custGeom>
+        </p:spPr>
+      </p:pic>
+    </p:spTree>
+    <p:extLst>
+      <p:ext uri="{BB962C8B-B14F-4D97-AF65-F5344CB8AC3E}">
+        <p14:creationId xmlns:p14="http://schemas.microsoft.com/office/powerpoint/2010/main" val="848042870"/>
+      </p:ext>
+    </p:extLst>
+  </p:cSld>
+  <p:clrMapOvr>
+    <a:masterClrMapping/>
+  </p:clrMapOvr>
+</p:sld>
+</file>
+
+<file path=ppt/slides/slide7.xml><?xml version="1.0" encoding="utf-8"?>
+<p:sld xmlns:a="http://schemas.openxmlformats.org/drawingml/2006/main" xmlns:r="http://schemas.openxmlformats.org/officeDocument/2006/relationships" xmlns:p="http://schemas.openxmlformats.org/presentationml/2006/main">
+  <p:cSld>
+    <p:bg>
+      <p:bgPr>
+        <a:gradFill rotWithShape="1">
+          <a:gsLst>
+            <a:gs pos="10000">
+              <a:schemeClr val="bg2">
+                <a:tint val="97000"/>
+                <a:hueMod val="92000"/>
+                <a:satMod val="169000"/>
+                <a:lumMod val="164000"/>
+              </a:schemeClr>
+            </a:gs>
+            <a:gs pos="100000">
+              <a:schemeClr val="bg2">
+                <a:shade val="96000"/>
+                <a:satMod val="120000"/>
+                <a:lumMod val="90000"/>
+              </a:schemeClr>
+            </a:gs>
+          </a:gsLst>
+          <a:lin ang="6120000" scaled="1"/>
+        </a:gradFill>
+        <a:effectLst/>
+      </p:bgPr>
+    </p:bg>
+    <p:spTree>
+      <p:nvGrpSpPr>
+        <p:cNvPr id="1" name=""/>
+        <p:cNvGrpSpPr/>
+        <p:nvPr/>
+      </p:nvGrpSpPr>
+      <p:grpSpPr>
+        <a:xfrm>
+          <a:off x="0" y="0"/>
+          <a:ext cx="0" cy="0"/>
+          <a:chOff x="0" y="0"/>
+          <a:chExt cx="0" cy="0"/>
+        </a:xfrm>
+      </p:grpSpPr>
+      <p:grpSp>
+        <p:nvGrpSpPr>
+          <p:cNvPr id="63" name="Group 62">
+            <a:extLst>
+              <a:ext uri="{FF2B5EF4-FFF2-40B4-BE49-F238E27FC236}">
+                <a16:creationId xmlns:a16="http://schemas.microsoft.com/office/drawing/2014/main" id="{2103B461-323C-4912-BFFD-C37582662085}"/>
+              </a:ext>
+              <a:ext uri="{C183D7F6-B498-43B3-948B-1728B52AA6E4}">
+                <adec:decorative xmlns:adec="http://schemas.microsoft.com/office/drawing/2017/decorative" val="1"/>
+              </a:ext>
+            </a:extLst>
+          </p:cNvPr>
+          <p:cNvGrpSpPr>
+            <a:grpSpLocks noGrp="1" noUngrp="1" noRot="1" noChangeAspect="1" noMove="1" noResize="1"/>
+          </p:cNvGrpSpPr>
+          <p:nvPr>
+            <p:extLst>
+              <p:ext uri="{386F3935-93C4-4BCD-93E2-E3B085C9AB24}">
+                <p16:designElem xmlns:p16="http://schemas.microsoft.com/office/powerpoint/2015/main" val="1"/>
+              </p:ext>
+            </p:extLst>
+          </p:nvPr>
+        </p:nvGrpSpPr>
+        <p:grpSpPr>
+          <a:xfrm>
+            <a:off x="9206969" y="2963333"/>
+            <a:ext cx="2981858" cy="3208867"/>
+            <a:chOff x="9206969" y="2963333"/>
+            <a:chExt cx="2981858" cy="3208867"/>
+          </a:xfrm>
+        </p:grpSpPr>
+        <p:cxnSp>
+          <p:nvCxnSpPr>
+            <p:cNvPr id="64" name="Straight Connector 63">
+              <a:extLst>
+                <a:ext uri="{FF2B5EF4-FFF2-40B4-BE49-F238E27FC236}">
+                  <a16:creationId xmlns:a16="http://schemas.microsoft.com/office/drawing/2014/main" id="{FBC21318-F4F4-4524-95D1-6B7FE0A788A3}"/>
+                </a:ext>
+                <a:ext uri="{C183D7F6-B498-43B3-948B-1728B52AA6E4}">
+                  <adec:decorative xmlns:adec="http://schemas.microsoft.com/office/drawing/2017/decorative" val="1"/>
+                </a:ext>
+              </a:extLst>
+            </p:cNvPr>
+            <p:cNvCxnSpPr/>
+            <p:nvPr>
+              <p:extLst>
+                <p:ext uri="{386F3935-93C4-4BCD-93E2-E3B085C9AB24}">
+                  <p16:designElem xmlns:p16="http://schemas.microsoft.com/office/powerpoint/2015/main" val="1"/>
+                </p:ext>
+              </p:extLst>
+            </p:nvPr>
+          </p:nvCxnSpPr>
+          <p:spPr>
+            <a:xfrm flipH="1">
+              <a:off x="11276012" y="2963333"/>
+              <a:ext cx="912814" cy="912812"/>
+            </a:xfrm>
+            <a:prstGeom prst="line">
+              <a:avLst/>
+            </a:prstGeom>
+            <a:ln w="9525">
+              <a:solidFill>
+                <a:schemeClr val="tx1"/>
+              </a:solidFill>
+            </a:ln>
+          </p:spPr>
+          <p:style>
+            <a:lnRef idx="2">
+              <a:schemeClr val="accent1"/>
+            </a:lnRef>
+            <a:fillRef idx="0">
+              <a:schemeClr val="accent1"/>
+            </a:fillRef>
+            <a:effectRef idx="1">
+              <a:schemeClr val="accent1"/>
+            </a:effectRef>
+            <a:fontRef idx="minor">
+              <a:schemeClr val="tx1"/>
+            </a:fontRef>
+          </p:style>
+        </p:cxnSp>
+        <p:cxnSp>
+          <p:nvCxnSpPr>
             <p:cNvPr id="65" name="Straight Connector 64">
               <a:extLst>
                 <a:ext uri="{FF2B5EF4-FFF2-40B4-BE49-F238E27FC236}">
@@ -15429,7 +16596,7 @@
 </p:sld>
 </file>
 
-<file path=ppt/slides/slide7.xml><?xml version="1.0" encoding="utf-8"?>
+<file path=ppt/slides/slide8.xml><?xml version="1.0" encoding="utf-8"?>
 <p:sld xmlns:a="http://schemas.openxmlformats.org/drawingml/2006/main" xmlns:r="http://schemas.openxmlformats.org/officeDocument/2006/relationships" xmlns:p="http://schemas.openxmlformats.org/presentationml/2006/main">
   <p:cSld>
     <p:bg>
@@ -16014,7 +17181,7 @@
 </p:sld>
 </file>
 
-<file path=ppt/slides/slide8.xml><?xml version="1.0" encoding="utf-8"?>
+<file path=ppt/slides/slide9.xml><?xml version="1.0" encoding="utf-8"?>
 <p:sld xmlns:a="http://schemas.openxmlformats.org/drawingml/2006/main" xmlns:r="http://schemas.openxmlformats.org/officeDocument/2006/relationships" xmlns:p="http://schemas.openxmlformats.org/presentationml/2006/main">
   <p:cSld>
     <p:bg>
@@ -16058,7 +17225,7 @@
       </p:grpSpPr>
       <p:grpSp>
         <p:nvGrpSpPr>
-          <p:cNvPr id="44" name="Group 32">
+          <p:cNvPr id="82" name="Group 81">
             <a:extLst>
               <a:ext uri="{FF2B5EF4-FFF2-40B4-BE49-F238E27FC236}">
                 <a16:creationId xmlns:a16="http://schemas.microsoft.com/office/drawing/2014/main" id="{2103B461-323C-4912-BFFD-C37582662085}"/>
@@ -16089,7 +17256,7 @@
         </p:grpSpPr>
         <p:cxnSp>
           <p:nvCxnSpPr>
-            <p:cNvPr id="34" name="Straight Connector 33">
+            <p:cNvPr id="83" name="Straight Connector 82">
               <a:extLst>
                 <a:ext uri="{FF2B5EF4-FFF2-40B4-BE49-F238E27FC236}">
                   <a16:creationId xmlns:a16="http://schemas.microsoft.com/office/drawing/2014/main" id="{FBC21318-F4F4-4524-95D1-6B7FE0A788A3}"/>
@@ -16139,7 +17306,7 @@
         </p:cxnSp>
         <p:cxnSp>
           <p:nvCxnSpPr>
-            <p:cNvPr id="35" name="Straight Connector 34">
+            <p:cNvPr id="84" name="Straight Connector 83">
               <a:extLst>
                 <a:ext uri="{FF2B5EF4-FFF2-40B4-BE49-F238E27FC236}">
                   <a16:creationId xmlns:a16="http://schemas.microsoft.com/office/drawing/2014/main" id="{D9FFA8E5-974F-409E-89C6-E185BD90933C}"/>
@@ -16189,7 +17356,7 @@
         </p:cxnSp>
         <p:cxnSp>
           <p:nvCxnSpPr>
-            <p:cNvPr id="36" name="Straight Connector 35">
+            <p:cNvPr id="85" name="Straight Connector 84">
               <a:extLst>
                 <a:ext uri="{FF2B5EF4-FFF2-40B4-BE49-F238E27FC236}">
                   <a16:creationId xmlns:a16="http://schemas.microsoft.com/office/drawing/2014/main" id="{C384E2B1-7008-45EE-9F2E-FEF3A089780F}"/>
@@ -16239,7 +17406,7 @@
         </p:cxnSp>
         <p:cxnSp>
           <p:nvCxnSpPr>
-            <p:cNvPr id="37" name="Straight Connector 36">
+            <p:cNvPr id="86" name="Straight Connector 85">
               <a:extLst>
                 <a:ext uri="{FF2B5EF4-FFF2-40B4-BE49-F238E27FC236}">
                   <a16:creationId xmlns:a16="http://schemas.microsoft.com/office/drawing/2014/main" id="{D4563410-7FE9-4955-89C6-0FB9326CD3A8}"/>
@@ -16289,7 +17456,7 @@
         </p:cxnSp>
         <p:cxnSp>
           <p:nvCxnSpPr>
-            <p:cNvPr id="38" name="Straight Connector 37">
+            <p:cNvPr id="87" name="Straight Connector 86">
               <a:extLst>
                 <a:ext uri="{FF2B5EF4-FFF2-40B4-BE49-F238E27FC236}">
                   <a16:creationId xmlns:a16="http://schemas.microsoft.com/office/drawing/2014/main" id="{3AD14C0E-D5DF-4BDC-BD92-642CFF18018D}"/>
@@ -16340,10 +17507,10 @@
       </p:grpSp>
       <p:sp useBgFill="1">
         <p:nvSpPr>
-          <p:cNvPr id="45" name="Rectangle 39">
+          <p:cNvPr id="89" name="Rectangle 88">
             <a:extLst>
               <a:ext uri="{FF2B5EF4-FFF2-40B4-BE49-F238E27FC236}">
-                <a16:creationId xmlns:a16="http://schemas.microsoft.com/office/drawing/2014/main" id="{9A212F8F-D812-4A16-BE82-F3500DE32174}"/>
+                <a16:creationId xmlns:a16="http://schemas.microsoft.com/office/drawing/2014/main" id="{B1ECD48A-A6CE-48F3-8E89-3399C99382F1}"/>
               </a:ext>
               <a:ext uri="{C183D7F6-B498-43B3-948B-1728B52AA6E4}">
                 <adec:decorative xmlns:adec="http://schemas.microsoft.com/office/drawing/2017/decorative" val="1"/>
@@ -16400,23 +17567,126 @@
       </p:sp>
       <p:sp>
         <p:nvSpPr>
-          <p:cNvPr id="5" name="Footer Placeholder 4">
+          <p:cNvPr id="91" name="Rectangle: Single Corner Snipped 90">
             <a:extLst>
               <a:ext uri="{FF2B5EF4-FFF2-40B4-BE49-F238E27FC236}">
-                <a16:creationId xmlns:a16="http://schemas.microsoft.com/office/drawing/2014/main" id="{0D2F664F-EE22-4F1C-9903-F0C8EA62ED93}"/>
+                <a16:creationId xmlns:a16="http://schemas.microsoft.com/office/drawing/2014/main" id="{0A3F7A1B-3080-4A65-A240-2E1A6EF84567}"/>
+              </a:ext>
+              <a:ext uri="{C183D7F6-B498-43B3-948B-1728B52AA6E4}">
+                <adec:decorative xmlns:adec="http://schemas.microsoft.com/office/drawing/2017/decorative" val="1"/>
               </a:ext>
             </a:extLst>
           </p:cNvPr>
           <p:cNvSpPr>
-            <a:spLocks noGrp="1"/>
-          </p:cNvSpPr>
-          <p:nvPr>
-            <p:ph type="ftr" sz="quarter" idx="11"/>
-          </p:nvPr>
-        </p:nvSpPr>
+            <a:spLocks noGrp="1" noRot="1" noChangeAspect="1" noMove="1" noResize="1" noEditPoints="1" noAdjustHandles="1" noChangeArrowheads="1" noChangeShapeType="1" noTextEdit="1"/>
+          </p:cNvSpPr>
+          <p:nvPr>
+            <p:extLst>
+              <p:ext uri="{386F3935-93C4-4BCD-93E2-E3B085C9AB24}">
+                <p16:designElem xmlns:p16="http://schemas.microsoft.com/office/powerpoint/2015/main" val="1"/>
+              </p:ext>
+            </p:extLst>
+          </p:nvPr>
+        </p:nvSpPr>
+        <p:spPr>
+          <a:xfrm flipV="1">
+            <a:off x="0" y="-5"/>
+            <a:ext cx="12188952" cy="5571071"/>
+          </a:xfrm>
+          <a:prstGeom prst="snip1Rect">
+            <a:avLst>
+              <a:gd name="adj" fmla="val 0"/>
+            </a:avLst>
+          </a:prstGeom>
+          <a:solidFill>
+            <a:srgbClr val="FFFFFF"/>
+          </a:solidFill>
+          <a:ln>
+            <a:noFill/>
+          </a:ln>
+        </p:spPr>
+        <p:style>
+          <a:lnRef idx="2">
+            <a:schemeClr val="accent1">
+              <a:shade val="50000"/>
+            </a:schemeClr>
+          </a:lnRef>
+          <a:fillRef idx="1">
+            <a:schemeClr val="accent1"/>
+          </a:fillRef>
+          <a:effectRef idx="0">
+            <a:schemeClr val="accent1"/>
+          </a:effectRef>
+          <a:fontRef idx="minor">
+            <a:schemeClr val="lt1"/>
+          </a:fontRef>
+        </p:style>
+        <p:txBody>
+          <a:bodyPr rtlCol="0" anchor="ctr"/>
+          <a:lstStyle/>
+          <a:p>
+            <a:pPr algn="ctr"/>
+            <a:endParaRPr lang="en-US"/>
+          </a:p>
+        </p:txBody>
+      </p:sp>
+      <p:pic>
+        <p:nvPicPr>
+          <p:cNvPr id="7" name="Content Placeholder 6" descr="Chart, line chart&#10;&#10;Description automatically generated">
+            <a:extLst>
+              <a:ext uri="{FF2B5EF4-FFF2-40B4-BE49-F238E27FC236}">
+                <a16:creationId xmlns:a16="http://schemas.microsoft.com/office/drawing/2014/main" id="{3FA5D030-F64D-4B48-8B69-3511A37D94E9}"/>
+              </a:ext>
+            </a:extLst>
+          </p:cNvPr>
+          <p:cNvPicPr>
+            <a:picLocks noGrp="1" noChangeAspect="1"/>
+          </p:cNvPicPr>
+          <p:nvPr>
+            <p:ph idx="1"/>
+          </p:nvPr>
+        </p:nvPicPr>
+        <p:blipFill>
+          <a:blip r:embed="rId2">
+            <a:extLst>
+              <a:ext uri="{28A0092B-C50C-407E-A947-70E740481C1C}">
+                <a14:useLocalDpi xmlns:a14="http://schemas.microsoft.com/office/drawing/2010/main" val="0"/>
+              </a:ext>
+            </a:extLst>
+          </a:blip>
+          <a:stretch>
+            <a:fillRect/>
+          </a:stretch>
+        </p:blipFill>
         <p:spPr>
           <a:xfrm>
-            <a:off x="684212" y="6290187"/>
+            <a:off x="635179" y="671661"/>
+            <a:ext cx="10910306" cy="4227744"/>
+          </a:xfrm>
+          <a:prstGeom prst="rect">
+            <a:avLst/>
+          </a:prstGeom>
+        </p:spPr>
+      </p:pic>
+      <p:sp>
+        <p:nvSpPr>
+          <p:cNvPr id="4" name="Footer Placeholder 3">
+            <a:extLst>
+              <a:ext uri="{FF2B5EF4-FFF2-40B4-BE49-F238E27FC236}">
+                <a16:creationId xmlns:a16="http://schemas.microsoft.com/office/drawing/2014/main" id="{19111D3B-875C-466E-8065-835C1077A343}"/>
+              </a:ext>
+            </a:extLst>
+          </p:cNvPr>
+          <p:cNvSpPr>
+            <a:spLocks noGrp="1"/>
+          </p:cNvSpPr>
+          <p:nvPr>
+            <p:ph type="ftr" sz="quarter" idx="11"/>
+          </p:nvPr>
+        </p:nvSpPr>
+        <p:spPr>
+          <a:xfrm>
+            <a:off x="684212" y="6347298"/>
             <a:ext cx="7543800" cy="365125"/>
           </a:xfrm>
         </p:spPr>
@@ -16448,318 +17718,10 @@
           </a:p>
         </p:txBody>
       </p:sp>
-      <p:sp>
-        <p:nvSpPr>
-          <p:cNvPr id="46" name="Snip Diagonal Corner Rectangle 24">
-            <a:extLst>
-              <a:ext uri="{FF2B5EF4-FFF2-40B4-BE49-F238E27FC236}">
-                <a16:creationId xmlns:a16="http://schemas.microsoft.com/office/drawing/2014/main" id="{D2CF1D1B-04ED-443D-A9FE-68BF8859BDD6}"/>
-              </a:ext>
-              <a:ext uri="{C183D7F6-B498-43B3-948B-1728B52AA6E4}">
-                <adec:decorative xmlns:adec="http://schemas.microsoft.com/office/drawing/2017/decorative" val="1"/>
-              </a:ext>
-            </a:extLst>
-          </p:cNvPr>
-          <p:cNvSpPr>
-            <a:spLocks noGrp="1" noRot="1" noChangeAspect="1" noMove="1" noResize="1" noEditPoints="1" noAdjustHandles="1" noChangeArrowheads="1" noChangeShapeType="1" noTextEdit="1"/>
-          </p:cNvSpPr>
-          <p:nvPr>
-            <p:extLst>
-              <p:ext uri="{386F3935-93C4-4BCD-93E2-E3B085C9AB24}">
-                <p16:designElem xmlns:p16="http://schemas.microsoft.com/office/powerpoint/2015/main" val="1"/>
-              </p:ext>
-            </p:extLst>
-          </p:nvPr>
-        </p:nvSpPr>
-        <p:spPr>
-          <a:xfrm>
-            <a:off x="628229" y="620722"/>
-            <a:ext cx="10935543" cy="5286838"/>
-          </a:xfrm>
-          <a:prstGeom prst="snip2DiagRect">
-            <a:avLst>
-              <a:gd name="adj1" fmla="val 10787"/>
-              <a:gd name="adj2" fmla="val 0"/>
-            </a:avLst>
-          </a:prstGeom>
-          <a:solidFill>
-            <a:schemeClr val="tx1"/>
-          </a:solidFill>
-          <a:ln>
-            <a:noFill/>
-          </a:ln>
-          <a:effectLst>
-            <a:innerShdw blurRad="57150" dist="38100" dir="14460000">
-              <a:prstClr val="black">
-                <a:alpha val="70000"/>
-              </a:prstClr>
-            </a:innerShdw>
-          </a:effectLst>
-        </p:spPr>
-        <p:style>
-          <a:lnRef idx="2">
-            <a:schemeClr val="accent1">
-              <a:shade val="50000"/>
-            </a:schemeClr>
-          </a:lnRef>
-          <a:fillRef idx="1">
-            <a:schemeClr val="accent1"/>
-          </a:fillRef>
-          <a:effectRef idx="0">
-            <a:schemeClr val="accent1"/>
-          </a:effectRef>
-          <a:fontRef idx="minor">
-            <a:schemeClr val="lt1"/>
-          </a:fontRef>
-        </p:style>
-        <p:txBody>
-          <a:bodyPr rtlCol="0" anchor="ctr"/>
-          <a:lstStyle/>
-          <a:p>
-            <a:pPr algn="ctr"/>
-            <a:endParaRPr lang="en-US"/>
-          </a:p>
-        </p:txBody>
-      </p:sp>
-      <p:pic>
-        <p:nvPicPr>
-          <p:cNvPr id="28" name="Content Placeholder 27" descr="Chart, box and whisker chart&#10;&#10;Description automatically generated">
-            <a:extLst>
-              <a:ext uri="{FF2B5EF4-FFF2-40B4-BE49-F238E27FC236}">
-                <a16:creationId xmlns:a16="http://schemas.microsoft.com/office/drawing/2014/main" id="{4B8E017F-F8C9-4B16-9759-3DAD5ED62CD4}"/>
-              </a:ext>
-            </a:extLst>
-          </p:cNvPr>
-          <p:cNvPicPr>
-            <a:picLocks noGrp="1" noChangeAspect="1"/>
-          </p:cNvPicPr>
-          <p:nvPr>
-            <p:ph idx="1"/>
-          </p:nvPr>
-        </p:nvPicPr>
-        <p:blipFill>
-          <a:blip r:embed="rId2">
-            <a:extLst>
-              <a:ext uri="{28A0092B-C50C-407E-A947-70E740481C1C}">
-                <a14:useLocalDpi xmlns:a14="http://schemas.microsoft.com/office/drawing/2010/main" val="0"/>
-              </a:ext>
-            </a:extLst>
-          </a:blip>
-          <a:stretch>
-            <a:fillRect/>
-          </a:stretch>
-        </p:blipFill>
-        <p:spPr>
-          <a:xfrm>
-            <a:off x="2162628" y="786117"/>
-            <a:ext cx="7866744" cy="4956048"/>
-          </a:xfrm>
-          <a:custGeom>
-            <a:avLst/>
-            <a:gdLst/>
-            <a:ahLst/>
-            <a:cxnLst/>
-            <a:rect l="l" t="t" r="r" b="b"/>
-            <a:pathLst>
-              <a:path w="10607040" h="4956048">
-                <a:moveTo>
-                  <a:pt x="497480" y="0"/>
-                </a:moveTo>
-                <a:lnTo>
-                  <a:pt x="10607040" y="0"/>
-                </a:lnTo>
-                <a:lnTo>
-                  <a:pt x="10607040" y="4485407"/>
-                </a:lnTo>
-                <a:lnTo>
-                  <a:pt x="10131692" y="4956048"/>
-                </a:lnTo>
-                <a:lnTo>
-                  <a:pt x="0" y="4956048"/>
-                </a:lnTo>
-                <a:lnTo>
-                  <a:pt x="0" y="492554"/>
-                </a:lnTo>
-                <a:close/>
-              </a:path>
-            </a:pathLst>
-          </a:custGeom>
-        </p:spPr>
-      </p:pic>
     </p:spTree>
     <p:extLst>
       <p:ext uri="{BB962C8B-B14F-4D97-AF65-F5344CB8AC3E}">
-        <p14:creationId xmlns:p14="http://schemas.microsoft.com/office/powerpoint/2010/main" val="2520762730"/>
-      </p:ext>
-    </p:extLst>
-  </p:cSld>
-  <p:clrMapOvr>
-    <a:masterClrMapping/>
-  </p:clrMapOvr>
-</p:sld>
-</file>
-
-<file path=ppt/slides/slide9.xml><?xml version="1.0" encoding="utf-8"?>
-<p:sld xmlns:a="http://schemas.openxmlformats.org/drawingml/2006/main" xmlns:r="http://schemas.openxmlformats.org/officeDocument/2006/relationships" xmlns:p="http://schemas.openxmlformats.org/presentationml/2006/main">
-  <p:cSld>
-    <p:bg>
-      <p:bgPr>
-        <a:gradFill rotWithShape="1">
-          <a:gsLst>
-            <a:gs pos="10000">
-              <a:schemeClr val="bg2">
-                <a:tint val="97000"/>
-                <a:hueMod val="92000"/>
-                <a:satMod val="169000"/>
-                <a:lumMod val="164000"/>
-              </a:schemeClr>
-            </a:gs>
-            <a:gs pos="100000">
-              <a:schemeClr val="bg2">
-                <a:shade val="96000"/>
-                <a:satMod val="120000"/>
-                <a:lumMod val="90000"/>
-              </a:schemeClr>
-            </a:gs>
-          </a:gsLst>
-          <a:lin ang="6120000" scaled="1"/>
-        </a:gradFill>
-        <a:effectLst/>
-      </p:bgPr>
-    </p:bg>
-    <p:spTree>
-      <p:nvGrpSpPr>
-        <p:cNvPr id="1" name=""/>
-        <p:cNvGrpSpPr/>
-        <p:nvPr/>
-      </p:nvGrpSpPr>
-      <p:grpSpPr>
-        <a:xfrm>
-          <a:off x="0" y="0"/>
-          <a:ext cx="0" cy="0"/>
-          <a:chOff x="0" y="0"/>
-          <a:chExt cx="0" cy="0"/>
-        </a:xfrm>
-      </p:grpSpPr>
-      <p:pic>
-        <p:nvPicPr>
-          <p:cNvPr id="11" name="Content Placeholder 10" descr="Chart, line chart&#10;&#10;Description automatically generated">
-            <a:extLst>
-              <a:ext uri="{FF2B5EF4-FFF2-40B4-BE49-F238E27FC236}">
-                <a16:creationId xmlns:a16="http://schemas.microsoft.com/office/drawing/2014/main" id="{D1F6CEFF-81A1-4B40-8B83-190DF5221D86}"/>
-              </a:ext>
-            </a:extLst>
-          </p:cNvPr>
-          <p:cNvPicPr>
-            <a:picLocks noGrp="1" noChangeAspect="1"/>
-          </p:cNvPicPr>
-          <p:nvPr>
-            <p:ph sz="half" idx="1"/>
-          </p:nvPr>
-        </p:nvPicPr>
-        <p:blipFill>
-          <a:blip r:embed="rId2">
-            <a:extLst>
-              <a:ext uri="{28A0092B-C50C-407E-A947-70E740481C1C}">
-                <a14:useLocalDpi xmlns:a14="http://schemas.microsoft.com/office/drawing/2010/main" val="0"/>
-              </a:ext>
-            </a:extLst>
-          </a:blip>
-          <a:stretch>
-            <a:fillRect/>
-          </a:stretch>
-        </p:blipFill>
-        <p:spPr>
-          <a:xfrm>
-            <a:off x="483491" y="626184"/>
-            <a:ext cx="5214605" cy="3142928"/>
-          </a:xfrm>
-        </p:spPr>
-      </p:pic>
-      <p:pic>
-        <p:nvPicPr>
-          <p:cNvPr id="13" name="Content Placeholder 12" descr="Chart, line chart&#10;&#10;Description automatically generated">
-            <a:extLst>
-              <a:ext uri="{FF2B5EF4-FFF2-40B4-BE49-F238E27FC236}">
-                <a16:creationId xmlns:a16="http://schemas.microsoft.com/office/drawing/2014/main" id="{E38FFD55-D4A2-417B-9061-063921ED5E22}"/>
-              </a:ext>
-            </a:extLst>
-          </p:cNvPr>
-          <p:cNvPicPr>
-            <a:picLocks noGrp="1" noChangeAspect="1"/>
-          </p:cNvPicPr>
-          <p:nvPr>
-            <p:ph sz="half" idx="2"/>
-          </p:nvPr>
-        </p:nvPicPr>
-        <p:blipFill>
-          <a:blip r:embed="rId3">
-            <a:extLst>
-              <a:ext uri="{28A0092B-C50C-407E-A947-70E740481C1C}">
-                <a14:useLocalDpi xmlns:a14="http://schemas.microsoft.com/office/drawing/2010/main" val="0"/>
-              </a:ext>
-            </a:extLst>
-          </a:blip>
-          <a:stretch>
-            <a:fillRect/>
-          </a:stretch>
-        </p:blipFill>
-        <p:spPr>
-          <a:xfrm>
-            <a:off x="5139589" y="2734721"/>
-            <a:ext cx="5543008" cy="3340861"/>
-          </a:xfrm>
-        </p:spPr>
-      </p:pic>
-      <p:sp>
-        <p:nvSpPr>
-          <p:cNvPr id="5" name="Footer Placeholder 4">
-            <a:extLst>
-              <a:ext uri="{FF2B5EF4-FFF2-40B4-BE49-F238E27FC236}">
-                <a16:creationId xmlns:a16="http://schemas.microsoft.com/office/drawing/2014/main" id="{0D2F664F-EE22-4F1C-9903-F0C8EA62ED93}"/>
-              </a:ext>
-            </a:extLst>
-          </p:cNvPr>
-          <p:cNvSpPr>
-            <a:spLocks noGrp="1"/>
-          </p:cNvSpPr>
-          <p:nvPr>
-            <p:ph type="ftr" sz="quarter" idx="11"/>
-          </p:nvPr>
-        </p:nvSpPr>
-        <p:spPr/>
-        <p:txBody>
-          <a:bodyPr vert="horz" lIns="91440" tIns="45720" rIns="91440" bIns="45720" rtlCol="0" anchor="t">
-            <a:normAutofit/>
-          </a:bodyPr>
-          <a:lstStyle/>
-          <a:p>
-            <a:pPr>
-              <a:spcAft>
-                <a:spcPts val="600"/>
-              </a:spcAft>
-            </a:pPr>
-            <a:r>
-              <a:rPr lang="en-US" b="0" i="0" kern="1200">
-                <a:solidFill>
-                  <a:schemeClr val="bg2">
-                    <a:lumMod val="50000"/>
-                  </a:schemeClr>
-                </a:solidFill>
-                <a:effectLst/>
-                <a:latin typeface="+mn-lt"/>
-                <a:ea typeface="+mn-ea"/>
-                <a:cs typeface="+mn-cs"/>
-              </a:rPr>
-              <a:t>Data sourced from Yahoo Finance.</a:t>
-            </a:r>
-          </a:p>
-        </p:txBody>
-      </p:sp>
-    </p:spTree>
-    <p:extLst>
-      <p:ext uri="{BB962C8B-B14F-4D97-AF65-F5344CB8AC3E}">
-        <p14:creationId xmlns:p14="http://schemas.microsoft.com/office/powerpoint/2010/main" val="4203457135"/>
+        <p14:creationId xmlns:p14="http://schemas.microsoft.com/office/powerpoint/2010/main" val="2050967668"/>
       </p:ext>
     </p:extLst>
   </p:cSld>

</xml_diff>